<commit_message>
Mise à jours diapos
</commit_message>
<xml_diff>
--- a/Swot.pptx
+++ b/Swot.pptx
@@ -6,6 +6,7 @@
   </p:sldMasterIdLst>
   <p:sldIdLst>
     <p:sldId id="256" r:id="rId2"/>
+    <p:sldId id="257" r:id="rId3"/>
   </p:sldIdLst>
   <p:sldSz cx="12192000" cy="6858000"/>
   <p:notesSz cx="6858000" cy="9144000"/>
@@ -104,6 +105,11 @@
       </a:defRPr>
     </a:lvl9pPr>
   </p:defaultTextStyle>
+  <p:extLst>
+    <p:ext uri="{EFAFB233-063F-42B5-8137-9DF3F51BA10A}">
+      <p15:sldGuideLst xmlns:p15="http://schemas.microsoft.com/office/powerpoint/2012/main"/>
+    </p:ext>
+  </p:extLst>
 </p:presentation>
 </file>
 
@@ -1026,6 +1032,925 @@
 </dgm:colorsDef>
 </file>
 
+<file path=ppt/diagrams/colors2.xml><?xml version="1.0" encoding="utf-8"?>
+<dgm:colorsDef xmlns:dgm="http://schemas.openxmlformats.org/drawingml/2006/diagram" xmlns:a="http://schemas.openxmlformats.org/drawingml/2006/main" uniqueId="urn:microsoft.com/office/officeart/2005/8/colors/colorful1">
+  <dgm:title val=""/>
+  <dgm:desc val=""/>
+  <dgm:catLst>
+    <dgm:cat type="colorful" pri="10100"/>
+  </dgm:catLst>
+  <dgm:styleLbl name="node0">
+    <dgm:fillClrLst meth="repeat">
+      <a:schemeClr val="accent1"/>
+    </dgm:fillClrLst>
+    <dgm:linClrLst meth="repeat">
+      <a:schemeClr val="lt1"/>
+    </dgm:linClrLst>
+    <dgm:effectClrLst/>
+    <dgm:txLinClrLst/>
+    <dgm:txFillClrLst/>
+    <dgm:txEffectClrLst/>
+  </dgm:styleLbl>
+  <dgm:styleLbl name="node1">
+    <dgm:fillClrLst meth="repeat">
+      <a:schemeClr val="accent2"/>
+      <a:schemeClr val="accent3"/>
+      <a:schemeClr val="accent4"/>
+      <a:schemeClr val="accent5"/>
+      <a:schemeClr val="accent6"/>
+    </dgm:fillClrLst>
+    <dgm:linClrLst meth="repeat">
+      <a:schemeClr val="lt1"/>
+    </dgm:linClrLst>
+    <dgm:effectClrLst/>
+    <dgm:txLinClrLst/>
+    <dgm:txFillClrLst/>
+    <dgm:txEffectClrLst/>
+  </dgm:styleLbl>
+  <dgm:styleLbl name="alignNode1">
+    <dgm:fillClrLst meth="repeat">
+      <a:schemeClr val="accent2"/>
+      <a:schemeClr val="accent3"/>
+      <a:schemeClr val="accent4"/>
+      <a:schemeClr val="accent5"/>
+      <a:schemeClr val="accent6"/>
+    </dgm:fillClrLst>
+    <dgm:linClrLst meth="repeat">
+      <a:schemeClr val="accent2"/>
+      <a:schemeClr val="accent3"/>
+      <a:schemeClr val="accent4"/>
+      <a:schemeClr val="accent5"/>
+      <a:schemeClr val="accent6"/>
+    </dgm:linClrLst>
+    <dgm:effectClrLst/>
+    <dgm:txLinClrLst/>
+    <dgm:txFillClrLst/>
+    <dgm:txEffectClrLst/>
+  </dgm:styleLbl>
+  <dgm:styleLbl name="lnNode1">
+    <dgm:fillClrLst meth="repeat">
+      <a:schemeClr val="accent2"/>
+      <a:schemeClr val="accent3"/>
+      <a:schemeClr val="accent4"/>
+      <a:schemeClr val="accent5"/>
+      <a:schemeClr val="accent6"/>
+    </dgm:fillClrLst>
+    <dgm:linClrLst meth="repeat">
+      <a:schemeClr val="lt1"/>
+    </dgm:linClrLst>
+    <dgm:effectClrLst/>
+    <dgm:txLinClrLst/>
+    <dgm:txFillClrLst/>
+    <dgm:txEffectClrLst/>
+  </dgm:styleLbl>
+  <dgm:styleLbl name="vennNode1">
+    <dgm:fillClrLst meth="repeat">
+      <a:schemeClr val="accent2">
+        <a:alpha val="50000"/>
+      </a:schemeClr>
+      <a:schemeClr val="accent3">
+        <a:alpha val="50000"/>
+      </a:schemeClr>
+      <a:schemeClr val="accent4">
+        <a:alpha val="50000"/>
+      </a:schemeClr>
+      <a:schemeClr val="accent5">
+        <a:alpha val="50000"/>
+      </a:schemeClr>
+      <a:schemeClr val="accent6">
+        <a:alpha val="50000"/>
+      </a:schemeClr>
+    </dgm:fillClrLst>
+    <dgm:linClrLst meth="repeat">
+      <a:schemeClr val="lt1"/>
+    </dgm:linClrLst>
+    <dgm:effectClrLst/>
+    <dgm:txLinClrLst/>
+    <dgm:txFillClrLst/>
+    <dgm:txEffectClrLst/>
+  </dgm:styleLbl>
+  <dgm:styleLbl name="node2">
+    <dgm:fillClrLst>
+      <a:schemeClr val="accent2"/>
+    </dgm:fillClrLst>
+    <dgm:linClrLst meth="repeat">
+      <a:schemeClr val="lt1"/>
+    </dgm:linClrLst>
+    <dgm:effectClrLst/>
+    <dgm:txLinClrLst/>
+    <dgm:txFillClrLst/>
+    <dgm:txEffectClrLst/>
+  </dgm:styleLbl>
+  <dgm:styleLbl name="node3">
+    <dgm:fillClrLst>
+      <a:schemeClr val="accent3"/>
+    </dgm:fillClrLst>
+    <dgm:linClrLst meth="repeat">
+      <a:schemeClr val="lt1"/>
+    </dgm:linClrLst>
+    <dgm:effectClrLst/>
+    <dgm:txLinClrLst/>
+    <dgm:txFillClrLst/>
+    <dgm:txEffectClrLst/>
+  </dgm:styleLbl>
+  <dgm:styleLbl name="node4">
+    <dgm:fillClrLst>
+      <a:schemeClr val="accent4"/>
+    </dgm:fillClrLst>
+    <dgm:linClrLst meth="repeat">
+      <a:schemeClr val="lt1"/>
+    </dgm:linClrLst>
+    <dgm:effectClrLst/>
+    <dgm:txLinClrLst/>
+    <dgm:txFillClrLst/>
+    <dgm:txEffectClrLst/>
+  </dgm:styleLbl>
+  <dgm:styleLbl name="fgImgPlace1">
+    <dgm:fillClrLst meth="repeat">
+      <a:schemeClr val="accent2">
+        <a:tint val="50000"/>
+      </a:schemeClr>
+      <a:schemeClr val="accent3">
+        <a:tint val="50000"/>
+      </a:schemeClr>
+      <a:schemeClr val="accent4">
+        <a:tint val="50000"/>
+      </a:schemeClr>
+      <a:schemeClr val="accent5">
+        <a:tint val="50000"/>
+      </a:schemeClr>
+      <a:schemeClr val="accent6">
+        <a:tint val="50000"/>
+      </a:schemeClr>
+    </dgm:fillClrLst>
+    <dgm:linClrLst meth="repeat">
+      <a:schemeClr val="lt1"/>
+    </dgm:linClrLst>
+    <dgm:effectClrLst/>
+    <dgm:txLinClrLst/>
+    <dgm:txFillClrLst meth="repeat">
+      <a:schemeClr val="lt1"/>
+    </dgm:txFillClrLst>
+    <dgm:txEffectClrLst/>
+  </dgm:styleLbl>
+  <dgm:styleLbl name="alignImgPlace1">
+    <dgm:fillClrLst>
+      <a:schemeClr val="accent1">
+        <a:tint val="50000"/>
+      </a:schemeClr>
+      <a:schemeClr val="accent2">
+        <a:tint val="20000"/>
+      </a:schemeClr>
+    </dgm:fillClrLst>
+    <dgm:linClrLst meth="repeat">
+      <a:schemeClr val="lt1"/>
+    </dgm:linClrLst>
+    <dgm:effectClrLst/>
+    <dgm:txLinClrLst/>
+    <dgm:txFillClrLst meth="repeat">
+      <a:schemeClr val="lt1"/>
+    </dgm:txFillClrLst>
+    <dgm:txEffectClrLst/>
+  </dgm:styleLbl>
+  <dgm:styleLbl name="bgImgPlace1">
+    <dgm:fillClrLst>
+      <a:schemeClr val="accent1">
+        <a:tint val="50000"/>
+      </a:schemeClr>
+      <a:schemeClr val="accent2">
+        <a:tint val="20000"/>
+      </a:schemeClr>
+    </dgm:fillClrLst>
+    <dgm:linClrLst meth="repeat">
+      <a:schemeClr val="lt1"/>
+    </dgm:linClrLst>
+    <dgm:effectClrLst/>
+    <dgm:txLinClrLst/>
+    <dgm:txFillClrLst meth="repeat">
+      <a:schemeClr val="lt1"/>
+    </dgm:txFillClrLst>
+    <dgm:txEffectClrLst/>
+  </dgm:styleLbl>
+  <dgm:styleLbl name="sibTrans2D1">
+    <dgm:fillClrLst meth="repeat">
+      <a:schemeClr val="accent2"/>
+      <a:schemeClr val="accent3"/>
+      <a:schemeClr val="accent4"/>
+      <a:schemeClr val="accent5"/>
+      <a:schemeClr val="accent6"/>
+    </dgm:fillClrLst>
+    <dgm:linClrLst meth="cycle">
+      <a:schemeClr val="lt1"/>
+    </dgm:linClrLst>
+    <dgm:effectClrLst/>
+    <dgm:txLinClrLst/>
+    <dgm:txFillClrLst/>
+    <dgm:txEffectClrLst/>
+  </dgm:styleLbl>
+  <dgm:styleLbl name="fgSibTrans2D1">
+    <dgm:fillClrLst meth="repeat">
+      <a:schemeClr val="accent2"/>
+      <a:schemeClr val="accent3"/>
+      <a:schemeClr val="accent4"/>
+      <a:schemeClr val="accent5"/>
+      <a:schemeClr val="accent6"/>
+    </dgm:fillClrLst>
+    <dgm:linClrLst meth="cycle">
+      <a:schemeClr val="lt1"/>
+    </dgm:linClrLst>
+    <dgm:effectClrLst/>
+    <dgm:txLinClrLst/>
+    <dgm:txFillClrLst meth="repeat">
+      <a:schemeClr val="lt1"/>
+    </dgm:txFillClrLst>
+    <dgm:txEffectClrLst/>
+  </dgm:styleLbl>
+  <dgm:styleLbl name="bgSibTrans2D1">
+    <dgm:fillClrLst meth="repeat">
+      <a:schemeClr val="accent2"/>
+      <a:schemeClr val="accent3"/>
+      <a:schemeClr val="accent4"/>
+      <a:schemeClr val="accent5"/>
+      <a:schemeClr val="accent6"/>
+    </dgm:fillClrLst>
+    <dgm:linClrLst meth="cycle">
+      <a:schemeClr val="lt1"/>
+    </dgm:linClrLst>
+    <dgm:effectClrLst/>
+    <dgm:txLinClrLst/>
+    <dgm:txFillClrLst meth="repeat">
+      <a:schemeClr val="lt1"/>
+    </dgm:txFillClrLst>
+    <dgm:txEffectClrLst/>
+  </dgm:styleLbl>
+  <dgm:styleLbl name="sibTrans1D1">
+    <dgm:fillClrLst meth="repeat">
+      <a:schemeClr val="accent2"/>
+      <a:schemeClr val="accent3"/>
+      <a:schemeClr val="accent4"/>
+      <a:schemeClr val="accent5"/>
+      <a:schemeClr val="accent6"/>
+    </dgm:fillClrLst>
+    <dgm:linClrLst meth="repeat">
+      <a:schemeClr val="accent2"/>
+      <a:schemeClr val="accent3"/>
+      <a:schemeClr val="accent4"/>
+      <a:schemeClr val="accent5"/>
+      <a:schemeClr val="accent6"/>
+    </dgm:linClrLst>
+    <dgm:effectClrLst/>
+    <dgm:txLinClrLst/>
+    <dgm:txFillClrLst meth="repeat">
+      <a:schemeClr val="tx1"/>
+    </dgm:txFillClrLst>
+    <dgm:txEffectClrLst/>
+  </dgm:styleLbl>
+  <dgm:styleLbl name="callout">
+    <dgm:fillClrLst meth="repeat">
+      <a:schemeClr val="accent2"/>
+    </dgm:fillClrLst>
+    <dgm:linClrLst meth="repeat">
+      <a:schemeClr val="accent2">
+        <a:tint val="50000"/>
+      </a:schemeClr>
+    </dgm:linClrLst>
+    <dgm:effectClrLst/>
+    <dgm:txLinClrLst/>
+    <dgm:txFillClrLst meth="repeat">
+      <a:schemeClr val="tx1"/>
+    </dgm:txFillClrLst>
+    <dgm:txEffectClrLst/>
+  </dgm:styleLbl>
+  <dgm:styleLbl name="asst0">
+    <dgm:fillClrLst meth="repeat">
+      <a:schemeClr val="accent1"/>
+    </dgm:fillClrLst>
+    <dgm:linClrLst meth="repeat">
+      <a:schemeClr val="lt1"/>
+    </dgm:linClrLst>
+    <dgm:effectClrLst/>
+    <dgm:txLinClrLst/>
+    <dgm:txFillClrLst/>
+    <dgm:txEffectClrLst/>
+  </dgm:styleLbl>
+  <dgm:styleLbl name="asst1">
+    <dgm:fillClrLst meth="repeat">
+      <a:schemeClr val="accent2"/>
+    </dgm:fillClrLst>
+    <dgm:linClrLst meth="repeat">
+      <a:schemeClr val="lt1"/>
+    </dgm:linClrLst>
+    <dgm:effectClrLst/>
+    <dgm:txLinClrLst/>
+    <dgm:txFillClrLst/>
+    <dgm:txEffectClrLst/>
+  </dgm:styleLbl>
+  <dgm:styleLbl name="asst2">
+    <dgm:fillClrLst>
+      <a:schemeClr val="accent3"/>
+    </dgm:fillClrLst>
+    <dgm:linClrLst meth="repeat">
+      <a:schemeClr val="lt1"/>
+    </dgm:linClrLst>
+    <dgm:effectClrLst/>
+    <dgm:txLinClrLst/>
+    <dgm:txFillClrLst/>
+    <dgm:txEffectClrLst/>
+  </dgm:styleLbl>
+  <dgm:styleLbl name="asst3">
+    <dgm:fillClrLst>
+      <a:schemeClr val="accent4"/>
+    </dgm:fillClrLst>
+    <dgm:linClrLst meth="repeat">
+      <a:schemeClr val="lt1"/>
+    </dgm:linClrLst>
+    <dgm:effectClrLst/>
+    <dgm:txLinClrLst/>
+    <dgm:txFillClrLst/>
+    <dgm:txEffectClrLst/>
+  </dgm:styleLbl>
+  <dgm:styleLbl name="asst4">
+    <dgm:fillClrLst>
+      <a:schemeClr val="accent5"/>
+    </dgm:fillClrLst>
+    <dgm:linClrLst meth="repeat">
+      <a:schemeClr val="lt1"/>
+    </dgm:linClrLst>
+    <dgm:effectClrLst/>
+    <dgm:txLinClrLst/>
+    <dgm:txFillClrLst/>
+    <dgm:txEffectClrLst/>
+  </dgm:styleLbl>
+  <dgm:styleLbl name="parChTrans2D1">
+    <dgm:fillClrLst meth="repeat">
+      <a:schemeClr val="accent2"/>
+    </dgm:fillClrLst>
+    <dgm:linClrLst meth="repeat">
+      <a:schemeClr val="lt1"/>
+    </dgm:linClrLst>
+    <dgm:effectClrLst/>
+    <dgm:txLinClrLst/>
+    <dgm:txFillClrLst meth="repeat">
+      <a:schemeClr val="lt1"/>
+    </dgm:txFillClrLst>
+    <dgm:txEffectClrLst/>
+  </dgm:styleLbl>
+  <dgm:styleLbl name="parChTrans2D2">
+    <dgm:fillClrLst meth="repeat">
+      <a:schemeClr val="accent3"/>
+    </dgm:fillClrLst>
+    <dgm:linClrLst meth="repeat">
+      <a:schemeClr val="lt1"/>
+    </dgm:linClrLst>
+    <dgm:effectClrLst/>
+    <dgm:txLinClrLst/>
+    <dgm:txFillClrLst/>
+    <dgm:txEffectClrLst/>
+  </dgm:styleLbl>
+  <dgm:styleLbl name="parChTrans2D3">
+    <dgm:fillClrLst meth="repeat">
+      <a:schemeClr val="accent4"/>
+    </dgm:fillClrLst>
+    <dgm:linClrLst meth="repeat">
+      <a:schemeClr val="lt1"/>
+    </dgm:linClrLst>
+    <dgm:effectClrLst/>
+    <dgm:txLinClrLst/>
+    <dgm:txFillClrLst/>
+    <dgm:txEffectClrLst/>
+  </dgm:styleLbl>
+  <dgm:styleLbl name="parChTrans2D4">
+    <dgm:fillClrLst meth="repeat">
+      <a:schemeClr val="accent5"/>
+    </dgm:fillClrLst>
+    <dgm:linClrLst meth="repeat">
+      <a:schemeClr val="lt1"/>
+    </dgm:linClrLst>
+    <dgm:effectClrLst/>
+    <dgm:txLinClrLst/>
+    <dgm:txFillClrLst meth="repeat">
+      <a:schemeClr val="lt1"/>
+    </dgm:txFillClrLst>
+    <dgm:txEffectClrLst/>
+  </dgm:styleLbl>
+  <dgm:styleLbl name="parChTrans1D1">
+    <dgm:fillClrLst meth="repeat">
+      <a:schemeClr val="accent2"/>
+    </dgm:fillClrLst>
+    <dgm:linClrLst meth="repeat">
+      <a:schemeClr val="accent1"/>
+    </dgm:linClrLst>
+    <dgm:effectClrLst/>
+    <dgm:txLinClrLst/>
+    <dgm:txFillClrLst meth="repeat">
+      <a:schemeClr val="tx1"/>
+    </dgm:txFillClrLst>
+    <dgm:txEffectClrLst/>
+  </dgm:styleLbl>
+  <dgm:styleLbl name="parChTrans1D2">
+    <dgm:fillClrLst meth="repeat">
+      <a:schemeClr val="accent3">
+        <a:tint val="90000"/>
+      </a:schemeClr>
+    </dgm:fillClrLst>
+    <dgm:linClrLst meth="repeat">
+      <a:schemeClr val="accent2"/>
+    </dgm:linClrLst>
+    <dgm:effectClrLst/>
+    <dgm:txLinClrLst/>
+    <dgm:txFillClrLst meth="repeat">
+      <a:schemeClr val="tx1"/>
+    </dgm:txFillClrLst>
+    <dgm:txEffectClrLst/>
+  </dgm:styleLbl>
+  <dgm:styleLbl name="parChTrans1D3">
+    <dgm:fillClrLst meth="repeat">
+      <a:schemeClr val="accent4">
+        <a:tint val="70000"/>
+      </a:schemeClr>
+    </dgm:fillClrLst>
+    <dgm:linClrLst meth="repeat">
+      <a:schemeClr val="accent3"/>
+    </dgm:linClrLst>
+    <dgm:effectClrLst/>
+    <dgm:txLinClrLst/>
+    <dgm:txFillClrLst meth="repeat">
+      <a:schemeClr val="tx1"/>
+    </dgm:txFillClrLst>
+    <dgm:txEffectClrLst/>
+  </dgm:styleLbl>
+  <dgm:styleLbl name="parChTrans1D4">
+    <dgm:fillClrLst meth="repeat">
+      <a:schemeClr val="accent5">
+        <a:tint val="50000"/>
+      </a:schemeClr>
+    </dgm:fillClrLst>
+    <dgm:linClrLst meth="repeat">
+      <a:schemeClr val="accent4"/>
+    </dgm:linClrLst>
+    <dgm:effectClrLst/>
+    <dgm:txLinClrLst/>
+    <dgm:txFillClrLst meth="repeat">
+      <a:schemeClr val="tx1"/>
+    </dgm:txFillClrLst>
+    <dgm:txEffectClrLst/>
+  </dgm:styleLbl>
+  <dgm:styleLbl name="fgAcc1">
+    <dgm:fillClrLst meth="repeat">
+      <a:schemeClr val="lt1">
+        <a:alpha val="90000"/>
+      </a:schemeClr>
+    </dgm:fillClrLst>
+    <dgm:linClrLst meth="repeat">
+      <a:schemeClr val="accent2"/>
+      <a:schemeClr val="accent3"/>
+      <a:schemeClr val="accent4"/>
+      <a:schemeClr val="accent5"/>
+      <a:schemeClr val="accent6"/>
+    </dgm:linClrLst>
+    <dgm:effectClrLst/>
+    <dgm:txLinClrLst/>
+    <dgm:txFillClrLst meth="repeat">
+      <a:schemeClr val="dk1"/>
+    </dgm:txFillClrLst>
+    <dgm:txEffectClrLst/>
+  </dgm:styleLbl>
+  <dgm:styleLbl name="conFgAcc1">
+    <dgm:fillClrLst meth="repeat">
+      <a:schemeClr val="lt1">
+        <a:alpha val="90000"/>
+      </a:schemeClr>
+    </dgm:fillClrLst>
+    <dgm:linClrLst meth="repeat">
+      <a:schemeClr val="accent2"/>
+      <a:schemeClr val="accent3"/>
+      <a:schemeClr val="accent4"/>
+      <a:schemeClr val="accent5"/>
+      <a:schemeClr val="accent6"/>
+    </dgm:linClrLst>
+    <dgm:effectClrLst/>
+    <dgm:txLinClrLst/>
+    <dgm:txFillClrLst meth="repeat">
+      <a:schemeClr val="dk1"/>
+    </dgm:txFillClrLst>
+    <dgm:txEffectClrLst/>
+  </dgm:styleLbl>
+  <dgm:styleLbl name="alignAcc1">
+    <dgm:fillClrLst meth="repeat">
+      <a:schemeClr val="lt1">
+        <a:alpha val="90000"/>
+      </a:schemeClr>
+    </dgm:fillClrLst>
+    <dgm:linClrLst meth="repeat">
+      <a:schemeClr val="accent2"/>
+      <a:schemeClr val="accent3"/>
+      <a:schemeClr val="accent4"/>
+      <a:schemeClr val="accent5"/>
+      <a:schemeClr val="accent6"/>
+    </dgm:linClrLst>
+    <dgm:effectClrLst/>
+    <dgm:txLinClrLst/>
+    <dgm:txFillClrLst meth="repeat">
+      <a:schemeClr val="dk1"/>
+    </dgm:txFillClrLst>
+    <dgm:txEffectClrLst/>
+  </dgm:styleLbl>
+  <dgm:styleLbl name="trAlignAcc1">
+    <dgm:fillClrLst meth="repeat">
+      <a:schemeClr val="lt1">
+        <a:alpha val="40000"/>
+      </a:schemeClr>
+    </dgm:fillClrLst>
+    <dgm:linClrLst meth="repeat">
+      <a:schemeClr val="accent1"/>
+    </dgm:linClrLst>
+    <dgm:effectClrLst/>
+    <dgm:txLinClrLst/>
+    <dgm:txFillClrLst meth="repeat">
+      <a:schemeClr val="dk1"/>
+    </dgm:txFillClrLst>
+    <dgm:txEffectClrLst/>
+  </dgm:styleLbl>
+  <dgm:styleLbl name="bgAcc1">
+    <dgm:fillClrLst meth="repeat">
+      <a:schemeClr val="lt1">
+        <a:alpha val="90000"/>
+      </a:schemeClr>
+    </dgm:fillClrLst>
+    <dgm:linClrLst meth="repeat">
+      <a:schemeClr val="accent2"/>
+      <a:schemeClr val="accent3"/>
+      <a:schemeClr val="accent4"/>
+      <a:schemeClr val="accent5"/>
+      <a:schemeClr val="accent6"/>
+    </dgm:linClrLst>
+    <dgm:effectClrLst/>
+    <dgm:txLinClrLst/>
+    <dgm:txFillClrLst meth="repeat">
+      <a:schemeClr val="dk1"/>
+    </dgm:txFillClrLst>
+    <dgm:txEffectClrLst/>
+  </dgm:styleLbl>
+  <dgm:styleLbl name="solidFgAcc1">
+    <dgm:fillClrLst meth="repeat">
+      <a:schemeClr val="lt1"/>
+    </dgm:fillClrLst>
+    <dgm:linClrLst meth="repeat">
+      <a:schemeClr val="accent2"/>
+      <a:schemeClr val="accent3"/>
+      <a:schemeClr val="accent4"/>
+      <a:schemeClr val="accent5"/>
+      <a:schemeClr val="accent6"/>
+    </dgm:linClrLst>
+    <dgm:effectClrLst/>
+    <dgm:txLinClrLst/>
+    <dgm:txFillClrLst meth="repeat">
+      <a:schemeClr val="dk1"/>
+    </dgm:txFillClrLst>
+    <dgm:txEffectClrLst/>
+  </dgm:styleLbl>
+  <dgm:styleLbl name="solidAlignAcc1">
+    <dgm:fillClrLst meth="repeat">
+      <a:schemeClr val="lt1"/>
+    </dgm:fillClrLst>
+    <dgm:linClrLst meth="repeat">
+      <a:schemeClr val="accent2"/>
+      <a:schemeClr val="accent3"/>
+      <a:schemeClr val="accent4"/>
+      <a:schemeClr val="accent5"/>
+      <a:schemeClr val="accent6"/>
+    </dgm:linClrLst>
+    <dgm:effectClrLst/>
+    <dgm:txLinClrLst/>
+    <dgm:txFillClrLst meth="repeat">
+      <a:schemeClr val="dk1"/>
+    </dgm:txFillClrLst>
+    <dgm:txEffectClrLst/>
+  </dgm:styleLbl>
+  <dgm:styleLbl name="solidBgAcc1">
+    <dgm:fillClrLst meth="repeat">
+      <a:schemeClr val="lt1"/>
+    </dgm:fillClrLst>
+    <dgm:linClrLst meth="repeat">
+      <a:schemeClr val="accent2"/>
+      <a:schemeClr val="accent3"/>
+      <a:schemeClr val="accent4"/>
+      <a:schemeClr val="accent5"/>
+      <a:schemeClr val="accent6"/>
+    </dgm:linClrLst>
+    <dgm:effectClrLst/>
+    <dgm:txLinClrLst/>
+    <dgm:txFillClrLst meth="repeat">
+      <a:schemeClr val="dk1"/>
+    </dgm:txFillClrLst>
+    <dgm:txEffectClrLst/>
+  </dgm:styleLbl>
+  <dgm:styleLbl name="fgAccFollowNode1">
+    <dgm:fillClrLst meth="repeat">
+      <a:schemeClr val="accent2">
+        <a:tint val="40000"/>
+        <a:alpha val="90000"/>
+      </a:schemeClr>
+      <a:schemeClr val="accent3">
+        <a:tint val="40000"/>
+        <a:alpha val="90000"/>
+      </a:schemeClr>
+      <a:schemeClr val="accent4">
+        <a:tint val="40000"/>
+        <a:alpha val="90000"/>
+      </a:schemeClr>
+      <a:schemeClr val="accent5">
+        <a:tint val="40000"/>
+        <a:alpha val="90000"/>
+      </a:schemeClr>
+      <a:schemeClr val="accent6">
+        <a:tint val="40000"/>
+        <a:alpha val="90000"/>
+      </a:schemeClr>
+    </dgm:fillClrLst>
+    <dgm:linClrLst meth="repeat">
+      <a:schemeClr val="accent2">
+        <a:tint val="40000"/>
+        <a:alpha val="90000"/>
+      </a:schemeClr>
+      <a:schemeClr val="accent3">
+        <a:tint val="40000"/>
+        <a:alpha val="90000"/>
+      </a:schemeClr>
+      <a:schemeClr val="accent4">
+        <a:tint val="40000"/>
+        <a:alpha val="90000"/>
+      </a:schemeClr>
+      <a:schemeClr val="accent5">
+        <a:tint val="40000"/>
+        <a:alpha val="90000"/>
+      </a:schemeClr>
+      <a:schemeClr val="accent6">
+        <a:tint val="40000"/>
+        <a:alpha val="90000"/>
+      </a:schemeClr>
+    </dgm:linClrLst>
+    <dgm:effectClrLst/>
+    <dgm:txLinClrLst/>
+    <dgm:txFillClrLst meth="repeat">
+      <a:schemeClr val="dk1"/>
+    </dgm:txFillClrLst>
+    <dgm:txEffectClrLst/>
+  </dgm:styleLbl>
+  <dgm:styleLbl name="alignAccFollowNode1">
+    <dgm:fillClrLst meth="repeat">
+      <a:schemeClr val="accent2">
+        <a:tint val="40000"/>
+        <a:alpha val="90000"/>
+      </a:schemeClr>
+      <a:schemeClr val="accent3">
+        <a:tint val="40000"/>
+        <a:alpha val="90000"/>
+      </a:schemeClr>
+      <a:schemeClr val="accent4">
+        <a:tint val="40000"/>
+        <a:alpha val="90000"/>
+      </a:schemeClr>
+      <a:schemeClr val="accent5">
+        <a:tint val="40000"/>
+        <a:alpha val="90000"/>
+      </a:schemeClr>
+      <a:schemeClr val="accent6">
+        <a:tint val="40000"/>
+        <a:alpha val="90000"/>
+      </a:schemeClr>
+    </dgm:fillClrLst>
+    <dgm:linClrLst meth="repeat">
+      <a:schemeClr val="accent2">
+        <a:tint val="40000"/>
+        <a:alpha val="90000"/>
+      </a:schemeClr>
+      <a:schemeClr val="accent3">
+        <a:tint val="40000"/>
+        <a:alpha val="90000"/>
+      </a:schemeClr>
+      <a:schemeClr val="accent4">
+        <a:tint val="40000"/>
+        <a:alpha val="90000"/>
+      </a:schemeClr>
+      <a:schemeClr val="accent5">
+        <a:tint val="40000"/>
+        <a:alpha val="90000"/>
+      </a:schemeClr>
+      <a:schemeClr val="accent6">
+        <a:tint val="40000"/>
+        <a:alpha val="90000"/>
+      </a:schemeClr>
+    </dgm:linClrLst>
+    <dgm:effectClrLst/>
+    <dgm:txLinClrLst/>
+    <dgm:txFillClrLst meth="repeat">
+      <a:schemeClr val="dk1"/>
+    </dgm:txFillClrLst>
+    <dgm:txEffectClrLst/>
+  </dgm:styleLbl>
+  <dgm:styleLbl name="bgAccFollowNode1">
+    <dgm:fillClrLst meth="repeat">
+      <a:schemeClr val="accent2">
+        <a:tint val="40000"/>
+        <a:alpha val="90000"/>
+      </a:schemeClr>
+      <a:schemeClr val="accent3">
+        <a:tint val="40000"/>
+        <a:alpha val="90000"/>
+      </a:schemeClr>
+      <a:schemeClr val="accent4">
+        <a:tint val="40000"/>
+        <a:alpha val="90000"/>
+      </a:schemeClr>
+      <a:schemeClr val="accent5">
+        <a:tint val="40000"/>
+        <a:alpha val="90000"/>
+      </a:schemeClr>
+      <a:schemeClr val="accent6">
+        <a:tint val="40000"/>
+        <a:alpha val="90000"/>
+      </a:schemeClr>
+    </dgm:fillClrLst>
+    <dgm:linClrLst meth="repeat">
+      <a:schemeClr val="accent2">
+        <a:tint val="40000"/>
+        <a:alpha val="90000"/>
+      </a:schemeClr>
+      <a:schemeClr val="accent3">
+        <a:tint val="40000"/>
+        <a:alpha val="90000"/>
+      </a:schemeClr>
+      <a:schemeClr val="accent4">
+        <a:tint val="40000"/>
+        <a:alpha val="90000"/>
+      </a:schemeClr>
+      <a:schemeClr val="accent5">
+        <a:tint val="40000"/>
+        <a:alpha val="90000"/>
+      </a:schemeClr>
+      <a:schemeClr val="accent6">
+        <a:tint val="40000"/>
+        <a:alpha val="90000"/>
+      </a:schemeClr>
+    </dgm:linClrLst>
+    <dgm:effectClrLst/>
+    <dgm:txLinClrLst/>
+    <dgm:txFillClrLst meth="repeat">
+      <a:schemeClr val="dk1"/>
+    </dgm:txFillClrLst>
+    <dgm:txEffectClrLst/>
+  </dgm:styleLbl>
+  <dgm:styleLbl name="fgAcc0">
+    <dgm:fillClrLst meth="repeat">
+      <a:schemeClr val="lt1">
+        <a:alpha val="90000"/>
+      </a:schemeClr>
+    </dgm:fillClrLst>
+    <dgm:linClrLst>
+      <a:schemeClr val="accent1"/>
+    </dgm:linClrLst>
+    <dgm:effectClrLst/>
+    <dgm:txLinClrLst/>
+    <dgm:txFillClrLst meth="repeat">
+      <a:schemeClr val="dk1"/>
+    </dgm:txFillClrLst>
+    <dgm:txEffectClrLst/>
+  </dgm:styleLbl>
+  <dgm:styleLbl name="fgAcc2">
+    <dgm:fillClrLst meth="repeat">
+      <a:schemeClr val="lt1">
+        <a:alpha val="90000"/>
+      </a:schemeClr>
+    </dgm:fillClrLst>
+    <dgm:linClrLst>
+      <a:schemeClr val="accent2"/>
+    </dgm:linClrLst>
+    <dgm:effectClrLst/>
+    <dgm:txLinClrLst/>
+    <dgm:txFillClrLst meth="repeat">
+      <a:schemeClr val="dk1"/>
+    </dgm:txFillClrLst>
+    <dgm:txEffectClrLst/>
+  </dgm:styleLbl>
+  <dgm:styleLbl name="fgAcc3">
+    <dgm:fillClrLst meth="repeat">
+      <a:schemeClr val="lt1">
+        <a:alpha val="90000"/>
+      </a:schemeClr>
+    </dgm:fillClrLst>
+    <dgm:linClrLst>
+      <a:schemeClr val="accent3"/>
+    </dgm:linClrLst>
+    <dgm:effectClrLst/>
+    <dgm:txLinClrLst/>
+    <dgm:txFillClrLst meth="repeat">
+      <a:schemeClr val="dk1"/>
+    </dgm:txFillClrLst>
+    <dgm:txEffectClrLst/>
+  </dgm:styleLbl>
+  <dgm:styleLbl name="fgAcc4">
+    <dgm:fillClrLst meth="repeat">
+      <a:schemeClr val="lt1">
+        <a:alpha val="90000"/>
+      </a:schemeClr>
+    </dgm:fillClrLst>
+    <dgm:linClrLst>
+      <a:schemeClr val="accent4"/>
+    </dgm:linClrLst>
+    <dgm:effectClrLst/>
+    <dgm:txLinClrLst/>
+    <dgm:txFillClrLst meth="repeat">
+      <a:schemeClr val="dk1"/>
+    </dgm:txFillClrLst>
+    <dgm:txEffectClrLst/>
+  </dgm:styleLbl>
+  <dgm:styleLbl name="bgShp">
+    <dgm:fillClrLst meth="repeat">
+      <a:schemeClr val="accent2">
+        <a:tint val="40000"/>
+      </a:schemeClr>
+    </dgm:fillClrLst>
+    <dgm:linClrLst meth="repeat">
+      <a:schemeClr val="dk1"/>
+    </dgm:linClrLst>
+    <dgm:effectClrLst/>
+    <dgm:txLinClrLst/>
+    <dgm:txFillClrLst meth="repeat">
+      <a:schemeClr val="dk1"/>
+    </dgm:txFillClrLst>
+    <dgm:txEffectClrLst/>
+  </dgm:styleLbl>
+  <dgm:styleLbl name="dkBgShp">
+    <dgm:fillClrLst meth="repeat">
+      <a:schemeClr val="accent2">
+        <a:shade val="90000"/>
+      </a:schemeClr>
+    </dgm:fillClrLst>
+    <dgm:linClrLst meth="repeat">
+      <a:schemeClr val="dk1"/>
+    </dgm:linClrLst>
+    <dgm:effectClrLst/>
+    <dgm:txLinClrLst/>
+    <dgm:txFillClrLst meth="repeat">
+      <a:schemeClr val="lt1"/>
+    </dgm:txFillClrLst>
+    <dgm:txEffectClrLst/>
+  </dgm:styleLbl>
+  <dgm:styleLbl name="trBgShp">
+    <dgm:fillClrLst meth="repeat">
+      <a:schemeClr val="accent1">
+        <a:tint val="50000"/>
+        <a:alpha val="40000"/>
+      </a:schemeClr>
+    </dgm:fillClrLst>
+    <dgm:linClrLst meth="repeat">
+      <a:schemeClr val="accent2"/>
+    </dgm:linClrLst>
+    <dgm:effectClrLst/>
+    <dgm:txLinClrLst/>
+    <dgm:txFillClrLst meth="repeat">
+      <a:schemeClr val="lt1"/>
+    </dgm:txFillClrLst>
+    <dgm:txEffectClrLst/>
+  </dgm:styleLbl>
+  <dgm:styleLbl name="fgShp">
+    <dgm:fillClrLst meth="repeat">
+      <a:schemeClr val="accent2">
+        <a:tint val="40000"/>
+      </a:schemeClr>
+    </dgm:fillClrLst>
+    <dgm:linClrLst meth="repeat">
+      <a:schemeClr val="lt1"/>
+    </dgm:linClrLst>
+    <dgm:effectClrLst/>
+    <dgm:txLinClrLst/>
+    <dgm:txFillClrLst meth="repeat">
+      <a:schemeClr val="dk1"/>
+    </dgm:txFillClrLst>
+    <dgm:txEffectClrLst/>
+  </dgm:styleLbl>
+  <dgm:styleLbl name="revTx">
+    <dgm:fillClrLst meth="repeat">
+      <a:schemeClr val="lt1">
+        <a:alpha val="0"/>
+      </a:schemeClr>
+    </dgm:fillClrLst>
+    <dgm:linClrLst meth="repeat">
+      <a:schemeClr val="dk1">
+        <a:alpha val="0"/>
+      </a:schemeClr>
+    </dgm:linClrLst>
+    <dgm:effectClrLst/>
+    <dgm:txLinClrLst/>
+    <dgm:txFillClrLst meth="repeat">
+      <a:schemeClr val="tx1"/>
+    </dgm:txFillClrLst>
+    <dgm:txEffectClrLst/>
+  </dgm:styleLbl>
+</dgm:colorsDef>
+</file>
+
 <file path=ppt/diagrams/data1.xml><?xml version="1.0" encoding="utf-8"?>
 <dgm:dataModel xmlns:dgm="http://schemas.openxmlformats.org/drawingml/2006/diagram" xmlns:a="http://schemas.openxmlformats.org/drawingml/2006/main">
   <dgm:ptLst>
@@ -1487,55 +2412,6 @@
         </a:p>
       </dgm:t>
     </dgm:pt>
-    <dgm:pt modelId="{78ECF954-FDEE-47AB-AE6E-09D6573AE75E}">
-      <dgm:prSet phldrT="[Text]"/>
-      <dgm:spPr/>
-      <dgm:t>
-        <a:bodyPr/>
-        <a:lstStyle/>
-        <a:p>
-          <a:r>
-            <a:rPr lang="fr-FR" dirty="0" smtClean="0"/>
-            <a:t>Server </a:t>
-          </a:r>
-          <a:r>
-            <a:rPr lang="fr-FR" dirty="0" err="1" smtClean="0"/>
-            <a:t>access</a:t>
-          </a:r>
-          <a:r>
-            <a:rPr lang="fr-FR" dirty="0" smtClean="0"/>
-            <a:t> </a:t>
-          </a:r>
-          <a:r>
-            <a:rPr lang="fr-FR" dirty="0" err="1" smtClean="0"/>
-            <a:t>rights</a:t>
-          </a:r>
-          <a:endParaRPr lang="fr-FR" dirty="0"/>
-        </a:p>
-      </dgm:t>
-    </dgm:pt>
-    <dgm:pt modelId="{88969A47-1169-4C31-A10F-33107C771956}" type="parTrans" cxnId="{8EF1586C-DA83-4DD2-82C0-B92F32563D45}">
-      <dgm:prSet/>
-      <dgm:spPr/>
-      <dgm:t>
-        <a:bodyPr/>
-        <a:lstStyle/>
-        <a:p>
-          <a:endParaRPr lang="fr-FR"/>
-        </a:p>
-      </dgm:t>
-    </dgm:pt>
-    <dgm:pt modelId="{FDF3E017-0500-4D3C-8AB2-B773B95ADEC4}" type="sibTrans" cxnId="{8EF1586C-DA83-4DD2-82C0-B92F32563D45}">
-      <dgm:prSet/>
-      <dgm:spPr/>
-      <dgm:t>
-        <a:bodyPr/>
-        <a:lstStyle/>
-        <a:p>
-          <a:endParaRPr lang="fr-FR"/>
-        </a:p>
-      </dgm:t>
-    </dgm:pt>
     <dgm:pt modelId="{7FF71154-70C1-47DE-91E2-5DB90307E807}">
       <dgm:prSet phldrT="[Text]"/>
       <dgm:spPr/>
@@ -1562,10 +2438,24 @@
     <dgm:pt modelId="{1B9722FC-C7C2-486D-BC7E-72CE34B24ADB}" type="parTrans" cxnId="{8117BD28-990A-4794-8E5A-2D49697F13CF}">
       <dgm:prSet/>
       <dgm:spPr/>
+      <dgm:t>
+        <a:bodyPr/>
+        <a:lstStyle/>
+        <a:p>
+          <a:endParaRPr lang="fr-FR"/>
+        </a:p>
+      </dgm:t>
     </dgm:pt>
     <dgm:pt modelId="{96E0472B-19D5-49CC-8E2D-2FF1A8F57871}" type="sibTrans" cxnId="{8117BD28-990A-4794-8E5A-2D49697F13CF}">
       <dgm:prSet/>
       <dgm:spPr/>
+      <dgm:t>
+        <a:bodyPr/>
+        <a:lstStyle/>
+        <a:p>
+          <a:endParaRPr lang="fr-FR"/>
+        </a:p>
+      </dgm:t>
     </dgm:pt>
     <dgm:pt modelId="{62885FA7-E7FB-4933-9935-6A8AA90289B4}">
       <dgm:prSet phldrT="[Text]"/>
@@ -1585,10 +2475,24 @@
     <dgm:pt modelId="{9870B421-E3D6-4556-A843-2F0EDB4F207B}" type="parTrans" cxnId="{58755D72-6A8A-4181-8EB5-41F1412B480B}">
       <dgm:prSet/>
       <dgm:spPr/>
+      <dgm:t>
+        <a:bodyPr/>
+        <a:lstStyle/>
+        <a:p>
+          <a:endParaRPr lang="fr-FR"/>
+        </a:p>
+      </dgm:t>
     </dgm:pt>
     <dgm:pt modelId="{EB0831C9-645B-4C0B-8FAE-4F47D0F4E0C7}" type="sibTrans" cxnId="{58755D72-6A8A-4181-8EB5-41F1412B480B}">
       <dgm:prSet/>
       <dgm:spPr/>
+      <dgm:t>
+        <a:bodyPr/>
+        <a:lstStyle/>
+        <a:p>
+          <a:endParaRPr lang="fr-FR"/>
+        </a:p>
+      </dgm:t>
     </dgm:pt>
     <dgm:pt modelId="{39401A14-B365-4553-9A3D-A401D3183747}" type="pres">
       <dgm:prSet presAssocID="{CC293B1C-4CF8-4FF0-BBC7-4942ED2D7F88}" presName="cycleMatrixDiagram" presStyleCnt="0">
@@ -1600,6 +2504,13 @@
         </dgm:presLayoutVars>
       </dgm:prSet>
       <dgm:spPr/>
+      <dgm:t>
+        <a:bodyPr/>
+        <a:lstStyle/>
+        <a:p>
+          <a:endParaRPr lang="fr-FR"/>
+        </a:p>
+      </dgm:t>
     </dgm:pt>
     <dgm:pt modelId="{D7E58549-68A7-4F21-BF0D-84F7636DCD92}" type="pres">
       <dgm:prSet presAssocID="{CC293B1C-4CF8-4FF0-BBC7-4942ED2D7F88}" presName="children" presStyleCnt="0"/>
@@ -1741,6 +2652,13 @@
         </dgm:presLayoutVars>
       </dgm:prSet>
       <dgm:spPr/>
+      <dgm:t>
+        <a:bodyPr/>
+        <a:lstStyle/>
+        <a:p>
+          <a:endParaRPr lang="fr-FR"/>
+        </a:p>
+      </dgm:t>
     </dgm:pt>
     <dgm:pt modelId="{A67A60E5-5291-49E4-B3E5-53A58B528285}" type="pres">
       <dgm:prSet presAssocID="{CC293B1C-4CF8-4FF0-BBC7-4942ED2D7F88}" presName="quadrant2" presStyleLbl="node1" presStyleIdx="1" presStyleCnt="4">
@@ -1750,6 +2668,13 @@
         </dgm:presLayoutVars>
       </dgm:prSet>
       <dgm:spPr/>
+      <dgm:t>
+        <a:bodyPr/>
+        <a:lstStyle/>
+        <a:p>
+          <a:endParaRPr lang="fr-FR"/>
+        </a:p>
+      </dgm:t>
     </dgm:pt>
     <dgm:pt modelId="{CF4FC7F6-A89C-4633-A10E-BFE92B369DCD}" type="pres">
       <dgm:prSet presAssocID="{CC293B1C-4CF8-4FF0-BBC7-4942ED2D7F88}" presName="quadrant3" presStyleLbl="node1" presStyleIdx="2" presStyleCnt="4">
@@ -1759,6 +2684,13 @@
         </dgm:presLayoutVars>
       </dgm:prSet>
       <dgm:spPr/>
+      <dgm:t>
+        <a:bodyPr/>
+        <a:lstStyle/>
+        <a:p>
+          <a:endParaRPr lang="fr-FR"/>
+        </a:p>
+      </dgm:t>
     </dgm:pt>
     <dgm:pt modelId="{C0852406-3DC0-4222-A1F8-184593FC4596}" type="pres">
       <dgm:prSet presAssocID="{CC293B1C-4CF8-4FF0-BBC7-4942ED2D7F88}" presName="quadrant4" presStyleLbl="node1" presStyleIdx="3" presStyleCnt="4">
@@ -1768,6 +2700,13 @@
         </dgm:presLayoutVars>
       </dgm:prSet>
       <dgm:spPr/>
+      <dgm:t>
+        <a:bodyPr/>
+        <a:lstStyle/>
+        <a:p>
+          <a:endParaRPr lang="fr-FR"/>
+        </a:p>
+      </dgm:t>
     </dgm:pt>
     <dgm:pt modelId="{B569151F-8995-4BD7-A8F3-A948642763E3}" type="pres">
       <dgm:prSet presAssocID="{CC293B1C-4CF8-4FF0-BBC7-4942ED2D7F88}" presName="quadrantPlaceholder" presStyleCnt="0"/>
@@ -1804,7 +2743,6 @@
   </dgm:ptLst>
   <dgm:cxnLst>
     <dgm:cxn modelId="{5DC2DB55-F097-4294-8B9E-72B598743DA3}" srcId="{8BEA78FF-204F-4428-9092-659961DC247C}" destId="{850DD825-7D08-4BBC-94B9-7E217910F9A2}" srcOrd="1" destOrd="0" parTransId="{D847AE72-61FF-43C4-BFB0-3E6EC0A79B26}" sibTransId="{DD66B6EB-9ADC-44F2-A7C2-DA4869ECDFFE}"/>
-    <dgm:cxn modelId="{8EF1586C-DA83-4DD2-82C0-B92F32563D45}" srcId="{DCE41F30-8A4B-4090-95D5-6CBD1CFA1EEC}" destId="{78ECF954-FDEE-47AB-AE6E-09D6573AE75E}" srcOrd="2" destOrd="0" parTransId="{88969A47-1169-4C31-A10F-33107C771956}" sibTransId="{FDF3E017-0500-4D3C-8AB2-B773B95ADEC4}"/>
     <dgm:cxn modelId="{E3B07325-89FF-4391-8CE7-A9327E714BAB}" type="presOf" srcId="{850DD825-7D08-4BBC-94B9-7E217910F9A2}" destId="{431C4C2F-7F42-4D62-8EEF-918E7AD22EA0}" srcOrd="0" destOrd="1" presId="urn:microsoft.com/office/officeart/2005/8/layout/cycle4"/>
     <dgm:cxn modelId="{61191D9C-E95A-4D05-8EB5-50675A3F154F}" srcId="{DCE41F30-8A4B-4090-95D5-6CBD1CFA1EEC}" destId="{AE8D8FFF-9AF0-4B15-AF81-01A130F2BD02}" srcOrd="1" destOrd="0" parTransId="{09A1B763-003F-4D1E-A0CA-D45779C90106}" sibTransId="{16409495-689E-4EF6-90A7-12E4E2621B22}"/>
     <dgm:cxn modelId="{1CBAB651-7EEB-481D-ABEA-C9F15AD02315}" type="presOf" srcId="{35F1F2D2-FC47-4990-98DB-731AFE036343}" destId="{BC6F0824-1351-49BA-BADB-F02B71A91728}" srcOrd="0" destOrd="0" presId="urn:microsoft.com/office/officeart/2005/8/layout/cycle4"/>
@@ -1813,8 +2751,8 @@
     <dgm:cxn modelId="{4E97D8A7-76B5-48AC-8127-77483C88C3E8}" type="presOf" srcId="{21C7A246-DDB5-40DD-9118-CC4963BF878A}" destId="{BC6F0824-1351-49BA-BADB-F02B71A91728}" srcOrd="0" destOrd="1" presId="urn:microsoft.com/office/officeart/2005/8/layout/cycle4"/>
     <dgm:cxn modelId="{300BADC8-FA1D-41CF-9577-EF5F3479F4AA}" type="presOf" srcId="{850DD825-7D08-4BBC-94B9-7E217910F9A2}" destId="{53088BBF-CDFB-43AD-88FA-A16B4FDD4AEA}" srcOrd="1" destOrd="1" presId="urn:microsoft.com/office/officeart/2005/8/layout/cycle4"/>
     <dgm:cxn modelId="{BB2751CA-98F0-4DE3-92D5-C27014E747E7}" type="presOf" srcId="{62885FA7-E7FB-4933-9935-6A8AA90289B4}" destId="{8128ED5B-798D-45C7-BB11-A0996A8BF223}" srcOrd="1" destOrd="2" presId="urn:microsoft.com/office/officeart/2005/8/layout/cycle4"/>
+    <dgm:cxn modelId="{A8DCBCD3-5B49-43C8-BEF9-9BD35FE716B1}" type="presOf" srcId="{7FF71154-70C1-47DE-91E2-5DB90307E807}" destId="{60120B91-D76F-4101-857D-B9B656863593}" srcOrd="1" destOrd="1" presId="urn:microsoft.com/office/officeart/2005/8/layout/cycle4"/>
     <dgm:cxn modelId="{08978BA1-AE5A-4DFF-A0C3-92D4A0078A98}" srcId="{0916D3E2-7950-4B1E-A80A-B1A0DFE4D7BE}" destId="{9B35DA45-8824-4EE3-89F0-3F4E07F980E3}" srcOrd="0" destOrd="0" parTransId="{F26E0BCB-616E-4F5C-9212-B89461307743}" sibTransId="{6FFF208B-A136-4388-9736-DE2BA4AFD5AF}"/>
-    <dgm:cxn modelId="{A8DCBCD3-5B49-43C8-BEF9-9BD35FE716B1}" type="presOf" srcId="{7FF71154-70C1-47DE-91E2-5DB90307E807}" destId="{60120B91-D76F-4101-857D-B9B656863593}" srcOrd="1" destOrd="1" presId="urn:microsoft.com/office/officeart/2005/8/layout/cycle4"/>
     <dgm:cxn modelId="{EEEC077C-AB3C-4EFE-8B03-AD871E94F78D}" type="presOf" srcId="{9B35DA45-8824-4EE3-89F0-3F4E07F980E3}" destId="{68AC0C8C-6683-4490-8F38-983C8CB47C3F}" srcOrd="0" destOrd="0" presId="urn:microsoft.com/office/officeart/2005/8/layout/cycle4"/>
     <dgm:cxn modelId="{8117BD28-990A-4794-8E5A-2D49697F13CF}" srcId="{0916D3E2-7950-4B1E-A80A-B1A0DFE4D7BE}" destId="{7FF71154-70C1-47DE-91E2-5DB90307E807}" srcOrd="1" destOrd="0" parTransId="{1B9722FC-C7C2-486D-BC7E-72CE34B24ADB}" sibTransId="{96E0472B-19D5-49CC-8E2D-2FF1A8F57871}"/>
     <dgm:cxn modelId="{58155F06-24B3-4762-BE81-A3BE31C1471B}" type="presOf" srcId="{49454F30-2B75-445A-845F-7473D893477D}" destId="{431C4C2F-7F42-4D62-8EEF-918E7AD22EA0}" srcOrd="0" destOrd="0" presId="urn:microsoft.com/office/officeart/2005/8/layout/cycle4"/>
@@ -1826,7 +2764,6 @@
     <dgm:cxn modelId="{404BEDB5-503D-4496-A372-BC86D7488756}" type="presOf" srcId="{49454F30-2B75-445A-845F-7473D893477D}" destId="{53088BBF-CDFB-43AD-88FA-A16B4FDD4AEA}" srcOrd="1" destOrd="0" presId="urn:microsoft.com/office/officeart/2005/8/layout/cycle4"/>
     <dgm:cxn modelId="{FF36AF00-D9CD-4D2D-AC86-CDDC13C9C0A0}" type="presOf" srcId="{CC293B1C-4CF8-4FF0-BBC7-4942ED2D7F88}" destId="{39401A14-B365-4553-9A3D-A401D3183747}" srcOrd="0" destOrd="0" presId="urn:microsoft.com/office/officeart/2005/8/layout/cycle4"/>
     <dgm:cxn modelId="{EE4678B6-5735-4088-B5FB-034E3ED250DC}" type="presOf" srcId="{1981BF8C-ABB4-462F-BD54-45D3229B3478}" destId="{FFCC9154-8E22-496A-ADF8-EA81D4AB5D77}" srcOrd="1" destOrd="0" presId="urn:microsoft.com/office/officeart/2005/8/layout/cycle4"/>
-    <dgm:cxn modelId="{738C3A31-CFAA-47B8-80F2-EF217B90A80B}" type="presOf" srcId="{78ECF954-FDEE-47AB-AE6E-09D6573AE75E}" destId="{05478942-E273-4856-8553-F0FD8F015AA2}" srcOrd="0" destOrd="2" presId="urn:microsoft.com/office/officeart/2005/8/layout/cycle4"/>
     <dgm:cxn modelId="{5C0AD508-7F63-4071-A67E-08D6B6E5B49E}" type="presOf" srcId="{9B35DA45-8824-4EE3-89F0-3F4E07F980E3}" destId="{60120B91-D76F-4101-857D-B9B656863593}" srcOrd="1" destOrd="0" presId="urn:microsoft.com/office/officeart/2005/8/layout/cycle4"/>
     <dgm:cxn modelId="{19813EE8-C6A4-4FF5-97EF-39DC40F6E92D}" type="presOf" srcId="{AE8D8FFF-9AF0-4B15-AF81-01A130F2BD02}" destId="{05478942-E273-4856-8553-F0FD8F015AA2}" srcOrd="0" destOrd="1" presId="urn:microsoft.com/office/officeart/2005/8/layout/cycle4"/>
     <dgm:cxn modelId="{2F545677-CE33-4761-99ED-0F7D3431F1B7}" srcId="{DCE41F30-8A4B-4090-95D5-6CBD1CFA1EEC}" destId="{1981BF8C-ABB4-462F-BD54-45D3229B3478}" srcOrd="0" destOrd="0" parTransId="{420AF548-7339-428B-B062-F64CBEBA21A3}" sibTransId="{314ADFC2-8DB9-4517-A22A-D1F9C188BEE4}"/>
@@ -1840,7 +2777,6 @@
     <dgm:cxn modelId="{856CCC98-4D42-4940-9913-BB20C5217489}" srcId="{CC293B1C-4CF8-4FF0-BBC7-4942ED2D7F88}" destId="{DCE41F30-8A4B-4090-95D5-6CBD1CFA1EEC}" srcOrd="1" destOrd="0" parTransId="{480265E7-8542-40B5-95A1-EC04B55B8C68}" sibTransId="{005E5E72-5BE1-4DC4-AD1C-48C242521B93}"/>
     <dgm:cxn modelId="{62183DCE-73CC-4C11-9A6E-2DD0544C0707}" type="presOf" srcId="{35F1F2D2-FC47-4990-98DB-731AFE036343}" destId="{8128ED5B-798D-45C7-BB11-A0996A8BF223}" srcOrd="1" destOrd="0" presId="urn:microsoft.com/office/officeart/2005/8/layout/cycle4"/>
     <dgm:cxn modelId="{922E1D0C-FCB5-4E00-A624-9125BB3A2A05}" type="presOf" srcId="{21C7A246-DDB5-40DD-9118-CC4963BF878A}" destId="{8128ED5B-798D-45C7-BB11-A0996A8BF223}" srcOrd="1" destOrd="1" presId="urn:microsoft.com/office/officeart/2005/8/layout/cycle4"/>
-    <dgm:cxn modelId="{B4479107-E02E-442D-AF0D-DC9CCB29194E}" type="presOf" srcId="{78ECF954-FDEE-47AB-AE6E-09D6573AE75E}" destId="{FFCC9154-8E22-496A-ADF8-EA81D4AB5D77}" srcOrd="1" destOrd="2" presId="urn:microsoft.com/office/officeart/2005/8/layout/cycle4"/>
     <dgm:cxn modelId="{A5D3F3DB-629E-46CD-AA76-C52C0C251A66}" srcId="{CC293B1C-4CF8-4FF0-BBC7-4942ED2D7F88}" destId="{8BEA78FF-204F-4428-9092-659961DC247C}" srcOrd="3" destOrd="0" parTransId="{41090789-956B-42C9-B909-44B2D62666F5}" sibTransId="{F0DB2DD3-51DB-4551-8E87-8440876EF808}"/>
     <dgm:cxn modelId="{E69111E1-2AF5-42E2-BE3E-EB2F1E17D602}" type="presParOf" srcId="{39401A14-B365-4553-9A3D-A401D3183747}" destId="{D7E58549-68A7-4F21-BF0D-84F7636DCD92}" srcOrd="0" destOrd="0" presId="urn:microsoft.com/office/officeart/2005/8/layout/cycle4"/>
     <dgm:cxn modelId="{5D750357-2682-4475-B5A8-F0F613866855}" type="presParOf" srcId="{D7E58549-68A7-4F21-BF0D-84F7636DCD92}" destId="{5D458377-8CFE-43EB-BDF2-7CB3F0D876C1}" srcOrd="0" destOrd="0" presId="urn:microsoft.com/office/officeart/2005/8/layout/cycle4"/>
@@ -1864,6 +2800,818 @@
     <dgm:cxn modelId="{E4B3EE36-2F13-47BC-8782-3DBC7741A3E0}" type="presParOf" srcId="{BFB0D660-5BF3-4B91-8837-C379A331C3C8}" destId="{B569151F-8995-4BD7-A8F3-A948642763E3}" srcOrd="4" destOrd="0" presId="urn:microsoft.com/office/officeart/2005/8/layout/cycle4"/>
     <dgm:cxn modelId="{6E3D8645-865D-4525-BCEA-9144DAD9C716}" type="presParOf" srcId="{39401A14-B365-4553-9A3D-A401D3183747}" destId="{3B6382B4-DDDF-482E-9E6A-38E6F7DB930C}" srcOrd="2" destOrd="0" presId="urn:microsoft.com/office/officeart/2005/8/layout/cycle4"/>
     <dgm:cxn modelId="{F45683D6-AB1F-4612-B240-75F81E3803AB}" type="presParOf" srcId="{39401A14-B365-4553-9A3D-A401D3183747}" destId="{72B333DC-EBE8-4650-A713-61338E0F2C2D}" srcOrd="3" destOrd="0" presId="urn:microsoft.com/office/officeart/2005/8/layout/cycle4"/>
+  </dgm:cxnLst>
+  <dgm:bg/>
+  <dgm:whole/>
+  <dgm:extLst>
+    <a:ext uri="http://schemas.microsoft.com/office/drawing/2008/diagram">
+      <dsp:dataModelExt xmlns:dsp="http://schemas.microsoft.com/office/drawing/2008/diagram" relId="rId6" minVer="http://schemas.openxmlformats.org/drawingml/2006/diagram"/>
+    </a:ext>
+  </dgm:extLst>
+</dgm:dataModel>
+</file>
+
+<file path=ppt/diagrams/data2.xml><?xml version="1.0" encoding="utf-8"?>
+<dgm:dataModel xmlns:dgm="http://schemas.openxmlformats.org/drawingml/2006/diagram" xmlns:a="http://schemas.openxmlformats.org/drawingml/2006/main">
+  <dgm:ptLst>
+    <dgm:pt modelId="{CC293B1C-4CF8-4FF0-BBC7-4942ED2D7F88}" type="doc">
+      <dgm:prSet loTypeId="urn:microsoft.com/office/officeart/2005/8/layout/cycle4" loCatId="cycle" qsTypeId="urn:microsoft.com/office/officeart/2005/8/quickstyle/3d1" qsCatId="3D" csTypeId="urn:microsoft.com/office/officeart/2005/8/colors/colorful1" csCatId="colorful" phldr="1"/>
+      <dgm:spPr/>
+      <dgm:t>
+        <a:bodyPr/>
+        <a:lstStyle/>
+        <a:p>
+          <a:endParaRPr lang="fr-FR"/>
+        </a:p>
+      </dgm:t>
+    </dgm:pt>
+    <dgm:pt modelId="{8FEE133A-1A79-4187-9AFD-4F06B42A70BC}">
+      <dgm:prSet phldrT="[Text]"/>
+      <dgm:spPr/>
+      <dgm:t>
+        <a:bodyPr/>
+        <a:lstStyle/>
+        <a:p>
+          <a:r>
+            <a:rPr lang="fr-FR" dirty="0" smtClean="0"/>
+            <a:t>S</a:t>
+          </a:r>
+          <a:endParaRPr lang="fr-FR" dirty="0"/>
+        </a:p>
+      </dgm:t>
+    </dgm:pt>
+    <dgm:pt modelId="{7D947A46-F0B2-4D95-921D-7768A2A81535}" type="parTrans" cxnId="{F3DC86B6-474F-4BE6-A324-3FE9F9B8844A}">
+      <dgm:prSet/>
+      <dgm:spPr/>
+      <dgm:t>
+        <a:bodyPr/>
+        <a:lstStyle/>
+        <a:p>
+          <a:endParaRPr lang="fr-FR"/>
+        </a:p>
+      </dgm:t>
+    </dgm:pt>
+    <dgm:pt modelId="{A16446F1-3DF9-49B1-92C9-2E546FABE218}" type="sibTrans" cxnId="{F3DC86B6-474F-4BE6-A324-3FE9F9B8844A}">
+      <dgm:prSet/>
+      <dgm:spPr/>
+      <dgm:t>
+        <a:bodyPr/>
+        <a:lstStyle/>
+        <a:p>
+          <a:endParaRPr lang="fr-FR"/>
+        </a:p>
+      </dgm:t>
+    </dgm:pt>
+    <dgm:pt modelId="{35F1F2D2-FC47-4990-98DB-731AFE036343}">
+      <dgm:prSet phldrT="[Text]"/>
+      <dgm:spPr/>
+      <dgm:t>
+        <a:bodyPr/>
+        <a:lstStyle/>
+        <a:p>
+          <a:r>
+            <a:rPr lang="fr-FR" dirty="0" smtClean="0"/>
+            <a:t>Diverses compétences</a:t>
+          </a:r>
+          <a:endParaRPr lang="fr-FR" dirty="0"/>
+        </a:p>
+      </dgm:t>
+    </dgm:pt>
+    <dgm:pt modelId="{D8C3661F-62F4-45E8-BB01-35BAAF924AEB}" type="parTrans" cxnId="{5F7AD9D5-E7E6-4F46-A4C5-3A0CE6F62C8E}">
+      <dgm:prSet/>
+      <dgm:spPr/>
+      <dgm:t>
+        <a:bodyPr/>
+        <a:lstStyle/>
+        <a:p>
+          <a:endParaRPr lang="fr-FR"/>
+        </a:p>
+      </dgm:t>
+    </dgm:pt>
+    <dgm:pt modelId="{4EFE689A-014D-4F95-82DA-3254DF013F6C}" type="sibTrans" cxnId="{5F7AD9D5-E7E6-4F46-A4C5-3A0CE6F62C8E}">
+      <dgm:prSet/>
+      <dgm:spPr/>
+      <dgm:t>
+        <a:bodyPr/>
+        <a:lstStyle/>
+        <a:p>
+          <a:endParaRPr lang="fr-FR"/>
+        </a:p>
+      </dgm:t>
+    </dgm:pt>
+    <dgm:pt modelId="{DCE41F30-8A4B-4090-95D5-6CBD1CFA1EEC}">
+      <dgm:prSet phldrT="[Text]"/>
+      <dgm:spPr/>
+      <dgm:t>
+        <a:bodyPr/>
+        <a:lstStyle/>
+        <a:p>
+          <a:r>
+            <a:rPr lang="fr-FR" dirty="0" smtClean="0"/>
+            <a:t>W</a:t>
+          </a:r>
+          <a:endParaRPr lang="fr-FR" dirty="0"/>
+        </a:p>
+      </dgm:t>
+    </dgm:pt>
+    <dgm:pt modelId="{480265E7-8542-40B5-95A1-EC04B55B8C68}" type="parTrans" cxnId="{856CCC98-4D42-4940-9913-BB20C5217489}">
+      <dgm:prSet/>
+      <dgm:spPr/>
+      <dgm:t>
+        <a:bodyPr/>
+        <a:lstStyle/>
+        <a:p>
+          <a:endParaRPr lang="fr-FR"/>
+        </a:p>
+      </dgm:t>
+    </dgm:pt>
+    <dgm:pt modelId="{005E5E72-5BE1-4DC4-AD1C-48C242521B93}" type="sibTrans" cxnId="{856CCC98-4D42-4940-9913-BB20C5217489}">
+      <dgm:prSet/>
+      <dgm:spPr/>
+      <dgm:t>
+        <a:bodyPr/>
+        <a:lstStyle/>
+        <a:p>
+          <a:endParaRPr lang="fr-FR"/>
+        </a:p>
+      </dgm:t>
+    </dgm:pt>
+    <dgm:pt modelId="{1981BF8C-ABB4-462F-BD54-45D3229B3478}">
+      <dgm:prSet phldrT="[Text]"/>
+      <dgm:spPr/>
+      <dgm:t>
+        <a:bodyPr/>
+        <a:lstStyle/>
+        <a:p>
+          <a:r>
+            <a:rPr lang="fr-FR" dirty="0" smtClean="0"/>
+            <a:t>Deadlines courtes</a:t>
+          </a:r>
+          <a:endParaRPr lang="fr-FR" dirty="0"/>
+        </a:p>
+      </dgm:t>
+    </dgm:pt>
+    <dgm:pt modelId="{420AF548-7339-428B-B062-F64CBEBA21A3}" type="parTrans" cxnId="{2F545677-CE33-4761-99ED-0F7D3431F1B7}">
+      <dgm:prSet/>
+      <dgm:spPr/>
+      <dgm:t>
+        <a:bodyPr/>
+        <a:lstStyle/>
+        <a:p>
+          <a:endParaRPr lang="fr-FR"/>
+        </a:p>
+      </dgm:t>
+    </dgm:pt>
+    <dgm:pt modelId="{314ADFC2-8DB9-4517-A22A-D1F9C188BEE4}" type="sibTrans" cxnId="{2F545677-CE33-4761-99ED-0F7D3431F1B7}">
+      <dgm:prSet/>
+      <dgm:spPr/>
+      <dgm:t>
+        <a:bodyPr/>
+        <a:lstStyle/>
+        <a:p>
+          <a:endParaRPr lang="fr-FR"/>
+        </a:p>
+      </dgm:t>
+    </dgm:pt>
+    <dgm:pt modelId="{0916D3E2-7950-4B1E-A80A-B1A0DFE4D7BE}">
+      <dgm:prSet phldrT="[Text]"/>
+      <dgm:spPr/>
+      <dgm:t>
+        <a:bodyPr/>
+        <a:lstStyle/>
+        <a:p>
+          <a:r>
+            <a:rPr lang="fr-FR" dirty="0" smtClean="0"/>
+            <a:t>T</a:t>
+          </a:r>
+          <a:endParaRPr lang="fr-FR" dirty="0"/>
+        </a:p>
+      </dgm:t>
+    </dgm:pt>
+    <dgm:pt modelId="{78ED7DF1-7D14-4D64-A8E3-CBD6C30B03FB}" type="parTrans" cxnId="{A9B36F8A-C74B-47A9-B539-806F6BB77A1A}">
+      <dgm:prSet/>
+      <dgm:spPr/>
+      <dgm:t>
+        <a:bodyPr/>
+        <a:lstStyle/>
+        <a:p>
+          <a:endParaRPr lang="fr-FR"/>
+        </a:p>
+      </dgm:t>
+    </dgm:pt>
+    <dgm:pt modelId="{402F8436-663D-4DB8-A22F-0A8F501EB425}" type="sibTrans" cxnId="{A9B36F8A-C74B-47A9-B539-806F6BB77A1A}">
+      <dgm:prSet/>
+      <dgm:spPr/>
+      <dgm:t>
+        <a:bodyPr/>
+        <a:lstStyle/>
+        <a:p>
+          <a:endParaRPr lang="fr-FR"/>
+        </a:p>
+      </dgm:t>
+    </dgm:pt>
+    <dgm:pt modelId="{9B35DA45-8824-4EE3-89F0-3F4E07F980E3}">
+      <dgm:prSet phldrT="[Text]"/>
+      <dgm:spPr/>
+      <dgm:t>
+        <a:bodyPr/>
+        <a:lstStyle/>
+        <a:p>
+          <a:r>
+            <a:rPr lang="fr-FR" dirty="0" smtClean="0"/>
+            <a:t>Risque de forte demande (serveur)</a:t>
+          </a:r>
+          <a:endParaRPr lang="fr-FR" dirty="0"/>
+        </a:p>
+      </dgm:t>
+    </dgm:pt>
+    <dgm:pt modelId="{F26E0BCB-616E-4F5C-9212-B89461307743}" type="parTrans" cxnId="{08978BA1-AE5A-4DFF-A0C3-92D4A0078A98}">
+      <dgm:prSet/>
+      <dgm:spPr/>
+      <dgm:t>
+        <a:bodyPr/>
+        <a:lstStyle/>
+        <a:p>
+          <a:endParaRPr lang="fr-FR"/>
+        </a:p>
+      </dgm:t>
+    </dgm:pt>
+    <dgm:pt modelId="{6FFF208B-A136-4388-9736-DE2BA4AFD5AF}" type="sibTrans" cxnId="{08978BA1-AE5A-4DFF-A0C3-92D4A0078A98}">
+      <dgm:prSet/>
+      <dgm:spPr/>
+      <dgm:t>
+        <a:bodyPr/>
+        <a:lstStyle/>
+        <a:p>
+          <a:endParaRPr lang="fr-FR"/>
+        </a:p>
+      </dgm:t>
+    </dgm:pt>
+    <dgm:pt modelId="{8BEA78FF-204F-4428-9092-659961DC247C}">
+      <dgm:prSet phldrT="[Text]"/>
+      <dgm:spPr/>
+      <dgm:t>
+        <a:bodyPr/>
+        <a:lstStyle/>
+        <a:p>
+          <a:r>
+            <a:rPr lang="fr-FR" dirty="0" smtClean="0"/>
+            <a:t>O</a:t>
+          </a:r>
+          <a:endParaRPr lang="fr-FR" dirty="0"/>
+        </a:p>
+      </dgm:t>
+    </dgm:pt>
+    <dgm:pt modelId="{41090789-956B-42C9-B909-44B2D62666F5}" type="parTrans" cxnId="{A5D3F3DB-629E-46CD-AA76-C52C0C251A66}">
+      <dgm:prSet/>
+      <dgm:spPr/>
+      <dgm:t>
+        <a:bodyPr/>
+        <a:lstStyle/>
+        <a:p>
+          <a:endParaRPr lang="fr-FR"/>
+        </a:p>
+      </dgm:t>
+    </dgm:pt>
+    <dgm:pt modelId="{F0DB2DD3-51DB-4551-8E87-8440876EF808}" type="sibTrans" cxnId="{A5D3F3DB-629E-46CD-AA76-C52C0C251A66}">
+      <dgm:prSet/>
+      <dgm:spPr/>
+      <dgm:t>
+        <a:bodyPr/>
+        <a:lstStyle/>
+        <a:p>
+          <a:endParaRPr lang="fr-FR"/>
+        </a:p>
+      </dgm:t>
+    </dgm:pt>
+    <dgm:pt modelId="{49454F30-2B75-445A-845F-7473D893477D}">
+      <dgm:prSet phldrT="[Text]"/>
+      <dgm:spPr/>
+      <dgm:t>
+        <a:bodyPr/>
+        <a:lstStyle/>
+        <a:p>
+          <a:r>
+            <a:rPr lang="fr-FR" dirty="0" smtClean="0"/>
+            <a:t>Pas de compétition</a:t>
+          </a:r>
+          <a:endParaRPr lang="fr-FR" dirty="0"/>
+        </a:p>
+      </dgm:t>
+    </dgm:pt>
+    <dgm:pt modelId="{347F498C-146E-4A53-8576-856FB00E3649}" type="parTrans" cxnId="{6484E426-69AA-42DF-977B-A67A73203BD9}">
+      <dgm:prSet/>
+      <dgm:spPr/>
+      <dgm:t>
+        <a:bodyPr/>
+        <a:lstStyle/>
+        <a:p>
+          <a:endParaRPr lang="fr-FR"/>
+        </a:p>
+      </dgm:t>
+    </dgm:pt>
+    <dgm:pt modelId="{FAF60BDA-D885-4200-9740-D21B994BE362}" type="sibTrans" cxnId="{6484E426-69AA-42DF-977B-A67A73203BD9}">
+      <dgm:prSet/>
+      <dgm:spPr/>
+      <dgm:t>
+        <a:bodyPr/>
+        <a:lstStyle/>
+        <a:p>
+          <a:endParaRPr lang="fr-FR"/>
+        </a:p>
+      </dgm:t>
+    </dgm:pt>
+    <dgm:pt modelId="{21C7A246-DDB5-40DD-9118-CC4963BF878A}">
+      <dgm:prSet phldrT="[Text]"/>
+      <dgm:spPr/>
+      <dgm:t>
+        <a:bodyPr/>
+        <a:lstStyle/>
+        <a:p>
+          <a:r>
+            <a:rPr lang="fr-FR" dirty="0" smtClean="0"/>
+            <a:t>Accès à un expert</a:t>
+          </a:r>
+          <a:endParaRPr lang="fr-FR" dirty="0"/>
+        </a:p>
+      </dgm:t>
+    </dgm:pt>
+    <dgm:pt modelId="{CD9E23AD-A863-49AB-83BE-431D89C28AF8}" type="parTrans" cxnId="{5E45B507-1330-428C-A195-37581AAE5A63}">
+      <dgm:prSet/>
+      <dgm:spPr/>
+      <dgm:t>
+        <a:bodyPr/>
+        <a:lstStyle/>
+        <a:p>
+          <a:endParaRPr lang="fr-FR"/>
+        </a:p>
+      </dgm:t>
+    </dgm:pt>
+    <dgm:pt modelId="{9EFEBC15-1E66-4CAC-95AE-73B08C514600}" type="sibTrans" cxnId="{5E45B507-1330-428C-A195-37581AAE5A63}">
+      <dgm:prSet/>
+      <dgm:spPr/>
+      <dgm:t>
+        <a:bodyPr/>
+        <a:lstStyle/>
+        <a:p>
+          <a:endParaRPr lang="fr-FR"/>
+        </a:p>
+      </dgm:t>
+    </dgm:pt>
+    <dgm:pt modelId="{AE8D8FFF-9AF0-4B15-AF81-01A130F2BD02}">
+      <dgm:prSet phldrT="[Text]"/>
+      <dgm:spPr/>
+      <dgm:t>
+        <a:bodyPr/>
+        <a:lstStyle/>
+        <a:p>
+          <a:r>
+            <a:rPr lang="fr-FR" dirty="0" smtClean="0"/>
+            <a:t>Mauvaise documentation</a:t>
+          </a:r>
+          <a:endParaRPr lang="fr-FR" dirty="0"/>
+        </a:p>
+      </dgm:t>
+    </dgm:pt>
+    <dgm:pt modelId="{09A1B763-003F-4D1E-A0CA-D45779C90106}" type="parTrans" cxnId="{61191D9C-E95A-4D05-8EB5-50675A3F154F}">
+      <dgm:prSet/>
+      <dgm:spPr/>
+      <dgm:t>
+        <a:bodyPr/>
+        <a:lstStyle/>
+        <a:p>
+          <a:endParaRPr lang="fr-FR"/>
+        </a:p>
+      </dgm:t>
+    </dgm:pt>
+    <dgm:pt modelId="{16409495-689E-4EF6-90A7-12E4E2621B22}" type="sibTrans" cxnId="{61191D9C-E95A-4D05-8EB5-50675A3F154F}">
+      <dgm:prSet/>
+      <dgm:spPr/>
+      <dgm:t>
+        <a:bodyPr/>
+        <a:lstStyle/>
+        <a:p>
+          <a:endParaRPr lang="fr-FR"/>
+        </a:p>
+      </dgm:t>
+    </dgm:pt>
+    <dgm:pt modelId="{850DD825-7D08-4BBC-94B9-7E217910F9A2}">
+      <dgm:prSet phldrT="[Text]"/>
+      <dgm:spPr/>
+      <dgm:t>
+        <a:bodyPr/>
+        <a:lstStyle/>
+        <a:p>
+          <a:r>
+            <a:rPr lang="fr-FR" dirty="0" smtClean="0"/>
+            <a:t>Grande utilité</a:t>
+          </a:r>
+          <a:endParaRPr lang="fr-FR" dirty="0"/>
+        </a:p>
+      </dgm:t>
+    </dgm:pt>
+    <dgm:pt modelId="{D847AE72-61FF-43C4-BFB0-3E6EC0A79B26}" type="parTrans" cxnId="{5DC2DB55-F097-4294-8B9E-72B598743DA3}">
+      <dgm:prSet/>
+      <dgm:spPr/>
+      <dgm:t>
+        <a:bodyPr/>
+        <a:lstStyle/>
+        <a:p>
+          <a:endParaRPr lang="fr-FR"/>
+        </a:p>
+      </dgm:t>
+    </dgm:pt>
+    <dgm:pt modelId="{DD66B6EB-9ADC-44F2-A7C2-DA4869ECDFFE}" type="sibTrans" cxnId="{5DC2DB55-F097-4294-8B9E-72B598743DA3}">
+      <dgm:prSet/>
+      <dgm:spPr/>
+      <dgm:t>
+        <a:bodyPr/>
+        <a:lstStyle/>
+        <a:p>
+          <a:endParaRPr lang="fr-FR"/>
+        </a:p>
+      </dgm:t>
+    </dgm:pt>
+    <dgm:pt modelId="{7FF71154-70C1-47DE-91E2-5DB90307E807}">
+      <dgm:prSet phldrT="[Text]"/>
+      <dgm:spPr/>
+      <dgm:t>
+        <a:bodyPr/>
+        <a:lstStyle/>
+        <a:p>
+          <a:r>
+            <a:rPr lang="fr-FR" dirty="0" smtClean="0"/>
+            <a:t>Protection des données (temporaires)</a:t>
+          </a:r>
+          <a:endParaRPr lang="fr-FR" dirty="0"/>
+        </a:p>
+      </dgm:t>
+    </dgm:pt>
+    <dgm:pt modelId="{1B9722FC-C7C2-486D-BC7E-72CE34B24ADB}" type="parTrans" cxnId="{8117BD28-990A-4794-8E5A-2D49697F13CF}">
+      <dgm:prSet/>
+      <dgm:spPr/>
+      <dgm:t>
+        <a:bodyPr/>
+        <a:lstStyle/>
+        <a:p>
+          <a:endParaRPr lang="fr-FR"/>
+        </a:p>
+      </dgm:t>
+    </dgm:pt>
+    <dgm:pt modelId="{96E0472B-19D5-49CC-8E2D-2FF1A8F57871}" type="sibTrans" cxnId="{8117BD28-990A-4794-8E5A-2D49697F13CF}">
+      <dgm:prSet/>
+      <dgm:spPr/>
+      <dgm:t>
+        <a:bodyPr/>
+        <a:lstStyle/>
+        <a:p>
+          <a:endParaRPr lang="fr-FR"/>
+        </a:p>
+      </dgm:t>
+    </dgm:pt>
+    <dgm:pt modelId="{62885FA7-E7FB-4933-9935-6A8AA90289B4}">
+      <dgm:prSet phldrT="[Text]"/>
+      <dgm:spPr/>
+      <dgm:t>
+        <a:bodyPr/>
+        <a:lstStyle/>
+        <a:p>
+          <a:r>
+            <a:rPr lang="fr-FR" dirty="0" smtClean="0"/>
+            <a:t>Utilisation de package ‘open source ’</a:t>
+          </a:r>
+          <a:endParaRPr lang="fr-FR" dirty="0"/>
+        </a:p>
+      </dgm:t>
+    </dgm:pt>
+    <dgm:pt modelId="{9870B421-E3D6-4556-A843-2F0EDB4F207B}" type="parTrans" cxnId="{58755D72-6A8A-4181-8EB5-41F1412B480B}">
+      <dgm:prSet/>
+      <dgm:spPr/>
+      <dgm:t>
+        <a:bodyPr/>
+        <a:lstStyle/>
+        <a:p>
+          <a:endParaRPr lang="fr-FR"/>
+        </a:p>
+      </dgm:t>
+    </dgm:pt>
+    <dgm:pt modelId="{EB0831C9-645B-4C0B-8FAE-4F47D0F4E0C7}" type="sibTrans" cxnId="{58755D72-6A8A-4181-8EB5-41F1412B480B}">
+      <dgm:prSet/>
+      <dgm:spPr/>
+      <dgm:t>
+        <a:bodyPr/>
+        <a:lstStyle/>
+        <a:p>
+          <a:endParaRPr lang="fr-FR"/>
+        </a:p>
+      </dgm:t>
+    </dgm:pt>
+    <dgm:pt modelId="{39401A14-B365-4553-9A3D-A401D3183747}" type="pres">
+      <dgm:prSet presAssocID="{CC293B1C-4CF8-4FF0-BBC7-4942ED2D7F88}" presName="cycleMatrixDiagram" presStyleCnt="0">
+        <dgm:presLayoutVars>
+          <dgm:chMax val="1"/>
+          <dgm:dir/>
+          <dgm:animLvl val="lvl"/>
+          <dgm:resizeHandles val="exact"/>
+        </dgm:presLayoutVars>
+      </dgm:prSet>
+      <dgm:spPr/>
+      <dgm:t>
+        <a:bodyPr/>
+        <a:lstStyle/>
+        <a:p>
+          <a:endParaRPr lang="fr-FR"/>
+        </a:p>
+      </dgm:t>
+    </dgm:pt>
+    <dgm:pt modelId="{D7E58549-68A7-4F21-BF0D-84F7636DCD92}" type="pres">
+      <dgm:prSet presAssocID="{CC293B1C-4CF8-4FF0-BBC7-4942ED2D7F88}" presName="children" presStyleCnt="0"/>
+      <dgm:spPr/>
+    </dgm:pt>
+    <dgm:pt modelId="{5D458377-8CFE-43EB-BDF2-7CB3F0D876C1}" type="pres">
+      <dgm:prSet presAssocID="{CC293B1C-4CF8-4FF0-BBC7-4942ED2D7F88}" presName="child1group" presStyleCnt="0"/>
+      <dgm:spPr/>
+    </dgm:pt>
+    <dgm:pt modelId="{BC6F0824-1351-49BA-BADB-F02B71A91728}" type="pres">
+      <dgm:prSet presAssocID="{CC293B1C-4CF8-4FF0-BBC7-4942ED2D7F88}" presName="child1" presStyleLbl="bgAcc1" presStyleIdx="0" presStyleCnt="4"/>
+      <dgm:spPr/>
+      <dgm:t>
+        <a:bodyPr/>
+        <a:lstStyle/>
+        <a:p>
+          <a:endParaRPr lang="fr-FR"/>
+        </a:p>
+      </dgm:t>
+    </dgm:pt>
+    <dgm:pt modelId="{8128ED5B-798D-45C7-BB11-A0996A8BF223}" type="pres">
+      <dgm:prSet presAssocID="{CC293B1C-4CF8-4FF0-BBC7-4942ED2D7F88}" presName="child1Text" presStyleLbl="bgAcc1" presStyleIdx="0" presStyleCnt="4">
+        <dgm:presLayoutVars>
+          <dgm:bulletEnabled val="1"/>
+        </dgm:presLayoutVars>
+      </dgm:prSet>
+      <dgm:spPr/>
+      <dgm:t>
+        <a:bodyPr/>
+        <a:lstStyle/>
+        <a:p>
+          <a:endParaRPr lang="fr-FR"/>
+        </a:p>
+      </dgm:t>
+    </dgm:pt>
+    <dgm:pt modelId="{D1CAC0FF-E414-4230-81F1-48A389FCAA90}" type="pres">
+      <dgm:prSet presAssocID="{CC293B1C-4CF8-4FF0-BBC7-4942ED2D7F88}" presName="child2group" presStyleCnt="0"/>
+      <dgm:spPr/>
+    </dgm:pt>
+    <dgm:pt modelId="{05478942-E273-4856-8553-F0FD8F015AA2}" type="pres">
+      <dgm:prSet presAssocID="{CC293B1C-4CF8-4FF0-BBC7-4942ED2D7F88}" presName="child2" presStyleLbl="bgAcc1" presStyleIdx="1" presStyleCnt="4" custLinFactNeighborX="1745"/>
+      <dgm:spPr/>
+      <dgm:t>
+        <a:bodyPr/>
+        <a:lstStyle/>
+        <a:p>
+          <a:endParaRPr lang="fr-FR"/>
+        </a:p>
+      </dgm:t>
+    </dgm:pt>
+    <dgm:pt modelId="{FFCC9154-8E22-496A-ADF8-EA81D4AB5D77}" type="pres">
+      <dgm:prSet presAssocID="{CC293B1C-4CF8-4FF0-BBC7-4942ED2D7F88}" presName="child2Text" presStyleLbl="bgAcc1" presStyleIdx="1" presStyleCnt="4">
+        <dgm:presLayoutVars>
+          <dgm:bulletEnabled val="1"/>
+        </dgm:presLayoutVars>
+      </dgm:prSet>
+      <dgm:spPr/>
+      <dgm:t>
+        <a:bodyPr/>
+        <a:lstStyle/>
+        <a:p>
+          <a:endParaRPr lang="fr-FR"/>
+        </a:p>
+      </dgm:t>
+    </dgm:pt>
+    <dgm:pt modelId="{AC6B2FBF-7301-4489-8CBA-C72E325139A7}" type="pres">
+      <dgm:prSet presAssocID="{CC293B1C-4CF8-4FF0-BBC7-4942ED2D7F88}" presName="child3group" presStyleCnt="0"/>
+      <dgm:spPr/>
+    </dgm:pt>
+    <dgm:pt modelId="{68AC0C8C-6683-4490-8F38-983C8CB47C3F}" type="pres">
+      <dgm:prSet presAssocID="{CC293B1C-4CF8-4FF0-BBC7-4942ED2D7F88}" presName="child3" presStyleLbl="bgAcc1" presStyleIdx="2" presStyleCnt="4" custLinFactNeighborX="1745"/>
+      <dgm:spPr/>
+      <dgm:t>
+        <a:bodyPr/>
+        <a:lstStyle/>
+        <a:p>
+          <a:endParaRPr lang="fr-FR"/>
+        </a:p>
+      </dgm:t>
+    </dgm:pt>
+    <dgm:pt modelId="{60120B91-D76F-4101-857D-B9B656863593}" type="pres">
+      <dgm:prSet presAssocID="{CC293B1C-4CF8-4FF0-BBC7-4942ED2D7F88}" presName="child3Text" presStyleLbl="bgAcc1" presStyleIdx="2" presStyleCnt="4">
+        <dgm:presLayoutVars>
+          <dgm:bulletEnabled val="1"/>
+        </dgm:presLayoutVars>
+      </dgm:prSet>
+      <dgm:spPr/>
+      <dgm:t>
+        <a:bodyPr/>
+        <a:lstStyle/>
+        <a:p>
+          <a:endParaRPr lang="fr-FR"/>
+        </a:p>
+      </dgm:t>
+    </dgm:pt>
+    <dgm:pt modelId="{FE4735BA-FC16-4D11-8D7D-854C3BB49539}" type="pres">
+      <dgm:prSet presAssocID="{CC293B1C-4CF8-4FF0-BBC7-4942ED2D7F88}" presName="child4group" presStyleCnt="0"/>
+      <dgm:spPr/>
+    </dgm:pt>
+    <dgm:pt modelId="{431C4C2F-7F42-4D62-8EEF-918E7AD22EA0}" type="pres">
+      <dgm:prSet presAssocID="{CC293B1C-4CF8-4FF0-BBC7-4942ED2D7F88}" presName="child4" presStyleLbl="bgAcc1" presStyleIdx="3" presStyleCnt="4"/>
+      <dgm:spPr/>
+      <dgm:t>
+        <a:bodyPr/>
+        <a:lstStyle/>
+        <a:p>
+          <a:endParaRPr lang="fr-FR"/>
+        </a:p>
+      </dgm:t>
+    </dgm:pt>
+    <dgm:pt modelId="{53088BBF-CDFB-43AD-88FA-A16B4FDD4AEA}" type="pres">
+      <dgm:prSet presAssocID="{CC293B1C-4CF8-4FF0-BBC7-4942ED2D7F88}" presName="child4Text" presStyleLbl="bgAcc1" presStyleIdx="3" presStyleCnt="4">
+        <dgm:presLayoutVars>
+          <dgm:bulletEnabled val="1"/>
+        </dgm:presLayoutVars>
+      </dgm:prSet>
+      <dgm:spPr/>
+      <dgm:t>
+        <a:bodyPr/>
+        <a:lstStyle/>
+        <a:p>
+          <a:endParaRPr lang="fr-FR"/>
+        </a:p>
+      </dgm:t>
+    </dgm:pt>
+    <dgm:pt modelId="{4C71D571-69A8-40F3-850A-97D36405B4CD}" type="pres">
+      <dgm:prSet presAssocID="{CC293B1C-4CF8-4FF0-BBC7-4942ED2D7F88}" presName="childPlaceholder" presStyleCnt="0"/>
+      <dgm:spPr/>
+    </dgm:pt>
+    <dgm:pt modelId="{BFB0D660-5BF3-4B91-8837-C379A331C3C8}" type="pres">
+      <dgm:prSet presAssocID="{CC293B1C-4CF8-4FF0-BBC7-4942ED2D7F88}" presName="circle" presStyleCnt="0"/>
+      <dgm:spPr/>
+    </dgm:pt>
+    <dgm:pt modelId="{E72BDFA6-376E-4614-9D7C-A68241E884D9}" type="pres">
+      <dgm:prSet presAssocID="{CC293B1C-4CF8-4FF0-BBC7-4942ED2D7F88}" presName="quadrant1" presStyleLbl="node1" presStyleIdx="0" presStyleCnt="4">
+        <dgm:presLayoutVars>
+          <dgm:chMax val="1"/>
+          <dgm:bulletEnabled val="1"/>
+        </dgm:presLayoutVars>
+      </dgm:prSet>
+      <dgm:spPr/>
+      <dgm:t>
+        <a:bodyPr/>
+        <a:lstStyle/>
+        <a:p>
+          <a:endParaRPr lang="fr-FR"/>
+        </a:p>
+      </dgm:t>
+    </dgm:pt>
+    <dgm:pt modelId="{A67A60E5-5291-49E4-B3E5-53A58B528285}" type="pres">
+      <dgm:prSet presAssocID="{CC293B1C-4CF8-4FF0-BBC7-4942ED2D7F88}" presName="quadrant2" presStyleLbl="node1" presStyleIdx="1" presStyleCnt="4">
+        <dgm:presLayoutVars>
+          <dgm:chMax val="1"/>
+          <dgm:bulletEnabled val="1"/>
+        </dgm:presLayoutVars>
+      </dgm:prSet>
+      <dgm:spPr/>
+      <dgm:t>
+        <a:bodyPr/>
+        <a:lstStyle/>
+        <a:p>
+          <a:endParaRPr lang="fr-FR"/>
+        </a:p>
+      </dgm:t>
+    </dgm:pt>
+    <dgm:pt modelId="{CF4FC7F6-A89C-4633-A10E-BFE92B369DCD}" type="pres">
+      <dgm:prSet presAssocID="{CC293B1C-4CF8-4FF0-BBC7-4942ED2D7F88}" presName="quadrant3" presStyleLbl="node1" presStyleIdx="2" presStyleCnt="4">
+        <dgm:presLayoutVars>
+          <dgm:chMax val="1"/>
+          <dgm:bulletEnabled val="1"/>
+        </dgm:presLayoutVars>
+      </dgm:prSet>
+      <dgm:spPr/>
+      <dgm:t>
+        <a:bodyPr/>
+        <a:lstStyle/>
+        <a:p>
+          <a:endParaRPr lang="fr-FR"/>
+        </a:p>
+      </dgm:t>
+    </dgm:pt>
+    <dgm:pt modelId="{C0852406-3DC0-4222-A1F8-184593FC4596}" type="pres">
+      <dgm:prSet presAssocID="{CC293B1C-4CF8-4FF0-BBC7-4942ED2D7F88}" presName="quadrant4" presStyleLbl="node1" presStyleIdx="3" presStyleCnt="4">
+        <dgm:presLayoutVars>
+          <dgm:chMax val="1"/>
+          <dgm:bulletEnabled val="1"/>
+        </dgm:presLayoutVars>
+      </dgm:prSet>
+      <dgm:spPr/>
+      <dgm:t>
+        <a:bodyPr/>
+        <a:lstStyle/>
+        <a:p>
+          <a:endParaRPr lang="fr-FR"/>
+        </a:p>
+      </dgm:t>
+    </dgm:pt>
+    <dgm:pt modelId="{B569151F-8995-4BD7-A8F3-A948642763E3}" type="pres">
+      <dgm:prSet presAssocID="{CC293B1C-4CF8-4FF0-BBC7-4942ED2D7F88}" presName="quadrantPlaceholder" presStyleCnt="0"/>
+      <dgm:spPr/>
+    </dgm:pt>
+    <dgm:pt modelId="{3B6382B4-DDDF-482E-9E6A-38E6F7DB930C}" type="pres">
+      <dgm:prSet presAssocID="{CC293B1C-4CF8-4FF0-BBC7-4942ED2D7F88}" presName="center1" presStyleLbl="fgShp" presStyleIdx="0" presStyleCnt="2" custLinFactX="200000" custLinFactNeighborX="212984" custLinFactNeighborY="2649"/>
+      <dgm:spPr>
+        <a:solidFill>
+          <a:schemeClr val="accent2">
+            <a:tint val="40000"/>
+            <a:hueOff val="0"/>
+            <a:satOff val="0"/>
+            <a:lumOff val="0"/>
+            <a:alpha val="0"/>
+          </a:schemeClr>
+        </a:solidFill>
+      </dgm:spPr>
+    </dgm:pt>
+    <dgm:pt modelId="{72B333DC-EBE8-4650-A713-61338E0F2C2D}" type="pres">
+      <dgm:prSet presAssocID="{CC293B1C-4CF8-4FF0-BBC7-4942ED2D7F88}" presName="center2" presStyleLbl="fgShp" presStyleIdx="1" presStyleCnt="2" custLinFactX="200000" custLinFactNeighborX="212984" custLinFactNeighborY="-21193"/>
+      <dgm:spPr>
+        <a:solidFill>
+          <a:schemeClr val="accent2">
+            <a:tint val="40000"/>
+            <a:hueOff val="0"/>
+            <a:satOff val="0"/>
+            <a:lumOff val="0"/>
+            <a:alpha val="0"/>
+          </a:schemeClr>
+        </a:solidFill>
+      </dgm:spPr>
+    </dgm:pt>
+  </dgm:ptLst>
+  <dgm:cxnLst>
+    <dgm:cxn modelId="{5D3D82E0-098A-4400-B283-F6932D5BC222}" type="presOf" srcId="{35F1F2D2-FC47-4990-98DB-731AFE036343}" destId="{BC6F0824-1351-49BA-BADB-F02B71A91728}" srcOrd="0" destOrd="0" presId="urn:microsoft.com/office/officeart/2005/8/layout/cycle4"/>
+    <dgm:cxn modelId="{927C1C4D-5978-4600-B0E5-D78AF4871066}" type="presOf" srcId="{AE8D8FFF-9AF0-4B15-AF81-01A130F2BD02}" destId="{05478942-E273-4856-8553-F0FD8F015AA2}" srcOrd="0" destOrd="1" presId="urn:microsoft.com/office/officeart/2005/8/layout/cycle4"/>
+    <dgm:cxn modelId="{2F545677-CE33-4761-99ED-0F7D3431F1B7}" srcId="{DCE41F30-8A4B-4090-95D5-6CBD1CFA1EEC}" destId="{1981BF8C-ABB4-462F-BD54-45D3229B3478}" srcOrd="0" destOrd="0" parTransId="{420AF548-7339-428B-B062-F64CBEBA21A3}" sibTransId="{314ADFC2-8DB9-4517-A22A-D1F9C188BEE4}"/>
+    <dgm:cxn modelId="{68EB3306-BAA9-4520-8414-C5CCC9AE718D}" type="presOf" srcId="{49454F30-2B75-445A-845F-7473D893477D}" destId="{53088BBF-CDFB-43AD-88FA-A16B4FDD4AEA}" srcOrd="1" destOrd="0" presId="urn:microsoft.com/office/officeart/2005/8/layout/cycle4"/>
+    <dgm:cxn modelId="{A70D34B5-3E4F-4217-8893-8F366C8231F7}" type="presOf" srcId="{9B35DA45-8824-4EE3-89F0-3F4E07F980E3}" destId="{68AC0C8C-6683-4490-8F38-983C8CB47C3F}" srcOrd="0" destOrd="0" presId="urn:microsoft.com/office/officeart/2005/8/layout/cycle4"/>
+    <dgm:cxn modelId="{6484E426-69AA-42DF-977B-A67A73203BD9}" srcId="{8BEA78FF-204F-4428-9092-659961DC247C}" destId="{49454F30-2B75-445A-845F-7473D893477D}" srcOrd="0" destOrd="0" parTransId="{347F498C-146E-4A53-8576-856FB00E3649}" sibTransId="{FAF60BDA-D885-4200-9740-D21B994BE362}"/>
+    <dgm:cxn modelId="{F3DC86B6-474F-4BE6-A324-3FE9F9B8844A}" srcId="{CC293B1C-4CF8-4FF0-BBC7-4942ED2D7F88}" destId="{8FEE133A-1A79-4187-9AFD-4F06B42A70BC}" srcOrd="0" destOrd="0" parTransId="{7D947A46-F0B2-4D95-921D-7768A2A81535}" sibTransId="{A16446F1-3DF9-49B1-92C9-2E546FABE218}"/>
+    <dgm:cxn modelId="{D1B91FE5-926E-4086-A056-630C475EA7CE}" type="presOf" srcId="{7FF71154-70C1-47DE-91E2-5DB90307E807}" destId="{60120B91-D76F-4101-857D-B9B656863593}" srcOrd="1" destOrd="1" presId="urn:microsoft.com/office/officeart/2005/8/layout/cycle4"/>
+    <dgm:cxn modelId="{3DC5B4B9-5CAD-4079-B48F-4802CF0B2314}" type="presOf" srcId="{CC293B1C-4CF8-4FF0-BBC7-4942ED2D7F88}" destId="{39401A14-B365-4553-9A3D-A401D3183747}" srcOrd="0" destOrd="0" presId="urn:microsoft.com/office/officeart/2005/8/layout/cycle4"/>
+    <dgm:cxn modelId="{EAB8A8AE-B22F-4614-BE80-3386D210780E}" type="presOf" srcId="{DCE41F30-8A4B-4090-95D5-6CBD1CFA1EEC}" destId="{A67A60E5-5291-49E4-B3E5-53A58B528285}" srcOrd="0" destOrd="0" presId="urn:microsoft.com/office/officeart/2005/8/layout/cycle4"/>
+    <dgm:cxn modelId="{58431C9F-B948-479B-9D2A-0D4719C797F8}" type="presOf" srcId="{49454F30-2B75-445A-845F-7473D893477D}" destId="{431C4C2F-7F42-4D62-8EEF-918E7AD22EA0}" srcOrd="0" destOrd="0" presId="urn:microsoft.com/office/officeart/2005/8/layout/cycle4"/>
+    <dgm:cxn modelId="{BC53C9B5-35A7-4DF0-BAFC-7B8DD2618300}" type="presOf" srcId="{AE8D8FFF-9AF0-4B15-AF81-01A130F2BD02}" destId="{FFCC9154-8E22-496A-ADF8-EA81D4AB5D77}" srcOrd="1" destOrd="1" presId="urn:microsoft.com/office/officeart/2005/8/layout/cycle4"/>
+    <dgm:cxn modelId="{9D77BCDF-6FAA-4210-B583-AE554C94A421}" type="presOf" srcId="{0916D3E2-7950-4B1E-A80A-B1A0DFE4D7BE}" destId="{CF4FC7F6-A89C-4633-A10E-BFE92B369DCD}" srcOrd="0" destOrd="0" presId="urn:microsoft.com/office/officeart/2005/8/layout/cycle4"/>
+    <dgm:cxn modelId="{5DC2DB55-F097-4294-8B9E-72B598743DA3}" srcId="{8BEA78FF-204F-4428-9092-659961DC247C}" destId="{850DD825-7D08-4BBC-94B9-7E217910F9A2}" srcOrd="1" destOrd="0" parTransId="{D847AE72-61FF-43C4-BFB0-3E6EC0A79B26}" sibTransId="{DD66B6EB-9ADC-44F2-A7C2-DA4869ECDFFE}"/>
+    <dgm:cxn modelId="{B5C2C872-3D3F-442D-8AD6-E68A3B250752}" type="presOf" srcId="{62885FA7-E7FB-4933-9935-6A8AA90289B4}" destId="{BC6F0824-1351-49BA-BADB-F02B71A91728}" srcOrd="0" destOrd="2" presId="urn:microsoft.com/office/officeart/2005/8/layout/cycle4"/>
+    <dgm:cxn modelId="{5E45B507-1330-428C-A195-37581AAE5A63}" srcId="{8FEE133A-1A79-4187-9AFD-4F06B42A70BC}" destId="{21C7A246-DDB5-40DD-9118-CC4963BF878A}" srcOrd="1" destOrd="0" parTransId="{CD9E23AD-A863-49AB-83BE-431D89C28AF8}" sibTransId="{9EFEBC15-1E66-4CAC-95AE-73B08C514600}"/>
+    <dgm:cxn modelId="{A9B36F8A-C74B-47A9-B539-806F6BB77A1A}" srcId="{CC293B1C-4CF8-4FF0-BBC7-4942ED2D7F88}" destId="{0916D3E2-7950-4B1E-A80A-B1A0DFE4D7BE}" srcOrd="2" destOrd="0" parTransId="{78ED7DF1-7D14-4D64-A8E3-CBD6C30B03FB}" sibTransId="{402F8436-663D-4DB8-A22F-0A8F501EB425}"/>
+    <dgm:cxn modelId="{5DD623FF-A7F3-4230-A586-C5FA76FF6EB9}" type="presOf" srcId="{850DD825-7D08-4BBC-94B9-7E217910F9A2}" destId="{431C4C2F-7F42-4D62-8EEF-918E7AD22EA0}" srcOrd="0" destOrd="1" presId="urn:microsoft.com/office/officeart/2005/8/layout/cycle4"/>
+    <dgm:cxn modelId="{81C0834A-178F-4E1A-BAAD-46532AABFF48}" type="presOf" srcId="{7FF71154-70C1-47DE-91E2-5DB90307E807}" destId="{68AC0C8C-6683-4490-8F38-983C8CB47C3F}" srcOrd="0" destOrd="1" presId="urn:microsoft.com/office/officeart/2005/8/layout/cycle4"/>
+    <dgm:cxn modelId="{5F7AD9D5-E7E6-4F46-A4C5-3A0CE6F62C8E}" srcId="{8FEE133A-1A79-4187-9AFD-4F06B42A70BC}" destId="{35F1F2D2-FC47-4990-98DB-731AFE036343}" srcOrd="0" destOrd="0" parTransId="{D8C3661F-62F4-45E8-BB01-35BAAF924AEB}" sibTransId="{4EFE689A-014D-4F95-82DA-3254DF013F6C}"/>
+    <dgm:cxn modelId="{58755D72-6A8A-4181-8EB5-41F1412B480B}" srcId="{8FEE133A-1A79-4187-9AFD-4F06B42A70BC}" destId="{62885FA7-E7FB-4933-9935-6A8AA90289B4}" srcOrd="2" destOrd="0" parTransId="{9870B421-E3D6-4556-A843-2F0EDB4F207B}" sibTransId="{EB0831C9-645B-4C0B-8FAE-4F47D0F4E0C7}"/>
+    <dgm:cxn modelId="{A1E5E730-D945-4433-AF16-2B3B5B599C26}" type="presOf" srcId="{850DD825-7D08-4BBC-94B9-7E217910F9A2}" destId="{53088BBF-CDFB-43AD-88FA-A16B4FDD4AEA}" srcOrd="1" destOrd="1" presId="urn:microsoft.com/office/officeart/2005/8/layout/cycle4"/>
+    <dgm:cxn modelId="{33156128-606A-471A-810C-1E857893599D}" type="presOf" srcId="{1981BF8C-ABB4-462F-BD54-45D3229B3478}" destId="{FFCC9154-8E22-496A-ADF8-EA81D4AB5D77}" srcOrd="1" destOrd="0" presId="urn:microsoft.com/office/officeart/2005/8/layout/cycle4"/>
+    <dgm:cxn modelId="{E011C062-FF3D-4C8C-8A07-E22BA2EF2E78}" type="presOf" srcId="{8BEA78FF-204F-4428-9092-659961DC247C}" destId="{C0852406-3DC0-4222-A1F8-184593FC4596}" srcOrd="0" destOrd="0" presId="urn:microsoft.com/office/officeart/2005/8/layout/cycle4"/>
+    <dgm:cxn modelId="{57FFE935-7C68-41F3-B814-6258094D6E68}" type="presOf" srcId="{9B35DA45-8824-4EE3-89F0-3F4E07F980E3}" destId="{60120B91-D76F-4101-857D-B9B656863593}" srcOrd="1" destOrd="0" presId="urn:microsoft.com/office/officeart/2005/8/layout/cycle4"/>
+    <dgm:cxn modelId="{856CCC98-4D42-4940-9913-BB20C5217489}" srcId="{CC293B1C-4CF8-4FF0-BBC7-4942ED2D7F88}" destId="{DCE41F30-8A4B-4090-95D5-6CBD1CFA1EEC}" srcOrd="1" destOrd="0" parTransId="{480265E7-8542-40B5-95A1-EC04B55B8C68}" sibTransId="{005E5E72-5BE1-4DC4-AD1C-48C242521B93}"/>
+    <dgm:cxn modelId="{8DFCCAD4-12A3-4207-8950-42C286E95802}" type="presOf" srcId="{21C7A246-DDB5-40DD-9118-CC4963BF878A}" destId="{8128ED5B-798D-45C7-BB11-A0996A8BF223}" srcOrd="1" destOrd="1" presId="urn:microsoft.com/office/officeart/2005/8/layout/cycle4"/>
+    <dgm:cxn modelId="{08978BA1-AE5A-4DFF-A0C3-92D4A0078A98}" srcId="{0916D3E2-7950-4B1E-A80A-B1A0DFE4D7BE}" destId="{9B35DA45-8824-4EE3-89F0-3F4E07F980E3}" srcOrd="0" destOrd="0" parTransId="{F26E0BCB-616E-4F5C-9212-B89461307743}" sibTransId="{6FFF208B-A136-4388-9736-DE2BA4AFD5AF}"/>
+    <dgm:cxn modelId="{8117BD28-990A-4794-8E5A-2D49697F13CF}" srcId="{0916D3E2-7950-4B1E-A80A-B1A0DFE4D7BE}" destId="{7FF71154-70C1-47DE-91E2-5DB90307E807}" srcOrd="1" destOrd="0" parTransId="{1B9722FC-C7C2-486D-BC7E-72CE34B24ADB}" sibTransId="{96E0472B-19D5-49CC-8E2D-2FF1A8F57871}"/>
+    <dgm:cxn modelId="{46C12A50-2ECA-41C5-8E9E-F537C6E2FE58}" type="presOf" srcId="{1981BF8C-ABB4-462F-BD54-45D3229B3478}" destId="{05478942-E273-4856-8553-F0FD8F015AA2}" srcOrd="0" destOrd="0" presId="urn:microsoft.com/office/officeart/2005/8/layout/cycle4"/>
+    <dgm:cxn modelId="{A5D3F3DB-629E-46CD-AA76-C52C0C251A66}" srcId="{CC293B1C-4CF8-4FF0-BBC7-4942ED2D7F88}" destId="{8BEA78FF-204F-4428-9092-659961DC247C}" srcOrd="3" destOrd="0" parTransId="{41090789-956B-42C9-B909-44B2D62666F5}" sibTransId="{F0DB2DD3-51DB-4551-8E87-8440876EF808}"/>
+    <dgm:cxn modelId="{61191D9C-E95A-4D05-8EB5-50675A3F154F}" srcId="{DCE41F30-8A4B-4090-95D5-6CBD1CFA1EEC}" destId="{AE8D8FFF-9AF0-4B15-AF81-01A130F2BD02}" srcOrd="1" destOrd="0" parTransId="{09A1B763-003F-4D1E-A0CA-D45779C90106}" sibTransId="{16409495-689E-4EF6-90A7-12E4E2621B22}"/>
+    <dgm:cxn modelId="{D02AD4B9-2FAF-4A23-BBB0-DA6C5DD5ADA3}" type="presOf" srcId="{21C7A246-DDB5-40DD-9118-CC4963BF878A}" destId="{BC6F0824-1351-49BA-BADB-F02B71A91728}" srcOrd="0" destOrd="1" presId="urn:microsoft.com/office/officeart/2005/8/layout/cycle4"/>
+    <dgm:cxn modelId="{77B5CBF9-9D99-4A49-B1B0-852D2664F788}" type="presOf" srcId="{8FEE133A-1A79-4187-9AFD-4F06B42A70BC}" destId="{E72BDFA6-376E-4614-9D7C-A68241E884D9}" srcOrd="0" destOrd="0" presId="urn:microsoft.com/office/officeart/2005/8/layout/cycle4"/>
+    <dgm:cxn modelId="{5760B030-8317-49EE-888A-EAF3AD87D1B3}" type="presOf" srcId="{35F1F2D2-FC47-4990-98DB-731AFE036343}" destId="{8128ED5B-798D-45C7-BB11-A0996A8BF223}" srcOrd="1" destOrd="0" presId="urn:microsoft.com/office/officeart/2005/8/layout/cycle4"/>
+    <dgm:cxn modelId="{D817C6F3-CE5D-4631-9C66-E40C7740C4E1}" type="presOf" srcId="{62885FA7-E7FB-4933-9935-6A8AA90289B4}" destId="{8128ED5B-798D-45C7-BB11-A0996A8BF223}" srcOrd="1" destOrd="2" presId="urn:microsoft.com/office/officeart/2005/8/layout/cycle4"/>
+    <dgm:cxn modelId="{AA8AA88A-5015-4450-9A11-84EB6F6338E3}" type="presParOf" srcId="{39401A14-B365-4553-9A3D-A401D3183747}" destId="{D7E58549-68A7-4F21-BF0D-84F7636DCD92}" srcOrd="0" destOrd="0" presId="urn:microsoft.com/office/officeart/2005/8/layout/cycle4"/>
+    <dgm:cxn modelId="{AA993D7F-DA56-4C8F-B23E-5F32AA338FDD}" type="presParOf" srcId="{D7E58549-68A7-4F21-BF0D-84F7636DCD92}" destId="{5D458377-8CFE-43EB-BDF2-7CB3F0D876C1}" srcOrd="0" destOrd="0" presId="urn:microsoft.com/office/officeart/2005/8/layout/cycle4"/>
+    <dgm:cxn modelId="{5698769F-A5F9-43C4-BC81-22E58C97F05A}" type="presParOf" srcId="{5D458377-8CFE-43EB-BDF2-7CB3F0D876C1}" destId="{BC6F0824-1351-49BA-BADB-F02B71A91728}" srcOrd="0" destOrd="0" presId="urn:microsoft.com/office/officeart/2005/8/layout/cycle4"/>
+    <dgm:cxn modelId="{06629B90-729E-4F9D-B629-B8D5EF92EFE4}" type="presParOf" srcId="{5D458377-8CFE-43EB-BDF2-7CB3F0D876C1}" destId="{8128ED5B-798D-45C7-BB11-A0996A8BF223}" srcOrd="1" destOrd="0" presId="urn:microsoft.com/office/officeart/2005/8/layout/cycle4"/>
+    <dgm:cxn modelId="{A43FFDA5-B3B3-4902-830B-76265B25401B}" type="presParOf" srcId="{D7E58549-68A7-4F21-BF0D-84F7636DCD92}" destId="{D1CAC0FF-E414-4230-81F1-48A389FCAA90}" srcOrd="1" destOrd="0" presId="urn:microsoft.com/office/officeart/2005/8/layout/cycle4"/>
+    <dgm:cxn modelId="{6405BB58-F7D3-4510-9ABA-E3043B082DD5}" type="presParOf" srcId="{D1CAC0FF-E414-4230-81F1-48A389FCAA90}" destId="{05478942-E273-4856-8553-F0FD8F015AA2}" srcOrd="0" destOrd="0" presId="urn:microsoft.com/office/officeart/2005/8/layout/cycle4"/>
+    <dgm:cxn modelId="{739C3A55-8950-4D08-A147-776E0F6AE9C0}" type="presParOf" srcId="{D1CAC0FF-E414-4230-81F1-48A389FCAA90}" destId="{FFCC9154-8E22-496A-ADF8-EA81D4AB5D77}" srcOrd="1" destOrd="0" presId="urn:microsoft.com/office/officeart/2005/8/layout/cycle4"/>
+    <dgm:cxn modelId="{AB12E13A-D243-4F7B-890E-7031F002B785}" type="presParOf" srcId="{D7E58549-68A7-4F21-BF0D-84F7636DCD92}" destId="{AC6B2FBF-7301-4489-8CBA-C72E325139A7}" srcOrd="2" destOrd="0" presId="urn:microsoft.com/office/officeart/2005/8/layout/cycle4"/>
+    <dgm:cxn modelId="{AFFA4BDE-5941-4305-BB8B-64F2BDE7A578}" type="presParOf" srcId="{AC6B2FBF-7301-4489-8CBA-C72E325139A7}" destId="{68AC0C8C-6683-4490-8F38-983C8CB47C3F}" srcOrd="0" destOrd="0" presId="urn:microsoft.com/office/officeart/2005/8/layout/cycle4"/>
+    <dgm:cxn modelId="{64926025-B563-42D0-B439-E45C459D66C6}" type="presParOf" srcId="{AC6B2FBF-7301-4489-8CBA-C72E325139A7}" destId="{60120B91-D76F-4101-857D-B9B656863593}" srcOrd="1" destOrd="0" presId="urn:microsoft.com/office/officeart/2005/8/layout/cycle4"/>
+    <dgm:cxn modelId="{29D23AB0-30B5-42C7-92B5-625730ADDB8D}" type="presParOf" srcId="{D7E58549-68A7-4F21-BF0D-84F7636DCD92}" destId="{FE4735BA-FC16-4D11-8D7D-854C3BB49539}" srcOrd="3" destOrd="0" presId="urn:microsoft.com/office/officeart/2005/8/layout/cycle4"/>
+    <dgm:cxn modelId="{0B2FD93A-F788-4416-BBBF-7C4A776A82AF}" type="presParOf" srcId="{FE4735BA-FC16-4D11-8D7D-854C3BB49539}" destId="{431C4C2F-7F42-4D62-8EEF-918E7AD22EA0}" srcOrd="0" destOrd="0" presId="urn:microsoft.com/office/officeart/2005/8/layout/cycle4"/>
+    <dgm:cxn modelId="{EF0876F1-6E45-4B8D-AF4F-F53F04A90A82}" type="presParOf" srcId="{FE4735BA-FC16-4D11-8D7D-854C3BB49539}" destId="{53088BBF-CDFB-43AD-88FA-A16B4FDD4AEA}" srcOrd="1" destOrd="0" presId="urn:microsoft.com/office/officeart/2005/8/layout/cycle4"/>
+    <dgm:cxn modelId="{2A73C3D8-8B1E-4D2E-9079-E3EBFCAE715F}" type="presParOf" srcId="{D7E58549-68A7-4F21-BF0D-84F7636DCD92}" destId="{4C71D571-69A8-40F3-850A-97D36405B4CD}" srcOrd="4" destOrd="0" presId="urn:microsoft.com/office/officeart/2005/8/layout/cycle4"/>
+    <dgm:cxn modelId="{CD78B3F2-2BD6-4411-8A15-4EAC763478B3}" type="presParOf" srcId="{39401A14-B365-4553-9A3D-A401D3183747}" destId="{BFB0D660-5BF3-4B91-8837-C379A331C3C8}" srcOrd="1" destOrd="0" presId="urn:microsoft.com/office/officeart/2005/8/layout/cycle4"/>
+    <dgm:cxn modelId="{9F13B1CE-C608-409D-B49F-00A00B6406FF}" type="presParOf" srcId="{BFB0D660-5BF3-4B91-8837-C379A331C3C8}" destId="{E72BDFA6-376E-4614-9D7C-A68241E884D9}" srcOrd="0" destOrd="0" presId="urn:microsoft.com/office/officeart/2005/8/layout/cycle4"/>
+    <dgm:cxn modelId="{63DD4EEA-E347-4C15-943E-260344F7C2B3}" type="presParOf" srcId="{BFB0D660-5BF3-4B91-8837-C379A331C3C8}" destId="{A67A60E5-5291-49E4-B3E5-53A58B528285}" srcOrd="1" destOrd="0" presId="urn:microsoft.com/office/officeart/2005/8/layout/cycle4"/>
+    <dgm:cxn modelId="{C4DA6099-9800-4D2F-8DA0-0EE8995383F3}" type="presParOf" srcId="{BFB0D660-5BF3-4B91-8837-C379A331C3C8}" destId="{CF4FC7F6-A89C-4633-A10E-BFE92B369DCD}" srcOrd="2" destOrd="0" presId="urn:microsoft.com/office/officeart/2005/8/layout/cycle4"/>
+    <dgm:cxn modelId="{87A7AA33-1265-4FCD-8CD9-CBF6D0415B0F}" type="presParOf" srcId="{BFB0D660-5BF3-4B91-8837-C379A331C3C8}" destId="{C0852406-3DC0-4222-A1F8-184593FC4596}" srcOrd="3" destOrd="0" presId="urn:microsoft.com/office/officeart/2005/8/layout/cycle4"/>
+    <dgm:cxn modelId="{A3BBB758-7503-4F0A-8817-395FCA75B3D0}" type="presParOf" srcId="{BFB0D660-5BF3-4B91-8837-C379A331C3C8}" destId="{B569151F-8995-4BD7-A8F3-A948642763E3}" srcOrd="4" destOrd="0" presId="urn:microsoft.com/office/officeart/2005/8/layout/cycle4"/>
+    <dgm:cxn modelId="{99A33C35-398B-4D0D-AE3F-82CF42132592}" type="presParOf" srcId="{39401A14-B365-4553-9A3D-A401D3183747}" destId="{3B6382B4-DDDF-482E-9E6A-38E6F7DB930C}" srcOrd="2" destOrd="0" presId="urn:microsoft.com/office/officeart/2005/8/layout/cycle4"/>
+    <dgm:cxn modelId="{B8B45408-16F5-4C61-8CB2-7AE4E9FA9640}" type="presParOf" srcId="{39401A14-B365-4553-9A3D-A401D3183747}" destId="{72B333DC-EBE8-4650-A713-61338E0F2C2D}" srcOrd="3" destOrd="0" presId="urn:microsoft.com/office/officeart/2005/8/layout/cycle4"/>
   </dgm:cxnLst>
   <dgm:bg/>
   <dgm:whole/>
@@ -2231,37 +3979,6 @@
           </a:r>
           <a:endParaRPr lang="fr-FR" sz="1400" kern="1200" dirty="0"/>
         </a:p>
-        <a:p>
-          <a:pPr marL="114300" lvl="1" indent="-114300" algn="l" defTabSz="622300">
-            <a:lnSpc>
-              <a:spcPct val="90000"/>
-            </a:lnSpc>
-            <a:spcBef>
-              <a:spcPct val="0"/>
-            </a:spcBef>
-            <a:spcAft>
-              <a:spcPct val="15000"/>
-            </a:spcAft>
-            <a:buChar char="••"/>
-          </a:pPr>
-          <a:r>
-            <a:rPr lang="fr-FR" sz="1400" kern="1200" dirty="0" smtClean="0"/>
-            <a:t>Server </a:t>
-          </a:r>
-          <a:r>
-            <a:rPr lang="fr-FR" sz="1400" kern="1200" dirty="0" err="1" smtClean="0"/>
-            <a:t>access</a:t>
-          </a:r>
-          <a:r>
-            <a:rPr lang="fr-FR" sz="1400" kern="1200" dirty="0" smtClean="0"/>
-            <a:t> </a:t>
-          </a:r>
-          <a:r>
-            <a:rPr lang="fr-FR" sz="1400" kern="1200" dirty="0" err="1" smtClean="0"/>
-            <a:t>rights</a:t>
-          </a:r>
-          <a:endParaRPr lang="fr-FR" sz="1400" kern="1200" dirty="0"/>
-        </a:p>
       </dsp:txBody>
       <dsp:txXfrm>
         <a:off x="5797159" y="38090"/>
@@ -2398,6 +4115,1001 @@
             <a:t>Open source packages</a:t>
           </a:r>
           <a:endParaRPr lang="fr-FR" sz="1400" kern="1200" dirty="0"/>
+        </a:p>
+      </dsp:txBody>
+      <dsp:txXfrm>
+        <a:off x="579956" y="38090"/>
+        <a:ext cx="1797595" cy="1224300"/>
+      </dsp:txXfrm>
+    </dsp:sp>
+    <dsp:sp modelId="{E72BDFA6-376E-4614-9D7C-A68241E884D9}">
+      <dsp:nvSpPr>
+        <dsp:cNvPr id="0" name=""/>
+        <dsp:cNvSpPr/>
+      </dsp:nvSpPr>
+      <dsp:spPr>
+        <a:xfrm>
+          <a:off x="1663530" y="308864"/>
+          <a:ext cx="2346282" cy="2346282"/>
+        </a:xfrm>
+        <a:prstGeom prst="pieWedge">
+          <a:avLst/>
+        </a:prstGeom>
+        <a:gradFill rotWithShape="0">
+          <a:gsLst>
+            <a:gs pos="0">
+              <a:schemeClr val="accent2">
+                <a:hueOff val="0"/>
+                <a:satOff val="0"/>
+                <a:lumOff val="0"/>
+                <a:alphaOff val="0"/>
+                <a:satMod val="103000"/>
+                <a:lumMod val="102000"/>
+                <a:tint val="94000"/>
+              </a:schemeClr>
+            </a:gs>
+            <a:gs pos="50000">
+              <a:schemeClr val="accent2">
+                <a:hueOff val="0"/>
+                <a:satOff val="0"/>
+                <a:lumOff val="0"/>
+                <a:alphaOff val="0"/>
+                <a:satMod val="110000"/>
+                <a:lumMod val="100000"/>
+                <a:shade val="100000"/>
+              </a:schemeClr>
+            </a:gs>
+            <a:gs pos="100000">
+              <a:schemeClr val="accent2">
+                <a:hueOff val="0"/>
+                <a:satOff val="0"/>
+                <a:lumOff val="0"/>
+                <a:alphaOff val="0"/>
+                <a:lumMod val="99000"/>
+                <a:satMod val="120000"/>
+                <a:shade val="78000"/>
+              </a:schemeClr>
+            </a:gs>
+          </a:gsLst>
+          <a:lin ang="5400000" scaled="0"/>
+        </a:gradFill>
+        <a:ln>
+          <a:noFill/>
+        </a:ln>
+        <a:effectLst/>
+        <a:scene3d>
+          <a:camera prst="orthographicFront"/>
+          <a:lightRig rig="flat" dir="t"/>
+        </a:scene3d>
+        <a:sp3d prstMaterial="plastic">
+          <a:bevelT w="120900" h="88900"/>
+          <a:bevelB w="88900" h="31750" prst="angle"/>
+        </a:sp3d>
+      </dsp:spPr>
+      <dsp:style>
+        <a:lnRef idx="0">
+          <a:scrgbClr r="0" g="0" b="0"/>
+        </a:lnRef>
+        <a:fillRef idx="3">
+          <a:scrgbClr r="0" g="0" b="0"/>
+        </a:fillRef>
+        <a:effectRef idx="2">
+          <a:scrgbClr r="0" g="0" b="0"/>
+        </a:effectRef>
+        <a:fontRef idx="minor">
+          <a:schemeClr val="lt1"/>
+        </a:fontRef>
+      </dsp:style>
+      <dsp:txBody>
+        <a:bodyPr spcFirstLastPara="0" vert="horz" wrap="square" lIns="412496" tIns="412496" rIns="412496" bIns="412496" numCol="1" spcCol="1270" anchor="ctr" anchorCtr="0">
+          <a:noAutofit/>
+        </a:bodyPr>
+        <a:lstStyle/>
+        <a:p>
+          <a:pPr lvl="0" algn="ctr" defTabSz="2578100">
+            <a:lnSpc>
+              <a:spcPct val="90000"/>
+            </a:lnSpc>
+            <a:spcBef>
+              <a:spcPct val="0"/>
+            </a:spcBef>
+            <a:spcAft>
+              <a:spcPct val="35000"/>
+            </a:spcAft>
+          </a:pPr>
+          <a:r>
+            <a:rPr lang="fr-FR" sz="5800" kern="1200" dirty="0" smtClean="0"/>
+            <a:t>S</a:t>
+          </a:r>
+          <a:endParaRPr lang="fr-FR" sz="5800" kern="1200" dirty="0"/>
+        </a:p>
+      </dsp:txBody>
+      <dsp:txXfrm>
+        <a:off x="2350740" y="996074"/>
+        <a:ext cx="1659072" cy="1659072"/>
+      </dsp:txXfrm>
+    </dsp:sp>
+    <dsp:sp modelId="{A67A60E5-5291-49E4-B3E5-53A58B528285}">
+      <dsp:nvSpPr>
+        <dsp:cNvPr id="0" name=""/>
+        <dsp:cNvSpPr/>
+      </dsp:nvSpPr>
+      <dsp:spPr>
+        <a:xfrm rot="5400000">
+          <a:off x="4118186" y="308864"/>
+          <a:ext cx="2346282" cy="2346282"/>
+        </a:xfrm>
+        <a:prstGeom prst="pieWedge">
+          <a:avLst/>
+        </a:prstGeom>
+        <a:gradFill rotWithShape="0">
+          <a:gsLst>
+            <a:gs pos="0">
+              <a:schemeClr val="accent3">
+                <a:hueOff val="0"/>
+                <a:satOff val="0"/>
+                <a:lumOff val="0"/>
+                <a:alphaOff val="0"/>
+                <a:satMod val="103000"/>
+                <a:lumMod val="102000"/>
+                <a:tint val="94000"/>
+              </a:schemeClr>
+            </a:gs>
+            <a:gs pos="50000">
+              <a:schemeClr val="accent3">
+                <a:hueOff val="0"/>
+                <a:satOff val="0"/>
+                <a:lumOff val="0"/>
+                <a:alphaOff val="0"/>
+                <a:satMod val="110000"/>
+                <a:lumMod val="100000"/>
+                <a:shade val="100000"/>
+              </a:schemeClr>
+            </a:gs>
+            <a:gs pos="100000">
+              <a:schemeClr val="accent3">
+                <a:hueOff val="0"/>
+                <a:satOff val="0"/>
+                <a:lumOff val="0"/>
+                <a:alphaOff val="0"/>
+                <a:lumMod val="99000"/>
+                <a:satMod val="120000"/>
+                <a:shade val="78000"/>
+              </a:schemeClr>
+            </a:gs>
+          </a:gsLst>
+          <a:lin ang="5400000" scaled="0"/>
+        </a:gradFill>
+        <a:ln>
+          <a:noFill/>
+        </a:ln>
+        <a:effectLst/>
+        <a:scene3d>
+          <a:camera prst="orthographicFront"/>
+          <a:lightRig rig="flat" dir="t"/>
+        </a:scene3d>
+        <a:sp3d prstMaterial="plastic">
+          <a:bevelT w="120900" h="88900"/>
+          <a:bevelB w="88900" h="31750" prst="angle"/>
+        </a:sp3d>
+      </dsp:spPr>
+      <dsp:style>
+        <a:lnRef idx="0">
+          <a:scrgbClr r="0" g="0" b="0"/>
+        </a:lnRef>
+        <a:fillRef idx="3">
+          <a:scrgbClr r="0" g="0" b="0"/>
+        </a:fillRef>
+        <a:effectRef idx="2">
+          <a:scrgbClr r="0" g="0" b="0"/>
+        </a:effectRef>
+        <a:fontRef idx="minor">
+          <a:schemeClr val="lt1"/>
+        </a:fontRef>
+      </dsp:style>
+      <dsp:txBody>
+        <a:bodyPr spcFirstLastPara="0" vert="horz" wrap="square" lIns="412496" tIns="412496" rIns="412496" bIns="412496" numCol="1" spcCol="1270" anchor="ctr" anchorCtr="0">
+          <a:noAutofit/>
+        </a:bodyPr>
+        <a:lstStyle/>
+        <a:p>
+          <a:pPr lvl="0" algn="ctr" defTabSz="2578100">
+            <a:lnSpc>
+              <a:spcPct val="90000"/>
+            </a:lnSpc>
+            <a:spcBef>
+              <a:spcPct val="0"/>
+            </a:spcBef>
+            <a:spcAft>
+              <a:spcPct val="35000"/>
+            </a:spcAft>
+          </a:pPr>
+          <a:r>
+            <a:rPr lang="fr-FR" sz="5800" kern="1200" dirty="0" smtClean="0"/>
+            <a:t>W</a:t>
+          </a:r>
+          <a:endParaRPr lang="fr-FR" sz="5800" kern="1200" dirty="0"/>
+        </a:p>
+      </dsp:txBody>
+      <dsp:txXfrm rot="-5400000">
+        <a:off x="4118186" y="996074"/>
+        <a:ext cx="1659072" cy="1659072"/>
+      </dsp:txXfrm>
+    </dsp:sp>
+    <dsp:sp modelId="{CF4FC7F6-A89C-4633-A10E-BFE92B369DCD}">
+      <dsp:nvSpPr>
+        <dsp:cNvPr id="0" name=""/>
+        <dsp:cNvSpPr/>
+      </dsp:nvSpPr>
+      <dsp:spPr>
+        <a:xfrm rot="10800000">
+          <a:off x="4118186" y="2763520"/>
+          <a:ext cx="2346282" cy="2346282"/>
+        </a:xfrm>
+        <a:prstGeom prst="pieWedge">
+          <a:avLst/>
+        </a:prstGeom>
+        <a:gradFill rotWithShape="0">
+          <a:gsLst>
+            <a:gs pos="0">
+              <a:schemeClr val="accent4">
+                <a:hueOff val="0"/>
+                <a:satOff val="0"/>
+                <a:lumOff val="0"/>
+                <a:alphaOff val="0"/>
+                <a:satMod val="103000"/>
+                <a:lumMod val="102000"/>
+                <a:tint val="94000"/>
+              </a:schemeClr>
+            </a:gs>
+            <a:gs pos="50000">
+              <a:schemeClr val="accent4">
+                <a:hueOff val="0"/>
+                <a:satOff val="0"/>
+                <a:lumOff val="0"/>
+                <a:alphaOff val="0"/>
+                <a:satMod val="110000"/>
+                <a:lumMod val="100000"/>
+                <a:shade val="100000"/>
+              </a:schemeClr>
+            </a:gs>
+            <a:gs pos="100000">
+              <a:schemeClr val="accent4">
+                <a:hueOff val="0"/>
+                <a:satOff val="0"/>
+                <a:lumOff val="0"/>
+                <a:alphaOff val="0"/>
+                <a:lumMod val="99000"/>
+                <a:satMod val="120000"/>
+                <a:shade val="78000"/>
+              </a:schemeClr>
+            </a:gs>
+          </a:gsLst>
+          <a:lin ang="5400000" scaled="0"/>
+        </a:gradFill>
+        <a:ln>
+          <a:noFill/>
+        </a:ln>
+        <a:effectLst/>
+        <a:scene3d>
+          <a:camera prst="orthographicFront"/>
+          <a:lightRig rig="flat" dir="t"/>
+        </a:scene3d>
+        <a:sp3d prstMaterial="plastic">
+          <a:bevelT w="120900" h="88900"/>
+          <a:bevelB w="88900" h="31750" prst="angle"/>
+        </a:sp3d>
+      </dsp:spPr>
+      <dsp:style>
+        <a:lnRef idx="0">
+          <a:scrgbClr r="0" g="0" b="0"/>
+        </a:lnRef>
+        <a:fillRef idx="3">
+          <a:scrgbClr r="0" g="0" b="0"/>
+        </a:fillRef>
+        <a:effectRef idx="2">
+          <a:scrgbClr r="0" g="0" b="0"/>
+        </a:effectRef>
+        <a:fontRef idx="minor">
+          <a:schemeClr val="lt1"/>
+        </a:fontRef>
+      </dsp:style>
+      <dsp:txBody>
+        <a:bodyPr spcFirstLastPara="0" vert="horz" wrap="square" lIns="412496" tIns="412496" rIns="412496" bIns="412496" numCol="1" spcCol="1270" anchor="ctr" anchorCtr="0">
+          <a:noAutofit/>
+        </a:bodyPr>
+        <a:lstStyle/>
+        <a:p>
+          <a:pPr lvl="0" algn="ctr" defTabSz="2578100">
+            <a:lnSpc>
+              <a:spcPct val="90000"/>
+            </a:lnSpc>
+            <a:spcBef>
+              <a:spcPct val="0"/>
+            </a:spcBef>
+            <a:spcAft>
+              <a:spcPct val="35000"/>
+            </a:spcAft>
+          </a:pPr>
+          <a:r>
+            <a:rPr lang="fr-FR" sz="5800" kern="1200" dirty="0" smtClean="0"/>
+            <a:t>T</a:t>
+          </a:r>
+          <a:endParaRPr lang="fr-FR" sz="5800" kern="1200" dirty="0"/>
+        </a:p>
+      </dsp:txBody>
+      <dsp:txXfrm rot="10800000">
+        <a:off x="4118186" y="2763520"/>
+        <a:ext cx="1659072" cy="1659072"/>
+      </dsp:txXfrm>
+    </dsp:sp>
+    <dsp:sp modelId="{C0852406-3DC0-4222-A1F8-184593FC4596}">
+      <dsp:nvSpPr>
+        <dsp:cNvPr id="0" name=""/>
+        <dsp:cNvSpPr/>
+      </dsp:nvSpPr>
+      <dsp:spPr>
+        <a:xfrm rot="16200000">
+          <a:off x="1663530" y="2763520"/>
+          <a:ext cx="2346282" cy="2346282"/>
+        </a:xfrm>
+        <a:prstGeom prst="pieWedge">
+          <a:avLst/>
+        </a:prstGeom>
+        <a:gradFill rotWithShape="0">
+          <a:gsLst>
+            <a:gs pos="0">
+              <a:schemeClr val="accent5">
+                <a:hueOff val="0"/>
+                <a:satOff val="0"/>
+                <a:lumOff val="0"/>
+                <a:alphaOff val="0"/>
+                <a:satMod val="103000"/>
+                <a:lumMod val="102000"/>
+                <a:tint val="94000"/>
+              </a:schemeClr>
+            </a:gs>
+            <a:gs pos="50000">
+              <a:schemeClr val="accent5">
+                <a:hueOff val="0"/>
+                <a:satOff val="0"/>
+                <a:lumOff val="0"/>
+                <a:alphaOff val="0"/>
+                <a:satMod val="110000"/>
+                <a:lumMod val="100000"/>
+                <a:shade val="100000"/>
+              </a:schemeClr>
+            </a:gs>
+            <a:gs pos="100000">
+              <a:schemeClr val="accent5">
+                <a:hueOff val="0"/>
+                <a:satOff val="0"/>
+                <a:lumOff val="0"/>
+                <a:alphaOff val="0"/>
+                <a:lumMod val="99000"/>
+                <a:satMod val="120000"/>
+                <a:shade val="78000"/>
+              </a:schemeClr>
+            </a:gs>
+          </a:gsLst>
+          <a:lin ang="5400000" scaled="0"/>
+        </a:gradFill>
+        <a:ln>
+          <a:noFill/>
+        </a:ln>
+        <a:effectLst/>
+        <a:scene3d>
+          <a:camera prst="orthographicFront"/>
+          <a:lightRig rig="flat" dir="t"/>
+        </a:scene3d>
+        <a:sp3d prstMaterial="plastic">
+          <a:bevelT w="120900" h="88900"/>
+          <a:bevelB w="88900" h="31750" prst="angle"/>
+        </a:sp3d>
+      </dsp:spPr>
+      <dsp:style>
+        <a:lnRef idx="0">
+          <a:scrgbClr r="0" g="0" b="0"/>
+        </a:lnRef>
+        <a:fillRef idx="3">
+          <a:scrgbClr r="0" g="0" b="0"/>
+        </a:fillRef>
+        <a:effectRef idx="2">
+          <a:scrgbClr r="0" g="0" b="0"/>
+        </a:effectRef>
+        <a:fontRef idx="minor">
+          <a:schemeClr val="lt1"/>
+        </a:fontRef>
+      </dsp:style>
+      <dsp:txBody>
+        <a:bodyPr spcFirstLastPara="0" vert="horz" wrap="square" lIns="412496" tIns="412496" rIns="412496" bIns="412496" numCol="1" spcCol="1270" anchor="ctr" anchorCtr="0">
+          <a:noAutofit/>
+        </a:bodyPr>
+        <a:lstStyle/>
+        <a:p>
+          <a:pPr lvl="0" algn="ctr" defTabSz="2578100">
+            <a:lnSpc>
+              <a:spcPct val="90000"/>
+            </a:lnSpc>
+            <a:spcBef>
+              <a:spcPct val="0"/>
+            </a:spcBef>
+            <a:spcAft>
+              <a:spcPct val="35000"/>
+            </a:spcAft>
+          </a:pPr>
+          <a:r>
+            <a:rPr lang="fr-FR" sz="5800" kern="1200" dirty="0" smtClean="0"/>
+            <a:t>O</a:t>
+          </a:r>
+          <a:endParaRPr lang="fr-FR" sz="5800" kern="1200" dirty="0"/>
+        </a:p>
+      </dsp:txBody>
+      <dsp:txXfrm rot="5400000">
+        <a:off x="2350740" y="2763520"/>
+        <a:ext cx="1659072" cy="1659072"/>
+      </dsp:txXfrm>
+    </dsp:sp>
+    <dsp:sp modelId="{3B6382B4-DDDF-482E-9E6A-38E6F7DB930C}">
+      <dsp:nvSpPr>
+        <dsp:cNvPr id="0" name=""/>
+        <dsp:cNvSpPr/>
+      </dsp:nvSpPr>
+      <dsp:spPr>
+        <a:xfrm>
+          <a:off x="7004499" y="2240313"/>
+          <a:ext cx="810090" cy="704426"/>
+        </a:xfrm>
+        <a:prstGeom prst="circularArrow">
+          <a:avLst/>
+        </a:prstGeom>
+        <a:solidFill>
+          <a:schemeClr val="accent2">
+            <a:tint val="40000"/>
+            <a:hueOff val="0"/>
+            <a:satOff val="0"/>
+            <a:lumOff val="0"/>
+            <a:alpha val="0"/>
+          </a:schemeClr>
+        </a:solidFill>
+        <a:ln>
+          <a:noFill/>
+        </a:ln>
+        <a:effectLst>
+          <a:outerShdw blurRad="57150" dist="19050" dir="5400000" algn="ctr" rotWithShape="0">
+            <a:srgbClr val="000000">
+              <a:alpha val="63000"/>
+            </a:srgbClr>
+          </a:outerShdw>
+        </a:effectLst>
+        <a:scene3d>
+          <a:camera prst="orthographicFront"/>
+          <a:lightRig rig="flat" dir="t"/>
+        </a:scene3d>
+        <a:sp3d z="190500" prstMaterial="plastic">
+          <a:bevelT w="120900" h="88900"/>
+          <a:bevelB w="88900" h="31750" prst="angle"/>
+        </a:sp3d>
+      </dsp:spPr>
+      <dsp:style>
+        <a:lnRef idx="0">
+          <a:scrgbClr r="0" g="0" b="0"/>
+        </a:lnRef>
+        <a:fillRef idx="1">
+          <a:scrgbClr r="0" g="0" b="0"/>
+        </a:fillRef>
+        <a:effectRef idx="3">
+          <a:scrgbClr r="0" g="0" b="0"/>
+        </a:effectRef>
+        <a:fontRef idx="minor">
+          <a:schemeClr val="lt1"/>
+        </a:fontRef>
+      </dsp:style>
+    </dsp:sp>
+    <dsp:sp modelId="{72B333DC-EBE8-4650-A713-61338E0F2C2D}">
+      <dsp:nvSpPr>
+        <dsp:cNvPr id="0" name=""/>
+        <dsp:cNvSpPr/>
+      </dsp:nvSpPr>
+      <dsp:spPr>
+        <a:xfrm rot="10800000">
+          <a:off x="7004499" y="2343297"/>
+          <a:ext cx="810090" cy="704426"/>
+        </a:xfrm>
+        <a:prstGeom prst="circularArrow">
+          <a:avLst/>
+        </a:prstGeom>
+        <a:solidFill>
+          <a:schemeClr val="accent2">
+            <a:tint val="40000"/>
+            <a:hueOff val="0"/>
+            <a:satOff val="0"/>
+            <a:lumOff val="0"/>
+            <a:alpha val="0"/>
+          </a:schemeClr>
+        </a:solidFill>
+        <a:ln>
+          <a:noFill/>
+        </a:ln>
+        <a:effectLst>
+          <a:outerShdw blurRad="57150" dist="19050" dir="5400000" algn="ctr" rotWithShape="0">
+            <a:srgbClr val="000000">
+              <a:alpha val="63000"/>
+            </a:srgbClr>
+          </a:outerShdw>
+        </a:effectLst>
+        <a:scene3d>
+          <a:camera prst="orthographicFront"/>
+          <a:lightRig rig="flat" dir="t"/>
+        </a:scene3d>
+        <a:sp3d z="190500" prstMaterial="plastic">
+          <a:bevelT w="120900" h="88900"/>
+          <a:bevelB w="88900" h="31750" prst="angle"/>
+        </a:sp3d>
+      </dsp:spPr>
+      <dsp:style>
+        <a:lnRef idx="0">
+          <a:scrgbClr r="0" g="0" b="0"/>
+        </a:lnRef>
+        <a:fillRef idx="1">
+          <a:scrgbClr r="0" g="0" b="0"/>
+        </a:fillRef>
+        <a:effectRef idx="3">
+          <a:scrgbClr r="0" g="0" b="0"/>
+        </a:effectRef>
+        <a:fontRef idx="minor">
+          <a:schemeClr val="lt1"/>
+        </a:fontRef>
+      </dsp:style>
+    </dsp:sp>
+  </dsp:spTree>
+</dsp:drawing>
+</file>
+
+<file path=ppt/diagrams/drawing2.xml><?xml version="1.0" encoding="utf-8"?>
+<dsp:drawing xmlns:dgm="http://schemas.openxmlformats.org/drawingml/2006/diagram" xmlns:dsp="http://schemas.microsoft.com/office/drawing/2008/diagram" xmlns:a="http://schemas.openxmlformats.org/drawingml/2006/main">
+  <dsp:spTree>
+    <dsp:nvGrpSpPr>
+      <dsp:cNvPr id="0" name=""/>
+      <dsp:cNvGrpSpPr/>
+    </dsp:nvGrpSpPr>
+    <dsp:grpSpPr/>
+    <dsp:sp modelId="{68AC0C8C-6683-4490-8F38-983C8CB47C3F}">
+      <dsp:nvSpPr>
+        <dsp:cNvPr id="0" name=""/>
+        <dsp:cNvSpPr/>
+      </dsp:nvSpPr>
+      <dsp:spPr>
+        <a:xfrm>
+          <a:off x="4956022" y="3684693"/>
+          <a:ext cx="2676821" cy="1733973"/>
+        </a:xfrm>
+        <a:prstGeom prst="roundRect">
+          <a:avLst>
+            <a:gd name="adj" fmla="val 10000"/>
+          </a:avLst>
+        </a:prstGeom>
+        <a:solidFill>
+          <a:schemeClr val="lt1">
+            <a:alpha val="90000"/>
+            <a:hueOff val="0"/>
+            <a:satOff val="0"/>
+            <a:lumOff val="0"/>
+            <a:alphaOff val="0"/>
+          </a:schemeClr>
+        </a:solidFill>
+        <a:ln w="6350" cap="flat" cmpd="sng" algn="ctr">
+          <a:solidFill>
+            <a:schemeClr val="accent4">
+              <a:hueOff val="0"/>
+              <a:satOff val="0"/>
+              <a:lumOff val="0"/>
+              <a:alphaOff val="0"/>
+            </a:schemeClr>
+          </a:solidFill>
+          <a:prstDash val="solid"/>
+          <a:miter lim="800000"/>
+        </a:ln>
+        <a:effectLst/>
+        <a:scene3d>
+          <a:camera prst="orthographicFront"/>
+          <a:lightRig rig="flat" dir="t"/>
+        </a:scene3d>
+        <a:sp3d z="-190500" extrusionH="12700" prstMaterial="plastic">
+          <a:bevelT w="50800" h="50800"/>
+        </a:sp3d>
+      </dsp:spPr>
+      <dsp:style>
+        <a:lnRef idx="1">
+          <a:scrgbClr r="0" g="0" b="0"/>
+        </a:lnRef>
+        <a:fillRef idx="1">
+          <a:scrgbClr r="0" g="0" b="0"/>
+        </a:fillRef>
+        <a:effectRef idx="2">
+          <a:scrgbClr r="0" g="0" b="0"/>
+        </a:effectRef>
+        <a:fontRef idx="minor"/>
+      </dsp:style>
+      <dsp:txBody>
+        <a:bodyPr spcFirstLastPara="0" vert="horz" wrap="square" lIns="64770" tIns="64770" rIns="64770" bIns="64770" numCol="1" spcCol="1270" anchor="t" anchorCtr="0">
+          <a:noAutofit/>
+        </a:bodyPr>
+        <a:lstStyle/>
+        <a:p>
+          <a:pPr marL="114300" lvl="1" indent="-114300" algn="l" defTabSz="577850">
+            <a:lnSpc>
+              <a:spcPct val="90000"/>
+            </a:lnSpc>
+            <a:spcBef>
+              <a:spcPct val="0"/>
+            </a:spcBef>
+            <a:spcAft>
+              <a:spcPct val="15000"/>
+            </a:spcAft>
+            <a:buChar char="••"/>
+          </a:pPr>
+          <a:r>
+            <a:rPr lang="fr-FR" sz="1300" kern="1200" dirty="0" smtClean="0"/>
+            <a:t>Risque de forte demande (serveur)</a:t>
+          </a:r>
+          <a:endParaRPr lang="fr-FR" sz="1300" kern="1200" dirty="0"/>
+        </a:p>
+        <a:p>
+          <a:pPr marL="114300" lvl="1" indent="-114300" algn="l" defTabSz="577850">
+            <a:lnSpc>
+              <a:spcPct val="90000"/>
+            </a:lnSpc>
+            <a:spcBef>
+              <a:spcPct val="0"/>
+            </a:spcBef>
+            <a:spcAft>
+              <a:spcPct val="15000"/>
+            </a:spcAft>
+            <a:buChar char="••"/>
+          </a:pPr>
+          <a:r>
+            <a:rPr lang="fr-FR" sz="1300" kern="1200" dirty="0" smtClean="0"/>
+            <a:t>Protection des données (temporaires)</a:t>
+          </a:r>
+          <a:endParaRPr lang="fr-FR" sz="1300" kern="1200" dirty="0"/>
+        </a:p>
+      </dsp:txBody>
+      <dsp:txXfrm>
+        <a:off x="5797159" y="4156276"/>
+        <a:ext cx="1797595" cy="1224300"/>
+      </dsp:txXfrm>
+    </dsp:sp>
+    <dsp:sp modelId="{431C4C2F-7F42-4D62-8EEF-918E7AD22EA0}">
+      <dsp:nvSpPr>
+        <dsp:cNvPr id="0" name=""/>
+        <dsp:cNvSpPr/>
+      </dsp:nvSpPr>
+      <dsp:spPr>
+        <a:xfrm>
+          <a:off x="541866" y="3684693"/>
+          <a:ext cx="2676821" cy="1733973"/>
+        </a:xfrm>
+        <a:prstGeom prst="roundRect">
+          <a:avLst>
+            <a:gd name="adj" fmla="val 10000"/>
+          </a:avLst>
+        </a:prstGeom>
+        <a:solidFill>
+          <a:schemeClr val="lt1">
+            <a:alpha val="90000"/>
+            <a:hueOff val="0"/>
+            <a:satOff val="0"/>
+            <a:lumOff val="0"/>
+            <a:alphaOff val="0"/>
+          </a:schemeClr>
+        </a:solidFill>
+        <a:ln w="6350" cap="flat" cmpd="sng" algn="ctr">
+          <a:solidFill>
+            <a:schemeClr val="accent5">
+              <a:hueOff val="0"/>
+              <a:satOff val="0"/>
+              <a:lumOff val="0"/>
+              <a:alphaOff val="0"/>
+            </a:schemeClr>
+          </a:solidFill>
+          <a:prstDash val="solid"/>
+          <a:miter lim="800000"/>
+        </a:ln>
+        <a:effectLst/>
+        <a:scene3d>
+          <a:camera prst="orthographicFront"/>
+          <a:lightRig rig="flat" dir="t"/>
+        </a:scene3d>
+        <a:sp3d z="-190500" extrusionH="12700" prstMaterial="plastic">
+          <a:bevelT w="50800" h="50800"/>
+        </a:sp3d>
+      </dsp:spPr>
+      <dsp:style>
+        <a:lnRef idx="1">
+          <a:scrgbClr r="0" g="0" b="0"/>
+        </a:lnRef>
+        <a:fillRef idx="1">
+          <a:scrgbClr r="0" g="0" b="0"/>
+        </a:fillRef>
+        <a:effectRef idx="2">
+          <a:scrgbClr r="0" g="0" b="0"/>
+        </a:effectRef>
+        <a:fontRef idx="minor"/>
+      </dsp:style>
+      <dsp:txBody>
+        <a:bodyPr spcFirstLastPara="0" vert="horz" wrap="square" lIns="64770" tIns="64770" rIns="64770" bIns="64770" numCol="1" spcCol="1270" anchor="t" anchorCtr="0">
+          <a:noAutofit/>
+        </a:bodyPr>
+        <a:lstStyle/>
+        <a:p>
+          <a:pPr marL="114300" lvl="1" indent="-114300" algn="l" defTabSz="577850">
+            <a:lnSpc>
+              <a:spcPct val="90000"/>
+            </a:lnSpc>
+            <a:spcBef>
+              <a:spcPct val="0"/>
+            </a:spcBef>
+            <a:spcAft>
+              <a:spcPct val="15000"/>
+            </a:spcAft>
+            <a:buChar char="••"/>
+          </a:pPr>
+          <a:r>
+            <a:rPr lang="fr-FR" sz="1300" kern="1200" dirty="0" smtClean="0"/>
+            <a:t>Pas de compétition</a:t>
+          </a:r>
+          <a:endParaRPr lang="fr-FR" sz="1300" kern="1200" dirty="0"/>
+        </a:p>
+        <a:p>
+          <a:pPr marL="114300" lvl="1" indent="-114300" algn="l" defTabSz="577850">
+            <a:lnSpc>
+              <a:spcPct val="90000"/>
+            </a:lnSpc>
+            <a:spcBef>
+              <a:spcPct val="0"/>
+            </a:spcBef>
+            <a:spcAft>
+              <a:spcPct val="15000"/>
+            </a:spcAft>
+            <a:buChar char="••"/>
+          </a:pPr>
+          <a:r>
+            <a:rPr lang="fr-FR" sz="1300" kern="1200" dirty="0" smtClean="0"/>
+            <a:t>Grande utilité</a:t>
+          </a:r>
+          <a:endParaRPr lang="fr-FR" sz="1300" kern="1200" dirty="0"/>
+        </a:p>
+      </dsp:txBody>
+      <dsp:txXfrm>
+        <a:off x="579956" y="4156276"/>
+        <a:ext cx="1797595" cy="1224300"/>
+      </dsp:txXfrm>
+    </dsp:sp>
+    <dsp:sp modelId="{05478942-E273-4856-8553-F0FD8F015AA2}">
+      <dsp:nvSpPr>
+        <dsp:cNvPr id="0" name=""/>
+        <dsp:cNvSpPr/>
+      </dsp:nvSpPr>
+      <dsp:spPr>
+        <a:xfrm>
+          <a:off x="4956022" y="0"/>
+          <a:ext cx="2676821" cy="1733973"/>
+        </a:xfrm>
+        <a:prstGeom prst="roundRect">
+          <a:avLst>
+            <a:gd name="adj" fmla="val 10000"/>
+          </a:avLst>
+        </a:prstGeom>
+        <a:solidFill>
+          <a:schemeClr val="lt1">
+            <a:alpha val="90000"/>
+            <a:hueOff val="0"/>
+            <a:satOff val="0"/>
+            <a:lumOff val="0"/>
+            <a:alphaOff val="0"/>
+          </a:schemeClr>
+        </a:solidFill>
+        <a:ln w="6350" cap="flat" cmpd="sng" algn="ctr">
+          <a:solidFill>
+            <a:schemeClr val="accent3">
+              <a:hueOff val="0"/>
+              <a:satOff val="0"/>
+              <a:lumOff val="0"/>
+              <a:alphaOff val="0"/>
+            </a:schemeClr>
+          </a:solidFill>
+          <a:prstDash val="solid"/>
+          <a:miter lim="800000"/>
+        </a:ln>
+        <a:effectLst/>
+        <a:scene3d>
+          <a:camera prst="orthographicFront"/>
+          <a:lightRig rig="flat" dir="t"/>
+        </a:scene3d>
+        <a:sp3d z="-190500" extrusionH="12700" prstMaterial="plastic">
+          <a:bevelT w="50800" h="50800"/>
+        </a:sp3d>
+      </dsp:spPr>
+      <dsp:style>
+        <a:lnRef idx="1">
+          <a:scrgbClr r="0" g="0" b="0"/>
+        </a:lnRef>
+        <a:fillRef idx="1">
+          <a:scrgbClr r="0" g="0" b="0"/>
+        </a:fillRef>
+        <a:effectRef idx="2">
+          <a:scrgbClr r="0" g="0" b="0"/>
+        </a:effectRef>
+        <a:fontRef idx="minor"/>
+      </dsp:style>
+      <dsp:txBody>
+        <a:bodyPr spcFirstLastPara="0" vert="horz" wrap="square" lIns="64770" tIns="64770" rIns="64770" bIns="64770" numCol="1" spcCol="1270" anchor="t" anchorCtr="0">
+          <a:noAutofit/>
+        </a:bodyPr>
+        <a:lstStyle/>
+        <a:p>
+          <a:pPr marL="114300" lvl="1" indent="-114300" algn="l" defTabSz="577850">
+            <a:lnSpc>
+              <a:spcPct val="90000"/>
+            </a:lnSpc>
+            <a:spcBef>
+              <a:spcPct val="0"/>
+            </a:spcBef>
+            <a:spcAft>
+              <a:spcPct val="15000"/>
+            </a:spcAft>
+            <a:buChar char="••"/>
+          </a:pPr>
+          <a:r>
+            <a:rPr lang="fr-FR" sz="1300" kern="1200" dirty="0" smtClean="0"/>
+            <a:t>Deadlines courtes</a:t>
+          </a:r>
+          <a:endParaRPr lang="fr-FR" sz="1300" kern="1200" dirty="0"/>
+        </a:p>
+        <a:p>
+          <a:pPr marL="114300" lvl="1" indent="-114300" algn="l" defTabSz="577850">
+            <a:lnSpc>
+              <a:spcPct val="90000"/>
+            </a:lnSpc>
+            <a:spcBef>
+              <a:spcPct val="0"/>
+            </a:spcBef>
+            <a:spcAft>
+              <a:spcPct val="15000"/>
+            </a:spcAft>
+            <a:buChar char="••"/>
+          </a:pPr>
+          <a:r>
+            <a:rPr lang="fr-FR" sz="1300" kern="1200" dirty="0" smtClean="0"/>
+            <a:t>Mauvaise documentation</a:t>
+          </a:r>
+          <a:endParaRPr lang="fr-FR" sz="1300" kern="1200" dirty="0"/>
+        </a:p>
+      </dsp:txBody>
+      <dsp:txXfrm>
+        <a:off x="5797159" y="38090"/>
+        <a:ext cx="1797595" cy="1224300"/>
+      </dsp:txXfrm>
+    </dsp:sp>
+    <dsp:sp modelId="{BC6F0824-1351-49BA-BADB-F02B71A91728}">
+      <dsp:nvSpPr>
+        <dsp:cNvPr id="0" name=""/>
+        <dsp:cNvSpPr/>
+      </dsp:nvSpPr>
+      <dsp:spPr>
+        <a:xfrm>
+          <a:off x="541866" y="0"/>
+          <a:ext cx="2676821" cy="1733973"/>
+        </a:xfrm>
+        <a:prstGeom prst="roundRect">
+          <a:avLst>
+            <a:gd name="adj" fmla="val 10000"/>
+          </a:avLst>
+        </a:prstGeom>
+        <a:solidFill>
+          <a:schemeClr val="lt1">
+            <a:alpha val="90000"/>
+            <a:hueOff val="0"/>
+            <a:satOff val="0"/>
+            <a:lumOff val="0"/>
+            <a:alphaOff val="0"/>
+          </a:schemeClr>
+        </a:solidFill>
+        <a:ln w="6350" cap="flat" cmpd="sng" algn="ctr">
+          <a:solidFill>
+            <a:schemeClr val="accent2">
+              <a:hueOff val="0"/>
+              <a:satOff val="0"/>
+              <a:lumOff val="0"/>
+              <a:alphaOff val="0"/>
+            </a:schemeClr>
+          </a:solidFill>
+          <a:prstDash val="solid"/>
+          <a:miter lim="800000"/>
+        </a:ln>
+        <a:effectLst/>
+        <a:scene3d>
+          <a:camera prst="orthographicFront"/>
+          <a:lightRig rig="flat" dir="t"/>
+        </a:scene3d>
+        <a:sp3d z="-190500" extrusionH="12700" prstMaterial="plastic">
+          <a:bevelT w="50800" h="50800"/>
+        </a:sp3d>
+      </dsp:spPr>
+      <dsp:style>
+        <a:lnRef idx="1">
+          <a:scrgbClr r="0" g="0" b="0"/>
+        </a:lnRef>
+        <a:fillRef idx="1">
+          <a:scrgbClr r="0" g="0" b="0"/>
+        </a:fillRef>
+        <a:effectRef idx="2">
+          <a:scrgbClr r="0" g="0" b="0"/>
+        </a:effectRef>
+        <a:fontRef idx="minor"/>
+      </dsp:style>
+      <dsp:txBody>
+        <a:bodyPr spcFirstLastPara="0" vert="horz" wrap="square" lIns="64770" tIns="64770" rIns="64770" bIns="64770" numCol="1" spcCol="1270" anchor="t" anchorCtr="0">
+          <a:noAutofit/>
+        </a:bodyPr>
+        <a:lstStyle/>
+        <a:p>
+          <a:pPr marL="114300" lvl="1" indent="-114300" algn="l" defTabSz="577850">
+            <a:lnSpc>
+              <a:spcPct val="90000"/>
+            </a:lnSpc>
+            <a:spcBef>
+              <a:spcPct val="0"/>
+            </a:spcBef>
+            <a:spcAft>
+              <a:spcPct val="15000"/>
+            </a:spcAft>
+            <a:buChar char="••"/>
+          </a:pPr>
+          <a:r>
+            <a:rPr lang="fr-FR" sz="1300" kern="1200" dirty="0" smtClean="0"/>
+            <a:t>Diverses compétences</a:t>
+          </a:r>
+          <a:endParaRPr lang="fr-FR" sz="1300" kern="1200" dirty="0"/>
+        </a:p>
+        <a:p>
+          <a:pPr marL="114300" lvl="1" indent="-114300" algn="l" defTabSz="577850">
+            <a:lnSpc>
+              <a:spcPct val="90000"/>
+            </a:lnSpc>
+            <a:spcBef>
+              <a:spcPct val="0"/>
+            </a:spcBef>
+            <a:spcAft>
+              <a:spcPct val="15000"/>
+            </a:spcAft>
+            <a:buChar char="••"/>
+          </a:pPr>
+          <a:r>
+            <a:rPr lang="fr-FR" sz="1300" kern="1200" dirty="0" smtClean="0"/>
+            <a:t>Accès à un expert</a:t>
+          </a:r>
+          <a:endParaRPr lang="fr-FR" sz="1300" kern="1200" dirty="0"/>
+        </a:p>
+        <a:p>
+          <a:pPr marL="114300" lvl="1" indent="-114300" algn="l" defTabSz="577850">
+            <a:lnSpc>
+              <a:spcPct val="90000"/>
+            </a:lnSpc>
+            <a:spcBef>
+              <a:spcPct val="0"/>
+            </a:spcBef>
+            <a:spcAft>
+              <a:spcPct val="15000"/>
+            </a:spcAft>
+            <a:buChar char="••"/>
+          </a:pPr>
+          <a:r>
+            <a:rPr lang="fr-FR" sz="1300" kern="1200" dirty="0" smtClean="0"/>
+            <a:t>Utilisation de package ‘open source ’</a:t>
+          </a:r>
+          <a:endParaRPr lang="fr-FR" sz="1300" kern="1200" dirty="0"/>
         </a:p>
       </dsp:txBody>
       <dsp:txXfrm>
@@ -3674,7 +6386,1849 @@
 </dgm:layoutDef>
 </file>
 
+<file path=ppt/diagrams/layout2.xml><?xml version="1.0" encoding="utf-8"?>
+<dgm:layoutDef xmlns:dgm="http://schemas.openxmlformats.org/drawingml/2006/diagram" xmlns:a="http://schemas.openxmlformats.org/drawingml/2006/main" uniqueId="urn:microsoft.com/office/officeart/2005/8/layout/cycle4">
+  <dgm:title val=""/>
+  <dgm:desc val=""/>
+  <dgm:catLst>
+    <dgm:cat type="relationship" pri="26000"/>
+    <dgm:cat type="cycle" pri="13000"/>
+    <dgm:cat type="matrix" pri="4000"/>
+  </dgm:catLst>
+  <dgm:sampData>
+    <dgm:dataModel>
+      <dgm:ptLst>
+        <dgm:pt modelId="0" type="doc"/>
+        <dgm:pt modelId="1">
+          <dgm:prSet phldr="1"/>
+        </dgm:pt>
+        <dgm:pt modelId="11">
+          <dgm:prSet phldr="1"/>
+        </dgm:pt>
+        <dgm:pt modelId="2">
+          <dgm:prSet phldr="1"/>
+        </dgm:pt>
+        <dgm:pt modelId="21">
+          <dgm:prSet phldr="1"/>
+        </dgm:pt>
+        <dgm:pt modelId="3">
+          <dgm:prSet phldr="1"/>
+        </dgm:pt>
+        <dgm:pt modelId="31">
+          <dgm:prSet phldr="1"/>
+        </dgm:pt>
+        <dgm:pt modelId="4">
+          <dgm:prSet phldr="1"/>
+        </dgm:pt>
+        <dgm:pt modelId="41">
+          <dgm:prSet phldr="1"/>
+        </dgm:pt>
+      </dgm:ptLst>
+      <dgm:cxnLst>
+        <dgm:cxn modelId="5" srcId="0" destId="1" srcOrd="0" destOrd="0"/>
+        <dgm:cxn modelId="6" srcId="0" destId="2" srcOrd="1" destOrd="0"/>
+        <dgm:cxn modelId="7" srcId="0" destId="3" srcOrd="2" destOrd="0"/>
+        <dgm:cxn modelId="8" srcId="0" destId="4" srcOrd="3" destOrd="0"/>
+        <dgm:cxn modelId="13" srcId="1" destId="11" srcOrd="0" destOrd="0"/>
+        <dgm:cxn modelId="23" srcId="2" destId="21" srcOrd="0" destOrd="0"/>
+        <dgm:cxn modelId="33" srcId="3" destId="31" srcOrd="0" destOrd="0"/>
+        <dgm:cxn modelId="43" srcId="4" destId="41" srcOrd="0" destOrd="0"/>
+      </dgm:cxnLst>
+      <dgm:bg/>
+      <dgm:whole/>
+    </dgm:dataModel>
+  </dgm:sampData>
+  <dgm:styleData>
+    <dgm:dataModel>
+      <dgm:ptLst>
+        <dgm:pt modelId="0" type="doc"/>
+        <dgm:pt modelId="1"/>
+        <dgm:pt modelId="11"/>
+        <dgm:pt modelId="2"/>
+        <dgm:pt modelId="21"/>
+        <dgm:pt modelId="3"/>
+        <dgm:pt modelId="31"/>
+        <dgm:pt modelId="4"/>
+        <dgm:pt modelId="41"/>
+      </dgm:ptLst>
+      <dgm:cxnLst>
+        <dgm:cxn modelId="5" srcId="0" destId="1" srcOrd="0" destOrd="0"/>
+        <dgm:cxn modelId="6" srcId="0" destId="2" srcOrd="1" destOrd="0"/>
+        <dgm:cxn modelId="7" srcId="0" destId="3" srcOrd="2" destOrd="0"/>
+        <dgm:cxn modelId="8" srcId="0" destId="4" srcOrd="3" destOrd="0"/>
+        <dgm:cxn modelId="13" srcId="1" destId="11" srcOrd="0" destOrd="0"/>
+        <dgm:cxn modelId="23" srcId="2" destId="21" srcOrd="0" destOrd="0"/>
+        <dgm:cxn modelId="33" srcId="3" destId="31" srcOrd="0" destOrd="0"/>
+        <dgm:cxn modelId="43" srcId="4" destId="41" srcOrd="0" destOrd="0"/>
+      </dgm:cxnLst>
+      <dgm:bg/>
+      <dgm:whole/>
+    </dgm:dataModel>
+  </dgm:styleData>
+  <dgm:clrData>
+    <dgm:dataModel>
+      <dgm:ptLst>
+        <dgm:pt modelId="0" type="doc"/>
+        <dgm:pt modelId="1"/>
+        <dgm:pt modelId="11"/>
+        <dgm:pt modelId="2"/>
+        <dgm:pt modelId="21"/>
+        <dgm:pt modelId="3"/>
+        <dgm:pt modelId="31"/>
+        <dgm:pt modelId="4"/>
+        <dgm:pt modelId="41"/>
+      </dgm:ptLst>
+      <dgm:cxnLst>
+        <dgm:cxn modelId="5" srcId="0" destId="1" srcOrd="0" destOrd="0"/>
+        <dgm:cxn modelId="6" srcId="0" destId="2" srcOrd="1" destOrd="0"/>
+        <dgm:cxn modelId="7" srcId="0" destId="3" srcOrd="2" destOrd="0"/>
+        <dgm:cxn modelId="8" srcId="0" destId="4" srcOrd="3" destOrd="0"/>
+        <dgm:cxn modelId="13" srcId="1" destId="11" srcOrd="0" destOrd="0"/>
+        <dgm:cxn modelId="23" srcId="2" destId="21" srcOrd="0" destOrd="0"/>
+        <dgm:cxn modelId="33" srcId="3" destId="31" srcOrd="0" destOrd="0"/>
+        <dgm:cxn modelId="43" srcId="4" destId="41" srcOrd="0" destOrd="0"/>
+      </dgm:cxnLst>
+      <dgm:bg/>
+      <dgm:whole/>
+    </dgm:dataModel>
+  </dgm:clrData>
+  <dgm:layoutNode name="cycleMatrixDiagram">
+    <dgm:varLst>
+      <dgm:chMax val="1"/>
+      <dgm:dir/>
+      <dgm:animLvl val="lvl"/>
+      <dgm:resizeHandles val="exact"/>
+    </dgm:varLst>
+    <dgm:alg type="composite">
+      <dgm:param type="ar" val="1.3"/>
+    </dgm:alg>
+    <dgm:shape xmlns:r="http://schemas.openxmlformats.org/officeDocument/2006/relationships" r:blip="">
+      <dgm:adjLst/>
+    </dgm:shape>
+    <dgm:presOf/>
+    <dgm:constrLst>
+      <dgm:constr type="w" for="ch" forName="children" refType="w"/>
+      <dgm:constr type="h" for="ch" forName="children" refType="w" refFor="ch" refForName="children" fact="0.77"/>
+      <dgm:constr type="ctrX" for="ch" forName="children" refType="w" fact="0.5"/>
+      <dgm:constr type="ctrY" for="ch" forName="children" refType="h" fact="0.5"/>
+      <dgm:constr type="w" for="ch" forName="circle" refType="w"/>
+      <dgm:constr type="h" for="ch" forName="circle" refType="h"/>
+      <dgm:constr type="ctrX" for="ch" forName="circle" refType="w" fact="0.5"/>
+      <dgm:constr type="ctrY" for="ch" forName="circle" refType="h" fact="0.5"/>
+      <dgm:constr type="w" for="ch" forName="center1" refType="w" fact="0.115"/>
+      <dgm:constr type="h" for="ch" forName="center1" refType="w" fact="0.1"/>
+      <dgm:constr type="ctrX" for="ch" forName="center1" refType="w" fact="0.5"/>
+      <dgm:constr type="ctrY" for="ch" forName="center1" refType="h" fact="0.475"/>
+      <dgm:constr type="w" for="ch" forName="center2" refType="w" fact="0.115"/>
+      <dgm:constr type="h" for="ch" forName="center2" refType="w" fact="0.1"/>
+      <dgm:constr type="ctrX" for="ch" forName="center2" refType="w" fact="0.5"/>
+      <dgm:constr type="ctrY" for="ch" forName="center2" refType="h" fact="0.525"/>
+    </dgm:constrLst>
+    <dgm:ruleLst/>
+    <dgm:choose name="Name0">
+      <dgm:if name="Name1" axis="ch" ptType="node" func="cnt" op="gte" val="1">
+        <dgm:layoutNode name="children">
+          <dgm:alg type="composite">
+            <dgm:param type="ar" val="1.3"/>
+          </dgm:alg>
+          <dgm:shape xmlns:r="http://schemas.openxmlformats.org/officeDocument/2006/relationships" r:blip="">
+            <dgm:adjLst/>
+          </dgm:shape>
+          <dgm:presOf/>
+          <dgm:choose name="Name2">
+            <dgm:if name="Name3" func="var" arg="dir" op="equ" val="norm">
+              <dgm:constrLst>
+                <dgm:constr type="primFontSz" for="des" ptType="node" op="equ" val="65"/>
+                <dgm:constr type="w" for="ch" forName="child1group" refType="w" fact="0.38"/>
+                <dgm:constr type="h" for="ch" forName="child1group" refType="h" fact="0.32"/>
+                <dgm:constr type="t" for="ch" forName="child1group"/>
+                <dgm:constr type="l" for="ch" forName="child1group"/>
+                <dgm:constr type="w" for="ch" forName="child2group" refType="w" fact="0.38"/>
+                <dgm:constr type="h" for="ch" forName="child2group" refType="h" fact="0.32"/>
+                <dgm:constr type="t" for="ch" forName="child2group"/>
+                <dgm:constr type="r" for="ch" forName="child2group" refType="w"/>
+                <dgm:constr type="w" for="ch" forName="child3group" refType="w" fact="0.38"/>
+                <dgm:constr type="h" for="ch" forName="child3group" refType="h" fact="0.32"/>
+                <dgm:constr type="b" for="ch" forName="child3group" refType="h"/>
+                <dgm:constr type="r" for="ch" forName="child3group" refType="w"/>
+                <dgm:constr type="w" for="ch" forName="child4group" refType="w" fact="0.38"/>
+                <dgm:constr type="h" for="ch" forName="child4group" refType="h" fact="0.32"/>
+                <dgm:constr type="b" for="ch" forName="child4group" refType="h"/>
+                <dgm:constr type="l" for="ch" forName="child4group"/>
+              </dgm:constrLst>
+            </dgm:if>
+            <dgm:else name="Name4">
+              <dgm:constrLst>
+                <dgm:constr type="primFontSz" for="des" ptType="node" op="equ" val="65"/>
+                <dgm:constr type="w" for="ch" forName="child1group" refType="w" fact="0.38"/>
+                <dgm:constr type="h" for="ch" forName="child1group" refType="h" fact="0.32"/>
+                <dgm:constr type="t" for="ch" forName="child1group"/>
+                <dgm:constr type="r" for="ch" forName="child1group" refType="w"/>
+                <dgm:constr type="w" for="ch" forName="child2group" refType="w" fact="0.38"/>
+                <dgm:constr type="h" for="ch" forName="child2group" refType="h" fact="0.32"/>
+                <dgm:constr type="t" for="ch" forName="child2group"/>
+                <dgm:constr type="l" for="ch" forName="child2group"/>
+                <dgm:constr type="w" for="ch" forName="child3group" refType="w" fact="0.38"/>
+                <dgm:constr type="h" for="ch" forName="child3group" refType="h" fact="0.32"/>
+                <dgm:constr type="b" for="ch" forName="child3group" refType="h"/>
+                <dgm:constr type="l" for="ch" forName="child3group"/>
+                <dgm:constr type="w" for="ch" forName="child4group" refType="w" fact="0.38"/>
+                <dgm:constr type="h" for="ch" forName="child4group" refType="h" fact="0.32"/>
+                <dgm:constr type="b" for="ch" forName="child4group" refType="h"/>
+                <dgm:constr type="r" for="ch" forName="child4group" refType="w"/>
+              </dgm:constrLst>
+            </dgm:else>
+          </dgm:choose>
+          <dgm:ruleLst/>
+          <dgm:choose name="Name5">
+            <dgm:if name="Name6" axis="ch ch" ptType="node node" st="1 1" cnt="1 0" func="cnt" op="gte" val="1">
+              <dgm:layoutNode name="child1group">
+                <dgm:alg type="composite">
+                  <dgm:param type="horzAlign" val="none"/>
+                  <dgm:param type="vertAlign" val="none"/>
+                </dgm:alg>
+                <dgm:shape xmlns:r="http://schemas.openxmlformats.org/officeDocument/2006/relationships" r:blip="">
+                  <dgm:adjLst/>
+                </dgm:shape>
+                <dgm:presOf/>
+                <dgm:choose name="Name7">
+                  <dgm:if name="Name8" func="var" arg="dir" op="equ" val="norm">
+                    <dgm:constrLst>
+                      <dgm:constr type="w" for="ch" forName="child1" refType="w"/>
+                      <dgm:constr type="h" for="ch" forName="child1" refType="h"/>
+                      <dgm:constr type="t" for="ch" forName="child1"/>
+                      <dgm:constr type="l" for="ch" forName="child1"/>
+                      <dgm:constr type="w" for="ch" forName="child1Text" refType="w" fact="0.7"/>
+                      <dgm:constr type="h" for="ch" forName="child1Text" refType="h" fact="0.75"/>
+                      <dgm:constr type="t" for="ch" forName="child1Text"/>
+                      <dgm:constr type="l" for="ch" forName="child1Text"/>
+                    </dgm:constrLst>
+                  </dgm:if>
+                  <dgm:else name="Name9">
+                    <dgm:constrLst>
+                      <dgm:constr type="w" for="ch" forName="child1" refType="w"/>
+                      <dgm:constr type="h" for="ch" forName="child1" refType="h"/>
+                      <dgm:constr type="t" for="ch" forName="child1"/>
+                      <dgm:constr type="r" for="ch" forName="child1" refType="w"/>
+                      <dgm:constr type="w" for="ch" forName="child1Text" refType="w" fact="0.7"/>
+                      <dgm:constr type="h" for="ch" forName="child1Text" refType="h" fact="0.75"/>
+                      <dgm:constr type="t" for="ch" forName="child1Text"/>
+                      <dgm:constr type="r" for="ch" forName="child1Text" refType="w"/>
+                    </dgm:constrLst>
+                  </dgm:else>
+                </dgm:choose>
+                <dgm:ruleLst/>
+                <dgm:layoutNode name="child1" styleLbl="bgAcc1">
+                  <dgm:alg type="sp"/>
+                  <dgm:shape xmlns:r="http://schemas.openxmlformats.org/officeDocument/2006/relationships" type="roundRect" r:blip="" zOrderOff="-2">
+                    <dgm:adjLst>
+                      <dgm:adj idx="1" val="0.1"/>
+                    </dgm:adjLst>
+                  </dgm:shape>
+                  <dgm:presOf axis="ch des" ptType="node node" st="1 1" cnt="1 0"/>
+                  <dgm:constrLst/>
+                  <dgm:ruleLst/>
+                </dgm:layoutNode>
+                <dgm:layoutNode name="child1Text" styleLbl="bgAcc1">
+                  <dgm:varLst>
+                    <dgm:bulletEnabled val="1"/>
+                  </dgm:varLst>
+                  <dgm:alg type="tx">
+                    <dgm:param type="stBulletLvl" val="1"/>
+                  </dgm:alg>
+                  <dgm:shape xmlns:r="http://schemas.openxmlformats.org/officeDocument/2006/relationships" type="roundRect" r:blip="" zOrderOff="-2" hideGeom="1">
+                    <dgm:adjLst>
+                      <dgm:adj idx="1" val="0.1"/>
+                    </dgm:adjLst>
+                  </dgm:shape>
+                  <dgm:presOf axis="ch des" ptType="node node" st="1 1" cnt="1 0"/>
+                  <dgm:constrLst>
+                    <dgm:constr type="tMarg" refType="primFontSz" fact="0.3"/>
+                    <dgm:constr type="bMarg" refType="primFontSz" fact="0.3"/>
+                    <dgm:constr type="lMarg" refType="primFontSz" fact="0.3"/>
+                    <dgm:constr type="rMarg" refType="primFontSz" fact="0.3"/>
+                  </dgm:constrLst>
+                  <dgm:ruleLst>
+                    <dgm:rule type="primFontSz" val="5" fact="NaN" max="NaN"/>
+                  </dgm:ruleLst>
+                </dgm:layoutNode>
+              </dgm:layoutNode>
+            </dgm:if>
+            <dgm:else name="Name10"/>
+          </dgm:choose>
+          <dgm:choose name="Name11">
+            <dgm:if name="Name12" axis="ch ch" ptType="node node" st="2 1" cnt="1 0" func="cnt" op="gte" val="1">
+              <dgm:layoutNode name="child2group">
+                <dgm:alg type="composite">
+                  <dgm:param type="horzAlign" val="none"/>
+                  <dgm:param type="vertAlign" val="none"/>
+                </dgm:alg>
+                <dgm:shape xmlns:r="http://schemas.openxmlformats.org/officeDocument/2006/relationships" r:blip="">
+                  <dgm:adjLst/>
+                </dgm:shape>
+                <dgm:choose name="Name13">
+                  <dgm:if name="Name14" func="var" arg="dir" op="equ" val="norm">
+                    <dgm:constrLst>
+                      <dgm:constr type="w" for="ch" forName="child2" refType="w"/>
+                      <dgm:constr type="h" for="ch" forName="child2" refType="h"/>
+                      <dgm:constr type="t" for="ch" forName="child2"/>
+                      <dgm:constr type="r" for="ch" forName="child2" refType="w"/>
+                      <dgm:constr type="w" for="ch" forName="child2Text" refType="w" fact="0.7"/>
+                      <dgm:constr type="h" for="ch" forName="child2Text" refType="h" fact="0.75"/>
+                      <dgm:constr type="t" for="ch" forName="child2Text"/>
+                      <dgm:constr type="r" for="ch" forName="child2Text" refType="w"/>
+                    </dgm:constrLst>
+                  </dgm:if>
+                  <dgm:else name="Name15">
+                    <dgm:constrLst>
+                      <dgm:constr type="w" for="ch" forName="child2" refType="w"/>
+                      <dgm:constr type="h" for="ch" forName="child2" refType="h"/>
+                      <dgm:constr type="t" for="ch" forName="child2"/>
+                      <dgm:constr type="l" for="ch" forName="child2"/>
+                      <dgm:constr type="w" for="ch" forName="child2Text" refType="w" fact="0.7"/>
+                      <dgm:constr type="h" for="ch" forName="child2Text" refType="h" fact="0.75"/>
+                      <dgm:constr type="t" for="ch" forName="child2Text"/>
+                      <dgm:constr type="l" for="ch" forName="child2Text"/>
+                    </dgm:constrLst>
+                  </dgm:else>
+                </dgm:choose>
+                <dgm:ruleLst/>
+                <dgm:layoutNode name="child2" styleLbl="bgAcc1">
+                  <dgm:alg type="sp"/>
+                  <dgm:shape xmlns:r="http://schemas.openxmlformats.org/officeDocument/2006/relationships" type="roundRect" r:blip="" zOrderOff="-2">
+                    <dgm:adjLst>
+                      <dgm:adj idx="1" val="0.1"/>
+                    </dgm:adjLst>
+                  </dgm:shape>
+                  <dgm:presOf axis="ch des" ptType="node node" st="2 1" cnt="1 0"/>
+                  <dgm:constrLst/>
+                  <dgm:ruleLst/>
+                </dgm:layoutNode>
+                <dgm:layoutNode name="child2Text" styleLbl="bgAcc1">
+                  <dgm:varLst>
+                    <dgm:bulletEnabled val="1"/>
+                  </dgm:varLst>
+                  <dgm:alg type="tx">
+                    <dgm:param type="stBulletLvl" val="1"/>
+                  </dgm:alg>
+                  <dgm:shape xmlns:r="http://schemas.openxmlformats.org/officeDocument/2006/relationships" type="roundRect" r:blip="" zOrderOff="-2" hideGeom="1">
+                    <dgm:adjLst>
+                      <dgm:adj idx="1" val="0.1"/>
+                    </dgm:adjLst>
+                  </dgm:shape>
+                  <dgm:presOf axis="ch des" ptType="node node" st="2 1" cnt="1 0"/>
+                  <dgm:constrLst>
+                    <dgm:constr type="tMarg" refType="primFontSz" fact="0.3"/>
+                    <dgm:constr type="bMarg" refType="primFontSz" fact="0.3"/>
+                    <dgm:constr type="lMarg" refType="primFontSz" fact="0.3"/>
+                    <dgm:constr type="rMarg" refType="primFontSz" fact="0.3"/>
+                  </dgm:constrLst>
+                  <dgm:ruleLst>
+                    <dgm:rule type="primFontSz" val="5" fact="NaN" max="NaN"/>
+                  </dgm:ruleLst>
+                </dgm:layoutNode>
+              </dgm:layoutNode>
+            </dgm:if>
+            <dgm:else name="Name16"/>
+          </dgm:choose>
+          <dgm:choose name="Name17">
+            <dgm:if name="Name18" axis="ch ch" ptType="node node" st="3 1" cnt="1 0" func="cnt" op="gte" val="1">
+              <dgm:layoutNode name="child3group">
+                <dgm:alg type="composite">
+                  <dgm:param type="horzAlign" val="none"/>
+                  <dgm:param type="vertAlign" val="none"/>
+                </dgm:alg>
+                <dgm:shape xmlns:r="http://schemas.openxmlformats.org/officeDocument/2006/relationships" r:blip="">
+                  <dgm:adjLst/>
+                </dgm:shape>
+                <dgm:presOf/>
+                <dgm:choose name="Name19">
+                  <dgm:if name="Name20" func="var" arg="dir" op="equ" val="norm">
+                    <dgm:constrLst>
+                      <dgm:constr type="w" for="ch" forName="child3" refType="w"/>
+                      <dgm:constr type="h" for="ch" forName="child3" refType="h"/>
+                      <dgm:constr type="b" for="ch" forName="child3" refType="h"/>
+                      <dgm:constr type="r" for="ch" forName="child3" refType="w"/>
+                      <dgm:constr type="w" for="ch" forName="child3Text" refType="w" fact="0.7"/>
+                      <dgm:constr type="h" for="ch" forName="child3Text" refType="h" fact="0.75"/>
+                      <dgm:constr type="b" for="ch" forName="child3Text" refType="h"/>
+                      <dgm:constr type="r" for="ch" forName="child3Text" refType="w"/>
+                    </dgm:constrLst>
+                  </dgm:if>
+                  <dgm:else name="Name21">
+                    <dgm:constrLst>
+                      <dgm:constr type="w" for="ch" forName="child3" refType="w"/>
+                      <dgm:constr type="h" for="ch" forName="child3" refType="h"/>
+                      <dgm:constr type="b" for="ch" forName="child3" refType="h"/>
+                      <dgm:constr type="l" for="ch" forName="child3"/>
+                      <dgm:constr type="w" for="ch" forName="child3Text" refType="w" fact="0.7"/>
+                      <dgm:constr type="h" for="ch" forName="child3Text" refType="h" fact="0.75"/>
+                      <dgm:constr type="b" for="ch" forName="child3Text" refType="h"/>
+                      <dgm:constr type="l" for="ch" forName="child3Text"/>
+                    </dgm:constrLst>
+                  </dgm:else>
+                </dgm:choose>
+                <dgm:ruleLst/>
+                <dgm:layoutNode name="child3" styleLbl="bgAcc1">
+                  <dgm:alg type="sp"/>
+                  <dgm:shape xmlns:r="http://schemas.openxmlformats.org/officeDocument/2006/relationships" type="roundRect" r:blip="" zOrderOff="-4">
+                    <dgm:adjLst>
+                      <dgm:adj idx="1" val="0.1"/>
+                    </dgm:adjLst>
+                  </dgm:shape>
+                  <dgm:presOf axis="ch des" ptType="node node" st="3 1" cnt="1 0"/>
+                  <dgm:constrLst/>
+                  <dgm:ruleLst/>
+                </dgm:layoutNode>
+                <dgm:layoutNode name="child3Text" styleLbl="bgAcc1">
+                  <dgm:varLst>
+                    <dgm:bulletEnabled val="1"/>
+                  </dgm:varLst>
+                  <dgm:alg type="tx">
+                    <dgm:param type="stBulletLvl" val="1"/>
+                  </dgm:alg>
+                  <dgm:shape xmlns:r="http://schemas.openxmlformats.org/officeDocument/2006/relationships" type="roundRect" r:blip="" zOrderOff="-4" hideGeom="1">
+                    <dgm:adjLst>
+                      <dgm:adj idx="1" val="0.1"/>
+                    </dgm:adjLst>
+                  </dgm:shape>
+                  <dgm:presOf axis="ch des" ptType="node node" st="3 1" cnt="1 0"/>
+                  <dgm:constrLst>
+                    <dgm:constr type="tMarg" refType="primFontSz" fact="0.3"/>
+                    <dgm:constr type="bMarg" refType="primFontSz" fact="0.3"/>
+                    <dgm:constr type="lMarg" refType="primFontSz" fact="0.3"/>
+                    <dgm:constr type="rMarg" refType="primFontSz" fact="0.3"/>
+                  </dgm:constrLst>
+                  <dgm:ruleLst>
+                    <dgm:rule type="primFontSz" val="5" fact="NaN" max="NaN"/>
+                  </dgm:ruleLst>
+                </dgm:layoutNode>
+              </dgm:layoutNode>
+            </dgm:if>
+            <dgm:else name="Name22"/>
+          </dgm:choose>
+          <dgm:choose name="Name23">
+            <dgm:if name="Name24" axis="ch ch" ptType="node node" st="4 1" cnt="1 0" func="cnt" op="gte" val="1">
+              <dgm:layoutNode name="child4group">
+                <dgm:alg type="composite">
+                  <dgm:param type="horzAlign" val="none"/>
+                  <dgm:param type="vertAlign" val="none"/>
+                </dgm:alg>
+                <dgm:shape xmlns:r="http://schemas.openxmlformats.org/officeDocument/2006/relationships" r:blip="">
+                  <dgm:adjLst/>
+                </dgm:shape>
+                <dgm:presOf/>
+                <dgm:choose name="Name25">
+                  <dgm:if name="Name26" func="var" arg="dir" op="equ" val="norm">
+                    <dgm:constrLst>
+                      <dgm:constr type="w" for="ch" forName="child4" refType="w"/>
+                      <dgm:constr type="h" for="ch" forName="child4" refType="h"/>
+                      <dgm:constr type="b" for="ch" forName="child4" refType="h"/>
+                      <dgm:constr type="l" for="ch" forName="child4"/>
+                      <dgm:constr type="w" for="ch" forName="child4Text" refType="w" fact="0.7"/>
+                      <dgm:constr type="h" for="ch" forName="child4Text" refType="h" fact="0.75"/>
+                      <dgm:constr type="b" for="ch" forName="child4Text" refType="h"/>
+                      <dgm:constr type="l" for="ch" forName="child4Text"/>
+                    </dgm:constrLst>
+                  </dgm:if>
+                  <dgm:else name="Name27">
+                    <dgm:constrLst>
+                      <dgm:constr type="w" for="ch" forName="child4" refType="w"/>
+                      <dgm:constr type="h" for="ch" forName="child4" refType="h"/>
+                      <dgm:constr type="b" for="ch" forName="child4" refType="h"/>
+                      <dgm:constr type="r" for="ch" forName="child4" refType="w"/>
+                      <dgm:constr type="w" for="ch" forName="child4Text" refType="w" fact="0.7"/>
+                      <dgm:constr type="h" for="ch" forName="child4Text" refType="h" fact="0.75"/>
+                      <dgm:constr type="b" for="ch" forName="child4Text" refType="h"/>
+                      <dgm:constr type="r" for="ch" forName="child4Text" refType="w"/>
+                    </dgm:constrLst>
+                  </dgm:else>
+                </dgm:choose>
+                <dgm:ruleLst/>
+                <dgm:layoutNode name="child4" styleLbl="bgAcc1">
+                  <dgm:alg type="sp"/>
+                  <dgm:shape xmlns:r="http://schemas.openxmlformats.org/officeDocument/2006/relationships" type="roundRect" r:blip="" zOrderOff="-4">
+                    <dgm:adjLst>
+                      <dgm:adj idx="1" val="0.1"/>
+                    </dgm:adjLst>
+                  </dgm:shape>
+                  <dgm:presOf axis="ch des" ptType="node node" st="4 1" cnt="1 0"/>
+                  <dgm:constrLst/>
+                  <dgm:ruleLst/>
+                </dgm:layoutNode>
+                <dgm:layoutNode name="child4Text" styleLbl="bgAcc1">
+                  <dgm:varLst>
+                    <dgm:bulletEnabled val="1"/>
+                  </dgm:varLst>
+                  <dgm:alg type="tx">
+                    <dgm:param type="stBulletLvl" val="1"/>
+                  </dgm:alg>
+                  <dgm:shape xmlns:r="http://schemas.openxmlformats.org/officeDocument/2006/relationships" type="roundRect" r:blip="" zOrderOff="-4" hideGeom="1">
+                    <dgm:adjLst>
+                      <dgm:adj idx="1" val="0.1"/>
+                    </dgm:adjLst>
+                  </dgm:shape>
+                  <dgm:presOf axis="ch des" ptType="node node" st="4 1" cnt="1 0"/>
+                  <dgm:constrLst>
+                    <dgm:constr type="tMarg" refType="primFontSz" fact="0.3"/>
+                    <dgm:constr type="bMarg" refType="primFontSz" fact="0.3"/>
+                    <dgm:constr type="lMarg" refType="primFontSz" fact="0.3"/>
+                    <dgm:constr type="rMarg" refType="primFontSz" fact="0.3"/>
+                  </dgm:constrLst>
+                  <dgm:ruleLst>
+                    <dgm:rule type="primFontSz" val="5" fact="NaN" max="NaN"/>
+                  </dgm:ruleLst>
+                </dgm:layoutNode>
+              </dgm:layoutNode>
+            </dgm:if>
+            <dgm:else name="Name28"/>
+          </dgm:choose>
+          <dgm:layoutNode name="childPlaceholder">
+            <dgm:alg type="sp"/>
+            <dgm:shape xmlns:r="http://schemas.openxmlformats.org/officeDocument/2006/relationships" r:blip="">
+              <dgm:adjLst/>
+            </dgm:shape>
+            <dgm:presOf/>
+            <dgm:constrLst/>
+            <dgm:ruleLst/>
+          </dgm:layoutNode>
+        </dgm:layoutNode>
+        <dgm:layoutNode name="circle">
+          <dgm:alg type="composite">
+            <dgm:param type="ar" val="1"/>
+          </dgm:alg>
+          <dgm:shape xmlns:r="http://schemas.openxmlformats.org/officeDocument/2006/relationships" r:blip="">
+            <dgm:adjLst/>
+          </dgm:shape>
+          <dgm:presOf/>
+          <dgm:choose name="Name29">
+            <dgm:if name="Name30" func="var" arg="dir" op="equ" val="norm">
+              <dgm:constrLst>
+                <dgm:constr type="primFontSz" for="ch" ptType="node" op="equ" val="65"/>
+                <dgm:constr type="w" for="ch" forName="quadrant1" refType="w" fact="0.433"/>
+                <dgm:constr type="h" for="ch" forName="quadrant1" refType="h" fact="0.433"/>
+                <dgm:constr type="b" for="ch" forName="quadrant1" refType="h" fact="0.5"/>
+                <dgm:constr type="bOff" for="ch" forName="quadrant1" refType="h" fact="-0.01"/>
+                <dgm:constr type="r" for="ch" forName="quadrant1" refType="w" fact="0.5"/>
+                <dgm:constr type="rOff" for="ch" forName="quadrant1" refType="w" fact="-0.01"/>
+                <dgm:constr type="w" for="ch" forName="quadrant2" refType="w" fact="0.433"/>
+                <dgm:constr type="h" for="ch" forName="quadrant2" refType="h" fact="0.433"/>
+                <dgm:constr type="b" for="ch" forName="quadrant2" refType="h" fact="0.5"/>
+                <dgm:constr type="bOff" for="ch" forName="quadrant2" refType="h" fact="-0.01"/>
+                <dgm:constr type="l" for="ch" forName="quadrant2" refType="w" fact="0.5"/>
+                <dgm:constr type="lOff" for="ch" forName="quadrant2" refType="w" fact="0.01"/>
+                <dgm:constr type="w" for="ch" forName="quadrant3" refType="w" fact="0.433"/>
+                <dgm:constr type="h" for="ch" forName="quadrant3" refType="h" fact="0.433"/>
+                <dgm:constr type="t" for="ch" forName="quadrant3" refType="h" fact="0.5"/>
+                <dgm:constr type="tOff" for="ch" forName="quadrant3" refType="h" fact="0.01"/>
+                <dgm:constr type="l" for="ch" forName="quadrant3" refType="w" fact="0.5"/>
+                <dgm:constr type="lOff" for="ch" forName="quadrant3" refType="w" fact="0.01"/>
+                <dgm:constr type="w" for="ch" forName="quadrant4" refType="w" fact="0.433"/>
+                <dgm:constr type="h" for="ch" forName="quadrant4" refType="h" fact="0.433"/>
+                <dgm:constr type="t" for="ch" forName="quadrant4" refType="h" fact="0.5"/>
+                <dgm:constr type="tOff" for="ch" forName="quadrant4" refType="h" fact="0.01"/>
+                <dgm:constr type="r" for="ch" forName="quadrant4" refType="w" fact="0.5"/>
+                <dgm:constr type="rOff" for="ch" forName="quadrant4" refType="w" fact="-0.01"/>
+              </dgm:constrLst>
+            </dgm:if>
+            <dgm:else name="Name31">
+              <dgm:constrLst>
+                <dgm:constr type="primFontSz" for="ch" ptType="node" op="equ" val="65"/>
+                <dgm:constr type="w" for="ch" forName="quadrant1" refType="w" fact="0.433"/>
+                <dgm:constr type="h" for="ch" forName="quadrant1" refType="h" fact="0.433"/>
+                <dgm:constr type="b" for="ch" forName="quadrant1" refType="h" fact="0.5"/>
+                <dgm:constr type="bOff" for="ch" forName="quadrant1" refType="h" fact="-0.01"/>
+                <dgm:constr type="l" for="ch" forName="quadrant1" refType="w" fact="0.5"/>
+                <dgm:constr type="lOff" for="ch" forName="quadrant1" refType="w" fact="0.01"/>
+                <dgm:constr type="w" for="ch" forName="quadrant2" refType="w" fact="0.433"/>
+                <dgm:constr type="h" for="ch" forName="quadrant2" refType="h" fact="0.433"/>
+                <dgm:constr type="b" for="ch" forName="quadrant2" refType="h" fact="0.5"/>
+                <dgm:constr type="bOff" for="ch" forName="quadrant2" refType="h" fact="-0.01"/>
+                <dgm:constr type="r" for="ch" forName="quadrant2" refType="w" fact="0.5"/>
+                <dgm:constr type="rOff" for="ch" forName="quadrant2" refType="w" fact="-0.01"/>
+                <dgm:constr type="w" for="ch" forName="quadrant3" refType="w" fact="0.433"/>
+                <dgm:constr type="h" for="ch" forName="quadrant3" refType="h" fact="0.433"/>
+                <dgm:constr type="t" for="ch" forName="quadrant3" refType="h" fact="0.5"/>
+                <dgm:constr type="tOff" for="ch" forName="quadrant3" refType="h" fact="0.01"/>
+                <dgm:constr type="r" for="ch" forName="quadrant3" refType="w" fact="0.5"/>
+                <dgm:constr type="rOff" for="ch" forName="quadrant3" refType="w" fact="-0.01"/>
+                <dgm:constr type="w" for="ch" forName="quadrant4" refType="w" fact="0.433"/>
+                <dgm:constr type="h" for="ch" forName="quadrant4" refType="h" fact="0.433"/>
+                <dgm:constr type="t" for="ch" forName="quadrant4" refType="h" fact="0.5"/>
+                <dgm:constr type="tOff" for="ch" forName="quadrant4" refType="h" fact="0.01"/>
+                <dgm:constr type="l" for="ch" forName="quadrant4" refType="w" fact="0.5"/>
+                <dgm:constr type="lOff" for="ch" forName="quadrant4" refType="w" fact="0.01"/>
+              </dgm:constrLst>
+            </dgm:else>
+          </dgm:choose>
+          <dgm:ruleLst/>
+          <dgm:layoutNode name="quadrant1" styleLbl="node1">
+            <dgm:varLst>
+              <dgm:chMax val="1"/>
+              <dgm:bulletEnabled val="1"/>
+            </dgm:varLst>
+            <dgm:alg type="tx"/>
+            <dgm:choose name="Name32">
+              <dgm:if name="Name33" func="var" arg="dir" op="equ" val="norm">
+                <dgm:shape xmlns:r="http://schemas.openxmlformats.org/officeDocument/2006/relationships" type="pieWedge" r:blip="">
+                  <dgm:adjLst/>
+                </dgm:shape>
+              </dgm:if>
+              <dgm:else name="Name34">
+                <dgm:shape xmlns:r="http://schemas.openxmlformats.org/officeDocument/2006/relationships" rot="90" type="pieWedge" r:blip="">
+                  <dgm:adjLst/>
+                </dgm:shape>
+              </dgm:else>
+            </dgm:choose>
+            <dgm:presOf axis="ch" ptType="node" cnt="1"/>
+            <dgm:constrLst/>
+            <dgm:ruleLst>
+              <dgm:rule type="primFontSz" val="5" fact="NaN" max="NaN"/>
+            </dgm:ruleLst>
+          </dgm:layoutNode>
+          <dgm:layoutNode name="quadrant2" styleLbl="node1">
+            <dgm:varLst>
+              <dgm:chMax val="1"/>
+              <dgm:bulletEnabled val="1"/>
+            </dgm:varLst>
+            <dgm:alg type="tx"/>
+            <dgm:choose name="Name35">
+              <dgm:if name="Name36" func="var" arg="dir" op="equ" val="norm">
+                <dgm:shape xmlns:r="http://schemas.openxmlformats.org/officeDocument/2006/relationships" rot="90" type="pieWedge" r:blip="">
+                  <dgm:adjLst/>
+                </dgm:shape>
+              </dgm:if>
+              <dgm:else name="Name37">
+                <dgm:shape xmlns:r="http://schemas.openxmlformats.org/officeDocument/2006/relationships" type="pieWedge" r:blip="">
+                  <dgm:adjLst/>
+                </dgm:shape>
+              </dgm:else>
+            </dgm:choose>
+            <dgm:presOf axis="ch" ptType="node" st="2" cnt="1"/>
+            <dgm:constrLst/>
+            <dgm:ruleLst>
+              <dgm:rule type="primFontSz" val="5" fact="NaN" max="NaN"/>
+            </dgm:ruleLst>
+          </dgm:layoutNode>
+          <dgm:layoutNode name="quadrant3" styleLbl="node1">
+            <dgm:varLst>
+              <dgm:chMax val="1"/>
+              <dgm:bulletEnabled val="1"/>
+            </dgm:varLst>
+            <dgm:alg type="tx"/>
+            <dgm:choose name="Name38">
+              <dgm:if name="Name39" func="var" arg="dir" op="equ" val="norm">
+                <dgm:shape xmlns:r="http://schemas.openxmlformats.org/officeDocument/2006/relationships" rot="180" type="pieWedge" r:blip="">
+                  <dgm:adjLst/>
+                </dgm:shape>
+              </dgm:if>
+              <dgm:else name="Name40">
+                <dgm:shape xmlns:r="http://schemas.openxmlformats.org/officeDocument/2006/relationships" rot="270" type="pieWedge" r:blip="">
+                  <dgm:adjLst/>
+                </dgm:shape>
+              </dgm:else>
+            </dgm:choose>
+            <dgm:presOf axis="ch" ptType="node" st="3" cnt="1"/>
+            <dgm:constrLst/>
+            <dgm:ruleLst>
+              <dgm:rule type="primFontSz" val="5" fact="NaN" max="NaN"/>
+            </dgm:ruleLst>
+          </dgm:layoutNode>
+          <dgm:layoutNode name="quadrant4" styleLbl="node1">
+            <dgm:varLst>
+              <dgm:chMax val="1"/>
+              <dgm:bulletEnabled val="1"/>
+            </dgm:varLst>
+            <dgm:alg type="tx"/>
+            <dgm:choose name="Name41">
+              <dgm:if name="Name42" func="var" arg="dir" op="equ" val="norm">
+                <dgm:shape xmlns:r="http://schemas.openxmlformats.org/officeDocument/2006/relationships" rot="270" type="pieWedge" r:blip="">
+                  <dgm:adjLst/>
+                </dgm:shape>
+              </dgm:if>
+              <dgm:else name="Name43">
+                <dgm:shape xmlns:r="http://schemas.openxmlformats.org/officeDocument/2006/relationships" rot="180" type="pieWedge" r:blip="">
+                  <dgm:adjLst/>
+                </dgm:shape>
+              </dgm:else>
+            </dgm:choose>
+            <dgm:presOf axis="ch" ptType="node" st="4" cnt="1"/>
+            <dgm:constrLst/>
+            <dgm:ruleLst>
+              <dgm:rule type="primFontSz" val="5" fact="NaN" max="NaN"/>
+            </dgm:ruleLst>
+          </dgm:layoutNode>
+          <dgm:layoutNode name="quadrantPlaceholder">
+            <dgm:alg type="sp"/>
+            <dgm:shape xmlns:r="http://schemas.openxmlformats.org/officeDocument/2006/relationships" r:blip="">
+              <dgm:adjLst/>
+            </dgm:shape>
+            <dgm:presOf/>
+            <dgm:constrLst/>
+            <dgm:ruleLst/>
+          </dgm:layoutNode>
+        </dgm:layoutNode>
+        <dgm:layoutNode name="center1" styleLbl="fgShp">
+          <dgm:alg type="sp"/>
+          <dgm:choose name="Name44">
+            <dgm:if name="Name45" func="var" arg="dir" op="equ" val="norm">
+              <dgm:shape xmlns:r="http://schemas.openxmlformats.org/officeDocument/2006/relationships" type="circularArrow" r:blip="" zOrderOff="16">
+                <dgm:adjLst/>
+              </dgm:shape>
+            </dgm:if>
+            <dgm:else name="Name46">
+              <dgm:shape xmlns:r="http://schemas.openxmlformats.org/officeDocument/2006/relationships" rot="180" type="leftCircularArrow" r:blip="" zOrderOff="16">
+                <dgm:adjLst/>
+              </dgm:shape>
+            </dgm:else>
+          </dgm:choose>
+          <dgm:presOf/>
+          <dgm:constrLst/>
+          <dgm:ruleLst/>
+        </dgm:layoutNode>
+        <dgm:layoutNode name="center2" styleLbl="fgShp">
+          <dgm:alg type="sp"/>
+          <dgm:choose name="Name47">
+            <dgm:if name="Name48" func="var" arg="dir" op="equ" val="norm">
+              <dgm:shape xmlns:r="http://schemas.openxmlformats.org/officeDocument/2006/relationships" rot="180" type="circularArrow" r:blip="" zOrderOff="16">
+                <dgm:adjLst/>
+              </dgm:shape>
+            </dgm:if>
+            <dgm:else name="Name49">
+              <dgm:shape xmlns:r="http://schemas.openxmlformats.org/officeDocument/2006/relationships" type="leftCircularArrow" r:blip="" zOrderOff="16">
+                <dgm:adjLst/>
+              </dgm:shape>
+            </dgm:else>
+          </dgm:choose>
+          <dgm:presOf/>
+          <dgm:constrLst/>
+          <dgm:ruleLst/>
+        </dgm:layoutNode>
+      </dgm:if>
+      <dgm:else name="Name50"/>
+    </dgm:choose>
+  </dgm:layoutNode>
+</dgm:layoutDef>
+</file>
+
 <file path=ppt/diagrams/quickStyle1.xml><?xml version="1.0" encoding="utf-8"?>
+<dgm:styleDef xmlns:dgm="http://schemas.openxmlformats.org/drawingml/2006/diagram" xmlns:a="http://schemas.openxmlformats.org/drawingml/2006/main" uniqueId="urn:microsoft.com/office/officeart/2005/8/quickstyle/3d1">
+  <dgm:title val=""/>
+  <dgm:desc val=""/>
+  <dgm:catLst>
+    <dgm:cat type="3D" pri="11100"/>
+  </dgm:catLst>
+  <dgm:scene3d>
+    <a:camera prst="orthographicFront"/>
+    <a:lightRig rig="threePt" dir="t"/>
+  </dgm:scene3d>
+  <dgm:styleLbl name="node0">
+    <dgm:scene3d>
+      <a:camera prst="orthographicFront"/>
+      <a:lightRig rig="flat" dir="t"/>
+    </dgm:scene3d>
+    <dgm:sp3d prstMaterial="plastic">
+      <a:bevelT w="120900" h="88900"/>
+      <a:bevelB w="88900" h="31750" prst="angle"/>
+    </dgm:sp3d>
+    <dgm:txPr/>
+    <dgm:style>
+      <a:lnRef idx="0">
+        <a:scrgbClr r="0" g="0" b="0"/>
+      </a:lnRef>
+      <a:fillRef idx="3">
+        <a:scrgbClr r="0" g="0" b="0"/>
+      </a:fillRef>
+      <a:effectRef idx="2">
+        <a:scrgbClr r="0" g="0" b="0"/>
+      </a:effectRef>
+      <a:fontRef idx="minor">
+        <a:schemeClr val="lt1"/>
+      </a:fontRef>
+    </dgm:style>
+  </dgm:styleLbl>
+  <dgm:styleLbl name="lnNode1">
+    <dgm:scene3d>
+      <a:camera prst="orthographicFront"/>
+      <a:lightRig rig="flat" dir="t"/>
+    </dgm:scene3d>
+    <dgm:sp3d prstMaterial="plastic">
+      <a:bevelT w="120900" h="88900"/>
+      <a:bevelB w="88900" h="31750" prst="angle"/>
+    </dgm:sp3d>
+    <dgm:txPr/>
+    <dgm:style>
+      <a:lnRef idx="0">
+        <a:scrgbClr r="0" g="0" b="0"/>
+      </a:lnRef>
+      <a:fillRef idx="3">
+        <a:scrgbClr r="0" g="0" b="0"/>
+      </a:fillRef>
+      <a:effectRef idx="1">
+        <a:scrgbClr r="0" g="0" b="0"/>
+      </a:effectRef>
+      <a:fontRef idx="minor">
+        <a:schemeClr val="lt1"/>
+      </a:fontRef>
+    </dgm:style>
+  </dgm:styleLbl>
+  <dgm:styleLbl name="vennNode1">
+    <dgm:scene3d>
+      <a:camera prst="orthographicFront"/>
+      <a:lightRig rig="flat" dir="t"/>
+    </dgm:scene3d>
+    <dgm:sp3d prstMaterial="plastic">
+      <a:bevelT w="120900" h="88900"/>
+      <a:bevelB w="88900" h="31750" prst="angle"/>
+    </dgm:sp3d>
+    <dgm:txPr/>
+    <dgm:style>
+      <a:lnRef idx="0">
+        <a:scrgbClr r="0" g="0" b="0"/>
+      </a:lnRef>
+      <a:fillRef idx="1">
+        <a:scrgbClr r="0" g="0" b="0"/>
+      </a:fillRef>
+      <a:effectRef idx="1">
+        <a:scrgbClr r="0" g="0" b="0"/>
+      </a:effectRef>
+      <a:fontRef idx="minor">
+        <a:schemeClr val="tx1"/>
+      </a:fontRef>
+    </dgm:style>
+  </dgm:styleLbl>
+  <dgm:styleLbl name="alignNode1">
+    <dgm:scene3d>
+      <a:camera prst="orthographicFront"/>
+      <a:lightRig rig="flat" dir="t"/>
+    </dgm:scene3d>
+    <dgm:sp3d prstMaterial="plastic">
+      <a:bevelT w="120900" h="88900"/>
+      <a:bevelB w="88900" h="31750" prst="angle"/>
+    </dgm:sp3d>
+    <dgm:txPr/>
+    <dgm:style>
+      <a:lnRef idx="1">
+        <a:scrgbClr r="0" g="0" b="0"/>
+      </a:lnRef>
+      <a:fillRef idx="3">
+        <a:scrgbClr r="0" g="0" b="0"/>
+      </a:fillRef>
+      <a:effectRef idx="2">
+        <a:scrgbClr r="0" g="0" b="0"/>
+      </a:effectRef>
+      <a:fontRef idx="minor">
+        <a:schemeClr val="lt1"/>
+      </a:fontRef>
+    </dgm:style>
+  </dgm:styleLbl>
+  <dgm:styleLbl name="node1">
+    <dgm:scene3d>
+      <a:camera prst="orthographicFront"/>
+      <a:lightRig rig="flat" dir="t"/>
+    </dgm:scene3d>
+    <dgm:sp3d prstMaterial="plastic">
+      <a:bevelT w="120900" h="88900"/>
+      <a:bevelB w="88900" h="31750" prst="angle"/>
+    </dgm:sp3d>
+    <dgm:txPr/>
+    <dgm:style>
+      <a:lnRef idx="0">
+        <a:scrgbClr r="0" g="0" b="0"/>
+      </a:lnRef>
+      <a:fillRef idx="3">
+        <a:scrgbClr r="0" g="0" b="0"/>
+      </a:fillRef>
+      <a:effectRef idx="2">
+        <a:scrgbClr r="0" g="0" b="0"/>
+      </a:effectRef>
+      <a:fontRef idx="minor">
+        <a:schemeClr val="lt1"/>
+      </a:fontRef>
+    </dgm:style>
+  </dgm:styleLbl>
+  <dgm:styleLbl name="node2">
+    <dgm:scene3d>
+      <a:camera prst="orthographicFront"/>
+      <a:lightRig rig="flat" dir="t"/>
+    </dgm:scene3d>
+    <dgm:sp3d prstMaterial="plastic">
+      <a:bevelT w="120900" h="88900"/>
+      <a:bevelB w="88900" h="31750" prst="angle"/>
+    </dgm:sp3d>
+    <dgm:txPr/>
+    <dgm:style>
+      <a:lnRef idx="0">
+        <a:scrgbClr r="0" g="0" b="0"/>
+      </a:lnRef>
+      <a:fillRef idx="3">
+        <a:scrgbClr r="0" g="0" b="0"/>
+      </a:fillRef>
+      <a:effectRef idx="1">
+        <a:scrgbClr r="0" g="0" b="0"/>
+      </a:effectRef>
+      <a:fontRef idx="minor">
+        <a:schemeClr val="lt1"/>
+      </a:fontRef>
+    </dgm:style>
+  </dgm:styleLbl>
+  <dgm:styleLbl name="node3">
+    <dgm:scene3d>
+      <a:camera prst="orthographicFront"/>
+      <a:lightRig rig="flat" dir="t"/>
+    </dgm:scene3d>
+    <dgm:sp3d prstMaterial="plastic">
+      <a:bevelT w="120900" h="88900"/>
+      <a:bevelB w="88900" h="31750" prst="angle"/>
+    </dgm:sp3d>
+    <dgm:txPr/>
+    <dgm:style>
+      <a:lnRef idx="0">
+        <a:scrgbClr r="0" g="0" b="0"/>
+      </a:lnRef>
+      <a:fillRef idx="3">
+        <a:scrgbClr r="0" g="0" b="0"/>
+      </a:fillRef>
+      <a:effectRef idx="1">
+        <a:scrgbClr r="0" g="0" b="0"/>
+      </a:effectRef>
+      <a:fontRef idx="minor">
+        <a:schemeClr val="lt1"/>
+      </a:fontRef>
+    </dgm:style>
+  </dgm:styleLbl>
+  <dgm:styleLbl name="node4">
+    <dgm:scene3d>
+      <a:camera prst="orthographicFront"/>
+      <a:lightRig rig="flat" dir="t"/>
+    </dgm:scene3d>
+    <dgm:sp3d prstMaterial="plastic">
+      <a:bevelT w="120900" h="88900"/>
+      <a:bevelB w="88900" h="31750" prst="angle"/>
+    </dgm:sp3d>
+    <dgm:txPr/>
+    <dgm:style>
+      <a:lnRef idx="0">
+        <a:scrgbClr r="0" g="0" b="0"/>
+      </a:lnRef>
+      <a:fillRef idx="3">
+        <a:scrgbClr r="0" g="0" b="0"/>
+      </a:fillRef>
+      <a:effectRef idx="1">
+        <a:scrgbClr r="0" g="0" b="0"/>
+      </a:effectRef>
+      <a:fontRef idx="minor">
+        <a:schemeClr val="lt1"/>
+      </a:fontRef>
+    </dgm:style>
+  </dgm:styleLbl>
+  <dgm:styleLbl name="fgImgPlace1">
+    <dgm:scene3d>
+      <a:camera prst="orthographicFront"/>
+      <a:lightRig rig="flat" dir="t"/>
+    </dgm:scene3d>
+    <dgm:sp3d z="127000" prstMaterial="plastic">
+      <a:bevelT w="88900" h="88900"/>
+      <a:bevelB w="88900" h="31750" prst="angle"/>
+    </dgm:sp3d>
+    <dgm:txPr/>
+    <dgm:style>
+      <a:lnRef idx="0">
+        <a:scrgbClr r="0" g="0" b="0"/>
+      </a:lnRef>
+      <a:fillRef idx="3">
+        <a:scrgbClr r="0" g="0" b="0"/>
+      </a:fillRef>
+      <a:effectRef idx="2">
+        <a:scrgbClr r="0" g="0" b="0"/>
+      </a:effectRef>
+      <a:fontRef idx="minor"/>
+    </dgm:style>
+  </dgm:styleLbl>
+  <dgm:styleLbl name="alignImgPlace1">
+    <dgm:scene3d>
+      <a:camera prst="orthographicFront"/>
+      <a:lightRig rig="flat" dir="t"/>
+    </dgm:scene3d>
+    <dgm:sp3d prstMaterial="plastic">
+      <a:bevelT w="88900" h="88900"/>
+      <a:bevelB w="88900" h="31750" prst="angle"/>
+    </dgm:sp3d>
+    <dgm:txPr/>
+    <dgm:style>
+      <a:lnRef idx="0">
+        <a:scrgbClr r="0" g="0" b="0"/>
+      </a:lnRef>
+      <a:fillRef idx="3">
+        <a:scrgbClr r="0" g="0" b="0"/>
+      </a:fillRef>
+      <a:effectRef idx="2">
+        <a:scrgbClr r="0" g="0" b="0"/>
+      </a:effectRef>
+      <a:fontRef idx="minor"/>
+    </dgm:style>
+  </dgm:styleLbl>
+  <dgm:styleLbl name="bgImgPlace1">
+    <dgm:scene3d>
+      <a:camera prst="orthographicFront"/>
+      <a:lightRig rig="flat" dir="t"/>
+    </dgm:scene3d>
+    <dgm:sp3d z="-190500" prstMaterial="plastic">
+      <a:bevelT w="88900" h="88900"/>
+      <a:bevelB w="88900" h="31750" prst="angle"/>
+    </dgm:sp3d>
+    <dgm:txPr/>
+    <dgm:style>
+      <a:lnRef idx="0">
+        <a:scrgbClr r="0" g="0" b="0"/>
+      </a:lnRef>
+      <a:fillRef idx="3">
+        <a:scrgbClr r="0" g="0" b="0"/>
+      </a:fillRef>
+      <a:effectRef idx="2">
+        <a:scrgbClr r="0" g="0" b="0"/>
+      </a:effectRef>
+      <a:fontRef idx="minor"/>
+    </dgm:style>
+  </dgm:styleLbl>
+  <dgm:styleLbl name="sibTrans2D1">
+    <dgm:scene3d>
+      <a:camera prst="orthographicFront"/>
+      <a:lightRig rig="flat" dir="t"/>
+    </dgm:scene3d>
+    <dgm:sp3d z="-80000" prstMaterial="plastic">
+      <a:bevelT w="50800" h="50800"/>
+      <a:bevelB w="25400" h="25400" prst="angle"/>
+    </dgm:sp3d>
+    <dgm:txPr/>
+    <dgm:style>
+      <a:lnRef idx="0">
+        <a:scrgbClr r="0" g="0" b="0"/>
+      </a:lnRef>
+      <a:fillRef idx="3">
+        <a:scrgbClr r="0" g="0" b="0"/>
+      </a:fillRef>
+      <a:effectRef idx="2">
+        <a:scrgbClr r="0" g="0" b="0"/>
+      </a:effectRef>
+      <a:fontRef idx="minor">
+        <a:schemeClr val="lt1"/>
+      </a:fontRef>
+    </dgm:style>
+  </dgm:styleLbl>
+  <dgm:styleLbl name="fgSibTrans2D1">
+    <dgm:scene3d>
+      <a:camera prst="orthographicFront"/>
+      <a:lightRig rig="flat" dir="t"/>
+    </dgm:scene3d>
+    <dgm:sp3d z="127000" prstMaterial="plastic">
+      <a:bevelT w="50800" h="50800"/>
+      <a:bevelB w="25400" h="25400" prst="angle"/>
+    </dgm:sp3d>
+    <dgm:txPr/>
+    <dgm:style>
+      <a:lnRef idx="0">
+        <a:scrgbClr r="0" g="0" b="0"/>
+      </a:lnRef>
+      <a:fillRef idx="3">
+        <a:scrgbClr r="0" g="0" b="0"/>
+      </a:fillRef>
+      <a:effectRef idx="2">
+        <a:scrgbClr r="0" g="0" b="0"/>
+      </a:effectRef>
+      <a:fontRef idx="minor">
+        <a:schemeClr val="lt1"/>
+      </a:fontRef>
+    </dgm:style>
+  </dgm:styleLbl>
+  <dgm:styleLbl name="bgSibTrans2D1">
+    <dgm:scene3d>
+      <a:camera prst="orthographicFront"/>
+      <a:lightRig rig="flat" dir="t"/>
+    </dgm:scene3d>
+    <dgm:sp3d z="-190500" prstMaterial="plastic">
+      <a:bevelT w="50800" h="50800"/>
+      <a:bevelB w="25400" h="25400" prst="angle"/>
+    </dgm:sp3d>
+    <dgm:txPr/>
+    <dgm:style>
+      <a:lnRef idx="0">
+        <a:scrgbClr r="0" g="0" b="0"/>
+      </a:lnRef>
+      <a:fillRef idx="3">
+        <a:scrgbClr r="0" g="0" b="0"/>
+      </a:fillRef>
+      <a:effectRef idx="2">
+        <a:scrgbClr r="0" g="0" b="0"/>
+      </a:effectRef>
+      <a:fontRef idx="minor">
+        <a:schemeClr val="lt1"/>
+      </a:fontRef>
+    </dgm:style>
+  </dgm:styleLbl>
+  <dgm:styleLbl name="sibTrans1D1">
+    <dgm:scene3d>
+      <a:camera prst="orthographicFront"/>
+      <a:lightRig rig="flat" dir="t"/>
+    </dgm:scene3d>
+    <dgm:sp3d z="-40000" prstMaterial="matte"/>
+    <dgm:txPr/>
+    <dgm:style>
+      <a:lnRef idx="1">
+        <a:scrgbClr r="0" g="0" b="0"/>
+      </a:lnRef>
+      <a:fillRef idx="0">
+        <a:scrgbClr r="0" g="0" b="0"/>
+      </a:fillRef>
+      <a:effectRef idx="0">
+        <a:scrgbClr r="0" g="0" b="0"/>
+      </a:effectRef>
+      <a:fontRef idx="minor"/>
+    </dgm:style>
+  </dgm:styleLbl>
+  <dgm:styleLbl name="callout">
+    <dgm:scene3d>
+      <a:camera prst="orthographicFront"/>
+      <a:lightRig rig="threePt" dir="t"/>
+    </dgm:scene3d>
+    <dgm:sp3d z="127000" prstMaterial="matte"/>
+    <dgm:txPr/>
+    <dgm:style>
+      <a:lnRef idx="2">
+        <a:scrgbClr r="0" g="0" b="0"/>
+      </a:lnRef>
+      <a:fillRef idx="1">
+        <a:scrgbClr r="0" g="0" b="0"/>
+      </a:fillRef>
+      <a:effectRef idx="0">
+        <a:scrgbClr r="0" g="0" b="0"/>
+      </a:effectRef>
+      <a:fontRef idx="minor"/>
+    </dgm:style>
+  </dgm:styleLbl>
+  <dgm:styleLbl name="asst0">
+    <dgm:scene3d>
+      <a:camera prst="orthographicFront"/>
+      <a:lightRig rig="flat" dir="t"/>
+    </dgm:scene3d>
+    <dgm:sp3d prstMaterial="plastic">
+      <a:bevelT w="120900" h="88900"/>
+      <a:bevelB w="88900" h="31750" prst="angle"/>
+    </dgm:sp3d>
+    <dgm:txPr/>
+    <dgm:style>
+      <a:lnRef idx="0">
+        <a:scrgbClr r="0" g="0" b="0"/>
+      </a:lnRef>
+      <a:fillRef idx="3">
+        <a:scrgbClr r="0" g="0" b="0"/>
+      </a:fillRef>
+      <a:effectRef idx="1">
+        <a:scrgbClr r="0" g="0" b="0"/>
+      </a:effectRef>
+      <a:fontRef idx="minor">
+        <a:schemeClr val="lt1"/>
+      </a:fontRef>
+    </dgm:style>
+  </dgm:styleLbl>
+  <dgm:styleLbl name="asst1">
+    <dgm:scene3d>
+      <a:camera prst="orthographicFront"/>
+      <a:lightRig rig="flat" dir="t"/>
+    </dgm:scene3d>
+    <dgm:sp3d prstMaterial="plastic">
+      <a:bevelT w="120900" h="88900"/>
+      <a:bevelB w="88900" h="31750" prst="angle"/>
+    </dgm:sp3d>
+    <dgm:txPr/>
+    <dgm:style>
+      <a:lnRef idx="0">
+        <a:scrgbClr r="0" g="0" b="0"/>
+      </a:lnRef>
+      <a:fillRef idx="3">
+        <a:scrgbClr r="0" g="0" b="0"/>
+      </a:fillRef>
+      <a:effectRef idx="1">
+        <a:scrgbClr r="0" g="0" b="0"/>
+      </a:effectRef>
+      <a:fontRef idx="minor">
+        <a:schemeClr val="lt1"/>
+      </a:fontRef>
+    </dgm:style>
+  </dgm:styleLbl>
+  <dgm:styleLbl name="asst2">
+    <dgm:scene3d>
+      <a:camera prst="orthographicFront"/>
+      <a:lightRig rig="flat" dir="t"/>
+    </dgm:scene3d>
+    <dgm:sp3d prstMaterial="plastic">
+      <a:bevelT w="120900" h="88900"/>
+      <a:bevelB w="88900" h="31750" prst="angle"/>
+    </dgm:sp3d>
+    <dgm:txPr/>
+    <dgm:style>
+      <a:lnRef idx="0">
+        <a:scrgbClr r="0" g="0" b="0"/>
+      </a:lnRef>
+      <a:fillRef idx="3">
+        <a:scrgbClr r="0" g="0" b="0"/>
+      </a:fillRef>
+      <a:effectRef idx="1">
+        <a:scrgbClr r="0" g="0" b="0"/>
+      </a:effectRef>
+      <a:fontRef idx="minor">
+        <a:schemeClr val="lt1"/>
+      </a:fontRef>
+    </dgm:style>
+  </dgm:styleLbl>
+  <dgm:styleLbl name="asst3">
+    <dgm:scene3d>
+      <a:camera prst="orthographicFront"/>
+      <a:lightRig rig="flat" dir="t"/>
+    </dgm:scene3d>
+    <dgm:sp3d prstMaterial="plastic">
+      <a:bevelT w="120900" h="88900"/>
+      <a:bevelB w="88900" h="31750" prst="angle"/>
+    </dgm:sp3d>
+    <dgm:txPr/>
+    <dgm:style>
+      <a:lnRef idx="0">
+        <a:scrgbClr r="0" g="0" b="0"/>
+      </a:lnRef>
+      <a:fillRef idx="3">
+        <a:scrgbClr r="0" g="0" b="0"/>
+      </a:fillRef>
+      <a:effectRef idx="1">
+        <a:scrgbClr r="0" g="0" b="0"/>
+      </a:effectRef>
+      <a:fontRef idx="minor">
+        <a:schemeClr val="lt1"/>
+      </a:fontRef>
+    </dgm:style>
+  </dgm:styleLbl>
+  <dgm:styleLbl name="parChTrans2D1">
+    <dgm:scene3d>
+      <a:camera prst="orthographicFront"/>
+      <a:lightRig rig="flat" dir="t"/>
+    </dgm:scene3d>
+    <dgm:sp3d z="-100000" prstMaterial="plastic">
+      <a:bevelT w="120900" h="88900"/>
+      <a:bevelB w="88900" h="31750" prst="angle"/>
+    </dgm:sp3d>
+    <dgm:txPr/>
+    <dgm:style>
+      <a:lnRef idx="0">
+        <a:scrgbClr r="0" g="0" b="0"/>
+      </a:lnRef>
+      <a:fillRef idx="3">
+        <a:scrgbClr r="0" g="0" b="0"/>
+      </a:fillRef>
+      <a:effectRef idx="1">
+        <a:scrgbClr r="0" g="0" b="0"/>
+      </a:effectRef>
+      <a:fontRef idx="minor">
+        <a:schemeClr val="lt1"/>
+      </a:fontRef>
+    </dgm:style>
+  </dgm:styleLbl>
+  <dgm:styleLbl name="parChTrans2D2">
+    <dgm:scene3d>
+      <a:camera prst="orthographicFront"/>
+      <a:lightRig rig="flat" dir="t"/>
+    </dgm:scene3d>
+    <dgm:sp3d z="-60000" prstMaterial="plastic">
+      <a:bevelT w="120900" h="88900"/>
+      <a:bevelB w="88900" h="31750" prst="angle"/>
+    </dgm:sp3d>
+    <dgm:txPr/>
+    <dgm:style>
+      <a:lnRef idx="0">
+        <a:scrgbClr r="0" g="0" b="0"/>
+      </a:lnRef>
+      <a:fillRef idx="3">
+        <a:scrgbClr r="0" g="0" b="0"/>
+      </a:fillRef>
+      <a:effectRef idx="1">
+        <a:scrgbClr r="0" g="0" b="0"/>
+      </a:effectRef>
+      <a:fontRef idx="minor">
+        <a:schemeClr val="lt1"/>
+      </a:fontRef>
+    </dgm:style>
+  </dgm:styleLbl>
+  <dgm:styleLbl name="parChTrans2D3">
+    <dgm:scene3d>
+      <a:camera prst="orthographicFront"/>
+      <a:lightRig rig="flat" dir="t"/>
+    </dgm:scene3d>
+    <dgm:sp3d z="-60000" prstMaterial="plastic">
+      <a:bevelT w="120900" h="88900"/>
+      <a:bevelB w="88900" h="31750" prst="angle"/>
+    </dgm:sp3d>
+    <dgm:txPr/>
+    <dgm:style>
+      <a:lnRef idx="0">
+        <a:scrgbClr r="0" g="0" b="0"/>
+      </a:lnRef>
+      <a:fillRef idx="3">
+        <a:scrgbClr r="0" g="0" b="0"/>
+      </a:fillRef>
+      <a:effectRef idx="1">
+        <a:scrgbClr r="0" g="0" b="0"/>
+      </a:effectRef>
+      <a:fontRef idx="minor">
+        <a:schemeClr val="lt1"/>
+      </a:fontRef>
+    </dgm:style>
+  </dgm:styleLbl>
+  <dgm:styleLbl name="parChTrans2D4">
+    <dgm:scene3d>
+      <a:camera prst="orthographicFront"/>
+      <a:lightRig rig="flat" dir="t"/>
+    </dgm:scene3d>
+    <dgm:sp3d z="-60000" prstMaterial="plastic">
+      <a:bevelT w="120900" h="88900"/>
+      <a:bevelB w="88900" h="31750" prst="angle"/>
+    </dgm:sp3d>
+    <dgm:txPr/>
+    <dgm:style>
+      <a:lnRef idx="0">
+        <a:scrgbClr r="0" g="0" b="0"/>
+      </a:lnRef>
+      <a:fillRef idx="3">
+        <a:scrgbClr r="0" g="0" b="0"/>
+      </a:fillRef>
+      <a:effectRef idx="1">
+        <a:scrgbClr r="0" g="0" b="0"/>
+      </a:effectRef>
+      <a:fontRef idx="minor">
+        <a:schemeClr val="lt1"/>
+      </a:fontRef>
+    </dgm:style>
+  </dgm:styleLbl>
+  <dgm:styleLbl name="parChTrans1D1">
+    <dgm:scene3d>
+      <a:camera prst="orthographicFront"/>
+      <a:lightRig rig="flat" dir="t"/>
+    </dgm:scene3d>
+    <dgm:sp3d prstMaterial="matte"/>
+    <dgm:txPr/>
+    <dgm:style>
+      <a:lnRef idx="2">
+        <a:scrgbClr r="0" g="0" b="0"/>
+      </a:lnRef>
+      <a:fillRef idx="0">
+        <a:scrgbClr r="0" g="0" b="0"/>
+      </a:fillRef>
+      <a:effectRef idx="0">
+        <a:scrgbClr r="0" g="0" b="0"/>
+      </a:effectRef>
+      <a:fontRef idx="minor"/>
+    </dgm:style>
+  </dgm:styleLbl>
+  <dgm:styleLbl name="parChTrans1D2">
+    <dgm:scene3d>
+      <a:camera prst="orthographicFront"/>
+      <a:lightRig rig="flat" dir="t"/>
+    </dgm:scene3d>
+    <dgm:sp3d prstMaterial="matte"/>
+    <dgm:txPr/>
+    <dgm:style>
+      <a:lnRef idx="2">
+        <a:scrgbClr r="0" g="0" b="0"/>
+      </a:lnRef>
+      <a:fillRef idx="0">
+        <a:scrgbClr r="0" g="0" b="0"/>
+      </a:fillRef>
+      <a:effectRef idx="0">
+        <a:scrgbClr r="0" g="0" b="0"/>
+      </a:effectRef>
+      <a:fontRef idx="minor"/>
+    </dgm:style>
+  </dgm:styleLbl>
+  <dgm:styleLbl name="parChTrans1D3">
+    <dgm:scene3d>
+      <a:camera prst="orthographicFront"/>
+      <a:lightRig rig="flat" dir="t"/>
+    </dgm:scene3d>
+    <dgm:sp3d prstMaterial="matte"/>
+    <dgm:txPr/>
+    <dgm:style>
+      <a:lnRef idx="2">
+        <a:scrgbClr r="0" g="0" b="0"/>
+      </a:lnRef>
+      <a:fillRef idx="0">
+        <a:scrgbClr r="0" g="0" b="0"/>
+      </a:fillRef>
+      <a:effectRef idx="0">
+        <a:scrgbClr r="0" g="0" b="0"/>
+      </a:effectRef>
+      <a:fontRef idx="minor"/>
+    </dgm:style>
+  </dgm:styleLbl>
+  <dgm:styleLbl name="parChTrans1D4">
+    <dgm:scene3d>
+      <a:camera prst="orthographicFront"/>
+      <a:lightRig rig="flat" dir="t"/>
+    </dgm:scene3d>
+    <dgm:sp3d prstMaterial="matte"/>
+    <dgm:txPr/>
+    <dgm:style>
+      <a:lnRef idx="2">
+        <a:scrgbClr r="0" g="0" b="0"/>
+      </a:lnRef>
+      <a:fillRef idx="0">
+        <a:scrgbClr r="0" g="0" b="0"/>
+      </a:fillRef>
+      <a:effectRef idx="0">
+        <a:scrgbClr r="0" g="0" b="0"/>
+      </a:effectRef>
+      <a:fontRef idx="minor"/>
+    </dgm:style>
+  </dgm:styleLbl>
+  <dgm:styleLbl name="fgAcc1">
+    <dgm:scene3d>
+      <a:camera prst="orthographicFront"/>
+      <a:lightRig rig="flat" dir="t"/>
+    </dgm:scene3d>
+    <dgm:sp3d z="190500" extrusionH="12700" prstMaterial="plastic">
+      <a:bevelT w="50800" h="50800"/>
+    </dgm:sp3d>
+    <dgm:txPr/>
+    <dgm:style>
+      <a:lnRef idx="1">
+        <a:scrgbClr r="0" g="0" b="0"/>
+      </a:lnRef>
+      <a:fillRef idx="1">
+        <a:scrgbClr r="0" g="0" b="0"/>
+      </a:fillRef>
+      <a:effectRef idx="2">
+        <a:scrgbClr r="0" g="0" b="0"/>
+      </a:effectRef>
+      <a:fontRef idx="minor"/>
+    </dgm:style>
+  </dgm:styleLbl>
+  <dgm:styleLbl name="conFgAcc1">
+    <dgm:scene3d>
+      <a:camera prst="orthographicFront"/>
+      <a:lightRig rig="flat" dir="t"/>
+    </dgm:scene3d>
+    <dgm:sp3d z="190500" extrusionH="12700" prstMaterial="plastic">
+      <a:bevelT w="50800" h="50800"/>
+    </dgm:sp3d>
+    <dgm:txPr/>
+    <dgm:style>
+      <a:lnRef idx="1">
+        <a:scrgbClr r="0" g="0" b="0"/>
+      </a:lnRef>
+      <a:fillRef idx="1">
+        <a:scrgbClr r="0" g="0" b="0"/>
+      </a:fillRef>
+      <a:effectRef idx="2">
+        <a:scrgbClr r="0" g="0" b="0"/>
+      </a:effectRef>
+      <a:fontRef idx="minor"/>
+    </dgm:style>
+  </dgm:styleLbl>
+  <dgm:styleLbl name="alignAcc1">
+    <dgm:scene3d>
+      <a:camera prst="orthographicFront"/>
+      <a:lightRig rig="flat" dir="t"/>
+    </dgm:scene3d>
+    <dgm:sp3d extrusionH="12700" prstMaterial="plastic">
+      <a:bevelT w="50800" h="50800"/>
+    </dgm:sp3d>
+    <dgm:txPr/>
+    <dgm:style>
+      <a:lnRef idx="1">
+        <a:scrgbClr r="0" g="0" b="0"/>
+      </a:lnRef>
+      <a:fillRef idx="1">
+        <a:scrgbClr r="0" g="0" b="0"/>
+      </a:fillRef>
+      <a:effectRef idx="2">
+        <a:scrgbClr r="0" g="0" b="0"/>
+      </a:effectRef>
+      <a:fontRef idx="minor"/>
+    </dgm:style>
+  </dgm:styleLbl>
+  <dgm:styleLbl name="trAlignAcc1">
+    <dgm:scene3d>
+      <a:camera prst="orthographicFront"/>
+      <a:lightRig rig="flat" dir="t"/>
+    </dgm:scene3d>
+    <dgm:sp3d extrusionH="12700" prstMaterial="plastic">
+      <a:bevelT w="50800" h="50800"/>
+    </dgm:sp3d>
+    <dgm:txPr/>
+    <dgm:style>
+      <a:lnRef idx="1">
+        <a:scrgbClr r="0" g="0" b="0"/>
+      </a:lnRef>
+      <a:fillRef idx="1">
+        <a:scrgbClr r="0" g="0" b="0"/>
+      </a:fillRef>
+      <a:effectRef idx="2">
+        <a:scrgbClr r="0" g="0" b="0"/>
+      </a:effectRef>
+      <a:fontRef idx="minor"/>
+    </dgm:style>
+  </dgm:styleLbl>
+  <dgm:styleLbl name="bgAcc1">
+    <dgm:scene3d>
+      <a:camera prst="orthographicFront"/>
+      <a:lightRig rig="flat" dir="t"/>
+    </dgm:scene3d>
+    <dgm:sp3d z="-190500" extrusionH="12700" prstMaterial="plastic">
+      <a:bevelT w="50800" h="50800"/>
+    </dgm:sp3d>
+    <dgm:txPr/>
+    <dgm:style>
+      <a:lnRef idx="1">
+        <a:scrgbClr r="0" g="0" b="0"/>
+      </a:lnRef>
+      <a:fillRef idx="1">
+        <a:scrgbClr r="0" g="0" b="0"/>
+      </a:fillRef>
+      <a:effectRef idx="2">
+        <a:scrgbClr r="0" g="0" b="0"/>
+      </a:effectRef>
+      <a:fontRef idx="minor"/>
+    </dgm:style>
+  </dgm:styleLbl>
+  <dgm:styleLbl name="solidFgAcc1">
+    <dgm:scene3d>
+      <a:camera prst="orthographicFront"/>
+      <a:lightRig rig="flat" dir="t"/>
+    </dgm:scene3d>
+    <dgm:sp3d z="190500" extrusionH="12700" prstMaterial="plastic">
+      <a:bevelT w="50800" h="50800"/>
+    </dgm:sp3d>
+    <dgm:txPr/>
+    <dgm:style>
+      <a:lnRef idx="1">
+        <a:scrgbClr r="0" g="0" b="0"/>
+      </a:lnRef>
+      <a:fillRef idx="1">
+        <a:scrgbClr r="0" g="0" b="0"/>
+      </a:fillRef>
+      <a:effectRef idx="2">
+        <a:scrgbClr r="0" g="0" b="0"/>
+      </a:effectRef>
+      <a:fontRef idx="minor"/>
+    </dgm:style>
+  </dgm:styleLbl>
+  <dgm:styleLbl name="solidAlignAcc1">
+    <dgm:scene3d>
+      <a:camera prst="orthographicFront"/>
+      <a:lightRig rig="flat" dir="t"/>
+    </dgm:scene3d>
+    <dgm:sp3d extrusionH="12700" prstMaterial="plastic">
+      <a:bevelT w="50800" h="50800"/>
+    </dgm:sp3d>
+    <dgm:txPr/>
+    <dgm:style>
+      <a:lnRef idx="1">
+        <a:scrgbClr r="0" g="0" b="0"/>
+      </a:lnRef>
+      <a:fillRef idx="1">
+        <a:scrgbClr r="0" g="0" b="0"/>
+      </a:fillRef>
+      <a:effectRef idx="2">
+        <a:scrgbClr r="0" g="0" b="0"/>
+      </a:effectRef>
+      <a:fontRef idx="minor"/>
+    </dgm:style>
+  </dgm:styleLbl>
+  <dgm:styleLbl name="solidBgAcc1">
+    <dgm:scene3d>
+      <a:camera prst="orthographicFront"/>
+      <a:lightRig rig="flat" dir="t"/>
+    </dgm:scene3d>
+    <dgm:sp3d z="-190500" extrusionH="12700" prstMaterial="plastic">
+      <a:bevelT w="50800" h="50800"/>
+    </dgm:sp3d>
+    <dgm:txPr/>
+    <dgm:style>
+      <a:lnRef idx="1">
+        <a:scrgbClr r="0" g="0" b="0"/>
+      </a:lnRef>
+      <a:fillRef idx="1">
+        <a:scrgbClr r="0" g="0" b="0"/>
+      </a:fillRef>
+      <a:effectRef idx="2">
+        <a:scrgbClr r="0" g="0" b="0"/>
+      </a:effectRef>
+      <a:fontRef idx="minor"/>
+    </dgm:style>
+  </dgm:styleLbl>
+  <dgm:styleLbl name="fgAccFollowNode1">
+    <dgm:scene3d>
+      <a:camera prst="orthographicFront"/>
+      <a:lightRig rig="flat" dir="t"/>
+    </dgm:scene3d>
+    <dgm:sp3d z="190500" extrusionH="12700" prstMaterial="plastic">
+      <a:bevelT w="50800" h="50800"/>
+    </dgm:sp3d>
+    <dgm:txPr/>
+    <dgm:style>
+      <a:lnRef idx="1">
+        <a:scrgbClr r="0" g="0" b="0"/>
+      </a:lnRef>
+      <a:fillRef idx="1">
+        <a:scrgbClr r="0" g="0" b="0"/>
+      </a:fillRef>
+      <a:effectRef idx="2">
+        <a:scrgbClr r="0" g="0" b="0"/>
+      </a:effectRef>
+      <a:fontRef idx="minor"/>
+    </dgm:style>
+  </dgm:styleLbl>
+  <dgm:styleLbl name="alignAccFollowNode1">
+    <dgm:scene3d>
+      <a:camera prst="orthographicFront"/>
+      <a:lightRig rig="flat" dir="t"/>
+    </dgm:scene3d>
+    <dgm:sp3d extrusionH="12700" prstMaterial="plastic">
+      <a:bevelT w="50800" h="50800"/>
+    </dgm:sp3d>
+    <dgm:txPr/>
+    <dgm:style>
+      <a:lnRef idx="1">
+        <a:scrgbClr r="0" g="0" b="0"/>
+      </a:lnRef>
+      <a:fillRef idx="1">
+        <a:scrgbClr r="0" g="0" b="0"/>
+      </a:fillRef>
+      <a:effectRef idx="2">
+        <a:scrgbClr r="0" g="0" b="0"/>
+      </a:effectRef>
+      <a:fontRef idx="minor"/>
+    </dgm:style>
+  </dgm:styleLbl>
+  <dgm:styleLbl name="bgAccFollowNode1">
+    <dgm:scene3d>
+      <a:camera prst="orthographicFront"/>
+      <a:lightRig rig="flat" dir="t"/>
+    </dgm:scene3d>
+    <dgm:sp3d z="-190500" extrusionH="12700" prstMaterial="plastic">
+      <a:bevelT w="50800" h="50800"/>
+    </dgm:sp3d>
+    <dgm:txPr/>
+    <dgm:style>
+      <a:lnRef idx="1">
+        <a:scrgbClr r="0" g="0" b="0"/>
+      </a:lnRef>
+      <a:fillRef idx="1">
+        <a:scrgbClr r="0" g="0" b="0"/>
+      </a:fillRef>
+      <a:effectRef idx="2">
+        <a:scrgbClr r="0" g="0" b="0"/>
+      </a:effectRef>
+      <a:fontRef idx="minor"/>
+    </dgm:style>
+  </dgm:styleLbl>
+  <dgm:styleLbl name="fgAcc0">
+    <dgm:scene3d>
+      <a:camera prst="orthographicFront"/>
+      <a:lightRig rig="flat" dir="t"/>
+    </dgm:scene3d>
+    <dgm:sp3d z="190500" extrusionH="12700" prstMaterial="plastic">
+      <a:bevelT w="50800" h="50800"/>
+    </dgm:sp3d>
+    <dgm:txPr/>
+    <dgm:style>
+      <a:lnRef idx="1">
+        <a:scrgbClr r="0" g="0" b="0"/>
+      </a:lnRef>
+      <a:fillRef idx="1">
+        <a:scrgbClr r="0" g="0" b="0"/>
+      </a:fillRef>
+      <a:effectRef idx="2">
+        <a:scrgbClr r="0" g="0" b="0"/>
+      </a:effectRef>
+      <a:fontRef idx="minor"/>
+    </dgm:style>
+  </dgm:styleLbl>
+  <dgm:styleLbl name="fgAcc2">
+    <dgm:scene3d>
+      <a:camera prst="orthographicFront"/>
+      <a:lightRig rig="flat" dir="t"/>
+    </dgm:scene3d>
+    <dgm:sp3d z="190500" extrusionH="12700" prstMaterial="plastic">
+      <a:bevelT w="50800" h="50800"/>
+    </dgm:sp3d>
+    <dgm:txPr/>
+    <dgm:style>
+      <a:lnRef idx="1">
+        <a:scrgbClr r="0" g="0" b="0"/>
+      </a:lnRef>
+      <a:fillRef idx="1">
+        <a:scrgbClr r="0" g="0" b="0"/>
+      </a:fillRef>
+      <a:effectRef idx="2">
+        <a:scrgbClr r="0" g="0" b="0"/>
+      </a:effectRef>
+      <a:fontRef idx="minor"/>
+    </dgm:style>
+  </dgm:styleLbl>
+  <dgm:styleLbl name="fgAcc3">
+    <dgm:scene3d>
+      <a:camera prst="orthographicFront"/>
+      <a:lightRig rig="flat" dir="t"/>
+    </dgm:scene3d>
+    <dgm:sp3d z="190500" extrusionH="12700" prstMaterial="plastic">
+      <a:bevelT w="50800" h="50800"/>
+    </dgm:sp3d>
+    <dgm:txPr/>
+    <dgm:style>
+      <a:lnRef idx="1">
+        <a:scrgbClr r="0" g="0" b="0"/>
+      </a:lnRef>
+      <a:fillRef idx="1">
+        <a:scrgbClr r="0" g="0" b="0"/>
+      </a:fillRef>
+      <a:effectRef idx="2">
+        <a:scrgbClr r="0" g="0" b="0"/>
+      </a:effectRef>
+      <a:fontRef idx="minor"/>
+    </dgm:style>
+  </dgm:styleLbl>
+  <dgm:styleLbl name="fgAcc4">
+    <dgm:scene3d>
+      <a:camera prst="orthographicFront"/>
+      <a:lightRig rig="flat" dir="t"/>
+    </dgm:scene3d>
+    <dgm:sp3d z="190500" extrusionH="12700" prstMaterial="plastic">
+      <a:bevelT w="50800" h="50800"/>
+    </dgm:sp3d>
+    <dgm:txPr/>
+    <dgm:style>
+      <a:lnRef idx="1">
+        <a:scrgbClr r="0" g="0" b="0"/>
+      </a:lnRef>
+      <a:fillRef idx="1">
+        <a:scrgbClr r="0" g="0" b="0"/>
+      </a:fillRef>
+      <a:effectRef idx="2">
+        <a:scrgbClr r="0" g="0" b="0"/>
+      </a:effectRef>
+      <a:fontRef idx="minor"/>
+    </dgm:style>
+  </dgm:styleLbl>
+  <dgm:styleLbl name="bgShp">
+    <dgm:scene3d>
+      <a:camera prst="orthographicFront"/>
+      <a:lightRig rig="flat" dir="t"/>
+    </dgm:scene3d>
+    <dgm:sp3d z="-190500" extrusionH="12700" prstMaterial="plastic">
+      <a:bevelT w="50800" h="50800"/>
+    </dgm:sp3d>
+    <dgm:txPr/>
+    <dgm:style>
+      <a:lnRef idx="0">
+        <a:scrgbClr r="0" g="0" b="0"/>
+      </a:lnRef>
+      <a:fillRef idx="3">
+        <a:scrgbClr r="0" g="0" b="0"/>
+      </a:fillRef>
+      <a:effectRef idx="0">
+        <a:scrgbClr r="0" g="0" b="0"/>
+      </a:effectRef>
+      <a:fontRef idx="minor"/>
+    </dgm:style>
+  </dgm:styleLbl>
+  <dgm:styleLbl name="dkBgShp">
+    <dgm:scene3d>
+      <a:camera prst="orthographicFront"/>
+      <a:lightRig rig="flat" dir="t"/>
+    </dgm:scene3d>
+    <dgm:sp3d z="-190500" extrusionH="12700" prstMaterial="plastic">
+      <a:bevelT w="50800" h="50800"/>
+    </dgm:sp3d>
+    <dgm:txPr/>
+    <dgm:style>
+      <a:lnRef idx="0">
+        <a:scrgbClr r="0" g="0" b="0"/>
+      </a:lnRef>
+      <a:fillRef idx="2">
+        <a:scrgbClr r="0" g="0" b="0"/>
+      </a:fillRef>
+      <a:effectRef idx="0">
+        <a:scrgbClr r="0" g="0" b="0"/>
+      </a:effectRef>
+      <a:fontRef idx="minor"/>
+    </dgm:style>
+  </dgm:styleLbl>
+  <dgm:styleLbl name="trBgShp">
+    <dgm:scene3d>
+      <a:camera prst="orthographicFront"/>
+      <a:lightRig rig="flat" dir="t"/>
+    </dgm:scene3d>
+    <dgm:sp3d z="-190500" extrusionH="12700" prstMaterial="matte"/>
+    <dgm:txPr/>
+    <dgm:style>
+      <a:lnRef idx="0">
+        <a:scrgbClr r="0" g="0" b="0"/>
+      </a:lnRef>
+      <a:fillRef idx="1">
+        <a:scrgbClr r="0" g="0" b="0"/>
+      </a:fillRef>
+      <a:effectRef idx="0">
+        <a:scrgbClr r="0" g="0" b="0"/>
+      </a:effectRef>
+      <a:fontRef idx="minor"/>
+    </dgm:style>
+  </dgm:styleLbl>
+  <dgm:styleLbl name="fgShp">
+    <dgm:scene3d>
+      <a:camera prst="orthographicFront"/>
+      <a:lightRig rig="flat" dir="t"/>
+    </dgm:scene3d>
+    <dgm:sp3d z="190500" prstMaterial="plastic">
+      <a:bevelT w="120900" h="88900"/>
+      <a:bevelB w="88900" h="31750" prst="angle"/>
+    </dgm:sp3d>
+    <dgm:txPr/>
+    <dgm:style>
+      <a:lnRef idx="0">
+        <a:scrgbClr r="0" g="0" b="0"/>
+      </a:lnRef>
+      <a:fillRef idx="1">
+        <a:scrgbClr r="0" g="0" b="0"/>
+      </a:fillRef>
+      <a:effectRef idx="3">
+        <a:scrgbClr r="0" g="0" b="0"/>
+      </a:effectRef>
+      <a:fontRef idx="minor">
+        <a:schemeClr val="lt1"/>
+      </a:fontRef>
+    </dgm:style>
+  </dgm:styleLbl>
+  <dgm:styleLbl name="revTx">
+    <dgm:scene3d>
+      <a:camera prst="orthographicFront"/>
+      <a:lightRig rig="threePt" dir="t"/>
+    </dgm:scene3d>
+    <dgm:sp3d/>
+    <dgm:txPr/>
+    <dgm:style>
+      <a:lnRef idx="0">
+        <a:scrgbClr r="0" g="0" b="0"/>
+      </a:lnRef>
+      <a:fillRef idx="0">
+        <a:scrgbClr r="0" g="0" b="0"/>
+      </a:fillRef>
+      <a:effectRef idx="0">
+        <a:scrgbClr r="0" g="0" b="0"/>
+      </a:effectRef>
+      <a:fontRef idx="minor"/>
+    </dgm:style>
+  </dgm:styleLbl>
+</dgm:styleDef>
+</file>
+
+<file path=ppt/diagrams/quickStyle2.xml><?xml version="1.0" encoding="utf-8"?>
 <dgm:styleDef xmlns:dgm="http://schemas.openxmlformats.org/drawingml/2006/diagram" xmlns:a="http://schemas.openxmlformats.org/drawingml/2006/main" uniqueId="urn:microsoft.com/office/officeart/2005/8/quickstyle/3d1">
   <dgm:title val=""/>
   <dgm:desc val=""/>
@@ -7655,7 +12209,7 @@
           <p:nvPr>
             <p:extLst>
               <p:ext uri="{D42A27DB-BD31-4B8C-83A1-F6EECF244321}">
-                <p14:modId xmlns:p14="http://schemas.microsoft.com/office/powerpoint/2010/main" val="2298529721"/>
+                <p14:modId xmlns:p14="http://schemas.microsoft.com/office/powerpoint/2010/main" val="1272647781"/>
               </p:ext>
             </p:extLst>
           </p:nvPr>
@@ -7674,6 +12228,65 @@
     <p:extLst>
       <p:ext uri="{BB962C8B-B14F-4D97-AF65-F5344CB8AC3E}">
         <p14:creationId xmlns:p14="http://schemas.microsoft.com/office/powerpoint/2010/main" val="2136612005"/>
+      </p:ext>
+    </p:extLst>
+  </p:cSld>
+  <p:clrMapOvr>
+    <a:masterClrMapping/>
+  </p:clrMapOvr>
+  <p:timing>
+    <p:tnLst>
+      <p:par>
+        <p:cTn id="1" dur="indefinite" restart="never" nodeType="tmRoot"/>
+      </p:par>
+    </p:tnLst>
+  </p:timing>
+</p:sld>
+</file>
+
+<file path=ppt/slides/slide2.xml><?xml version="1.0" encoding="utf-8"?>
+<p:sld xmlns:a="http://schemas.openxmlformats.org/drawingml/2006/main" xmlns:r="http://schemas.openxmlformats.org/officeDocument/2006/relationships" xmlns:p="http://schemas.openxmlformats.org/presentationml/2006/main">
+  <p:cSld>
+    <p:spTree>
+      <p:nvGrpSpPr>
+        <p:cNvPr id="1" name=""/>
+        <p:cNvGrpSpPr/>
+        <p:nvPr/>
+      </p:nvGrpSpPr>
+      <p:grpSpPr>
+        <a:xfrm>
+          <a:off x="0" y="0"/>
+          <a:ext cx="0" cy="0"/>
+          <a:chOff x="0" y="0"/>
+          <a:chExt cx="0" cy="0"/>
+        </a:xfrm>
+      </p:grpSpPr>
+      <p:graphicFrame>
+        <p:nvGraphicFramePr>
+          <p:cNvPr id="18" name="Diagram 17"/>
+          <p:cNvGraphicFramePr/>
+          <p:nvPr>
+            <p:extLst>
+              <p:ext uri="{D42A27DB-BD31-4B8C-83A1-F6EECF244321}">
+                <p14:modId xmlns:p14="http://schemas.microsoft.com/office/powerpoint/2010/main" val="1616987535"/>
+              </p:ext>
+            </p:extLst>
+          </p:nvPr>
+        </p:nvGraphicFramePr>
+        <p:xfrm>
+          <a:off x="2032000" y="719666"/>
+          <a:ext cx="8128000" cy="5418667"/>
+        </p:xfrm>
+        <a:graphic>
+          <a:graphicData uri="http://schemas.openxmlformats.org/drawingml/2006/diagram">
+            <dgm:relIds xmlns:dgm="http://schemas.openxmlformats.org/drawingml/2006/diagram" xmlns:r="http://schemas.openxmlformats.org/officeDocument/2006/relationships" r:dm="rId2" r:lo="rId3" r:qs="rId4" r:cs="rId5"/>
+          </a:graphicData>
+        </a:graphic>
+      </p:graphicFrame>
+    </p:spTree>
+    <p:extLst>
+      <p:ext uri="{BB962C8B-B14F-4D97-AF65-F5344CB8AC3E}">
+        <p14:creationId xmlns:p14="http://schemas.microsoft.com/office/powerpoint/2010/main" val="2813205161"/>
       </p:ext>
     </p:extLst>
   </p:cSld>

</xml_diff>